<commit_message>
Eager vs Lazy loading
</commit_message>
<xml_diff>
--- a/PowerPoint/Working with Visual Studio.pptx
+++ b/PowerPoint/Working with Visual Studio.pptx
@@ -13,6 +13,10 @@
     <p:sldId id="261" r:id="rId7"/>
     <p:sldId id="262" r:id="rId8"/>
     <p:sldId id="263" r:id="rId9"/>
+    <p:sldId id="264" r:id="rId10"/>
+    <p:sldId id="265" r:id="rId11"/>
+    <p:sldId id="266" r:id="rId12"/>
+    <p:sldId id="267" r:id="rId13"/>
   </p:sldIdLst>
   <p:sldSz cx="12192000" cy="6858000"/>
   <p:notesSz cx="6858000" cy="9144000"/>
@@ -111,6 +115,11 @@
       </a:defRPr>
     </a:lvl9pPr>
   </p:defaultTextStyle>
+  <p:extLst>
+    <p:ext uri="{EFAFB233-063F-42B5-8137-9DF3F51BA10A}">
+      <p15:sldGuideLst xmlns:p15="http://schemas.microsoft.com/office/powerpoint/2012/main"/>
+    </p:ext>
+  </p:extLst>
 </p:presentation>
 </file>
 
@@ -245,7 +254,7 @@
           <a:p>
             <a:fld id="{595C178B-5A77-496A-9807-14D7EFE9DB5D}" type="datetimeFigureOut">
               <a:rPr lang="en-US" smtClean="0"/>
-              <a:t>6/6/2019</a:t>
+              <a:t>6/7/2019</a:t>
             </a:fld>
             <a:endParaRPr lang="en-US"/>
           </a:p>
@@ -415,7 +424,7 @@
           <a:p>
             <a:fld id="{595C178B-5A77-496A-9807-14D7EFE9DB5D}" type="datetimeFigureOut">
               <a:rPr lang="en-US" smtClean="0"/>
-              <a:t>6/6/2019</a:t>
+              <a:t>6/7/2019</a:t>
             </a:fld>
             <a:endParaRPr lang="en-US"/>
           </a:p>
@@ -595,7 +604,7 @@
           <a:p>
             <a:fld id="{595C178B-5A77-496A-9807-14D7EFE9DB5D}" type="datetimeFigureOut">
               <a:rPr lang="en-US" smtClean="0"/>
-              <a:t>6/6/2019</a:t>
+              <a:t>6/7/2019</a:t>
             </a:fld>
             <a:endParaRPr lang="en-US"/>
           </a:p>
@@ -765,7 +774,7 @@
           <a:p>
             <a:fld id="{595C178B-5A77-496A-9807-14D7EFE9DB5D}" type="datetimeFigureOut">
               <a:rPr lang="en-US" smtClean="0"/>
-              <a:t>6/6/2019</a:t>
+              <a:t>6/7/2019</a:t>
             </a:fld>
             <a:endParaRPr lang="en-US"/>
           </a:p>
@@ -1011,7 +1020,7 @@
           <a:p>
             <a:fld id="{595C178B-5A77-496A-9807-14D7EFE9DB5D}" type="datetimeFigureOut">
               <a:rPr lang="en-US" smtClean="0"/>
-              <a:t>6/6/2019</a:t>
+              <a:t>6/7/2019</a:t>
             </a:fld>
             <a:endParaRPr lang="en-US"/>
           </a:p>
@@ -1243,7 +1252,7 @@
           <a:p>
             <a:fld id="{595C178B-5A77-496A-9807-14D7EFE9DB5D}" type="datetimeFigureOut">
               <a:rPr lang="en-US" smtClean="0"/>
-              <a:t>6/6/2019</a:t>
+              <a:t>6/7/2019</a:t>
             </a:fld>
             <a:endParaRPr lang="en-US"/>
           </a:p>
@@ -1610,7 +1619,7 @@
           <a:p>
             <a:fld id="{595C178B-5A77-496A-9807-14D7EFE9DB5D}" type="datetimeFigureOut">
               <a:rPr lang="en-US" smtClean="0"/>
-              <a:t>6/6/2019</a:t>
+              <a:t>6/7/2019</a:t>
             </a:fld>
             <a:endParaRPr lang="en-US"/>
           </a:p>
@@ -1728,7 +1737,7 @@
           <a:p>
             <a:fld id="{595C178B-5A77-496A-9807-14D7EFE9DB5D}" type="datetimeFigureOut">
               <a:rPr lang="en-US" smtClean="0"/>
-              <a:t>6/6/2019</a:t>
+              <a:t>6/7/2019</a:t>
             </a:fld>
             <a:endParaRPr lang="en-US"/>
           </a:p>
@@ -1823,7 +1832,7 @@
           <a:p>
             <a:fld id="{595C178B-5A77-496A-9807-14D7EFE9DB5D}" type="datetimeFigureOut">
               <a:rPr lang="en-US" smtClean="0"/>
-              <a:t>6/6/2019</a:t>
+              <a:t>6/7/2019</a:t>
             </a:fld>
             <a:endParaRPr lang="en-US"/>
           </a:p>
@@ -2100,7 +2109,7 @@
           <a:p>
             <a:fld id="{595C178B-5A77-496A-9807-14D7EFE9DB5D}" type="datetimeFigureOut">
               <a:rPr lang="en-US" smtClean="0"/>
-              <a:t>6/6/2019</a:t>
+              <a:t>6/7/2019</a:t>
             </a:fld>
             <a:endParaRPr lang="en-US"/>
           </a:p>
@@ -2353,7 +2362,7 @@
           <a:p>
             <a:fld id="{595C178B-5A77-496A-9807-14D7EFE9DB5D}" type="datetimeFigureOut">
               <a:rPr lang="en-US" smtClean="0"/>
-              <a:t>6/6/2019</a:t>
+              <a:t>6/7/2019</a:t>
             </a:fld>
             <a:endParaRPr lang="en-US"/>
           </a:p>
@@ -2566,7 +2575,7 @@
           <a:p>
             <a:fld id="{595C178B-5A77-496A-9807-14D7EFE9DB5D}" type="datetimeFigureOut">
               <a:rPr lang="en-US" smtClean="0"/>
-              <a:t>6/6/2019</a:t>
+              <a:t>6/7/2019</a:t>
             </a:fld>
             <a:endParaRPr lang="en-US"/>
           </a:p>
@@ -3037,6 +3046,356 @@
 </p:sld>
 </file>
 
+<file path=ppt/slides/slide10.xml><?xml version="1.0" encoding="utf-8"?>
+<p:sld xmlns:a="http://schemas.openxmlformats.org/drawingml/2006/main" xmlns:r="http://schemas.openxmlformats.org/officeDocument/2006/relationships" xmlns:p="http://schemas.openxmlformats.org/presentationml/2006/main">
+  <p:cSld>
+    <p:spTree>
+      <p:nvGrpSpPr>
+        <p:cNvPr id="1" name=""/>
+        <p:cNvGrpSpPr/>
+        <p:nvPr/>
+      </p:nvGrpSpPr>
+      <p:grpSpPr>
+        <a:xfrm>
+          <a:off x="0" y="0"/>
+          <a:ext cx="0" cy="0"/>
+          <a:chOff x="0" y="0"/>
+          <a:chExt cx="0" cy="0"/>
+        </a:xfrm>
+      </p:grpSpPr>
+      <p:sp>
+        <p:nvSpPr>
+          <p:cNvPr id="2" name="Title 1"/>
+          <p:cNvSpPr>
+            <a:spLocks noGrp="1"/>
+          </p:cNvSpPr>
+          <p:nvPr>
+            <p:ph type="title"/>
+          </p:nvPr>
+        </p:nvSpPr>
+        <p:spPr/>
+        <p:txBody>
+          <a:bodyPr/>
+          <a:lstStyle/>
+          <a:p>
+            <a:r>
+              <a:rPr lang="en-US" b="1" dirty="0" smtClean="0"/>
+              <a:t>ASP.NET Core Documentation</a:t>
+            </a:r>
+            <a:endParaRPr lang="en-US" dirty="0"/>
+          </a:p>
+        </p:txBody>
+      </p:sp>
+      <p:sp>
+        <p:nvSpPr>
+          <p:cNvPr id="3" name="Content Placeholder 2"/>
+          <p:cNvSpPr>
+            <a:spLocks noGrp="1"/>
+          </p:cNvSpPr>
+          <p:nvPr>
+            <p:ph idx="1"/>
+          </p:nvPr>
+        </p:nvSpPr>
+        <p:spPr/>
+        <p:txBody>
+          <a:bodyPr>
+            <a:normAutofit/>
+          </a:bodyPr>
+          <a:lstStyle/>
+          <a:p>
+            <a:pPr marL="0" indent="0">
+              <a:buNone/>
+            </a:pPr>
+            <a:r>
+              <a:rPr lang="en-US" sz="2000" dirty="0"/>
+              <a:t>ASP.NET Core is a new open-source and cross-platform .NET framework for building modern cloud-based web </a:t>
+            </a:r>
+            <a:r>
+              <a:rPr lang="en-US" sz="2000" dirty="0" smtClean="0"/>
+              <a:t>applications </a:t>
+            </a:r>
+            <a:r>
+              <a:rPr lang="en-US" sz="2000" dirty="0"/>
+              <a:t>on Windows, Mac, or Linux</a:t>
+            </a:r>
+            <a:r>
+              <a:rPr lang="en-US" sz="2000" dirty="0" smtClean="0"/>
+              <a:t>.</a:t>
+            </a:r>
+          </a:p>
+          <a:p>
+            <a:pPr marL="0" indent="0">
+              <a:buNone/>
+            </a:pPr>
+            <a:endParaRPr lang="en-US" sz="2000" dirty="0"/>
+          </a:p>
+          <a:p>
+            <a:pPr marL="0" indent="0">
+              <a:buNone/>
+            </a:pPr>
+            <a:r>
+              <a:rPr lang="en-US" sz="2000" dirty="0">
+                <a:hlinkClick r:id="rId2"/>
+              </a:rPr>
+              <a:t>https://docs.microsoft.com/en-us/aspnet/?</a:t>
+            </a:r>
+            <a:r>
+              <a:rPr lang="en-US" sz="2000" dirty="0" smtClean="0">
+                <a:hlinkClick r:id="rId2"/>
+              </a:rPr>
+              <a:t>view=aspnetcore-2.2#pivot=core&amp;panel=core_overview</a:t>
+            </a:r>
+            <a:endParaRPr lang="en-US" sz="2000" dirty="0" smtClean="0"/>
+          </a:p>
+          <a:p>
+            <a:pPr marL="0" indent="0">
+              <a:buNone/>
+            </a:pPr>
+            <a:endParaRPr lang="en-US" sz="2000" dirty="0" smtClean="0"/>
+          </a:p>
+          <a:p>
+            <a:pPr marL="0" indent="0">
+              <a:buNone/>
+            </a:pPr>
+            <a:r>
+              <a:rPr lang="en-US" sz="2000" dirty="0" smtClean="0"/>
+              <a:t>Tutorials</a:t>
+            </a:r>
+            <a:endParaRPr lang="en-US" sz="2000" dirty="0"/>
+          </a:p>
+          <a:p>
+            <a:pPr marL="0" indent="0">
+              <a:buNone/>
+            </a:pPr>
+            <a:r>
+              <a:rPr lang="en-US" sz="2000" dirty="0">
+                <a:hlinkClick r:id="rId3"/>
+              </a:rPr>
+              <a:t>https://www.tutorialspoint.com/asp.net_core/</a:t>
+            </a:r>
+            <a:endParaRPr lang="en-US" sz="2000" dirty="0"/>
+          </a:p>
+        </p:txBody>
+      </p:sp>
+    </p:spTree>
+    <p:extLst>
+      <p:ext uri="{BB962C8B-B14F-4D97-AF65-F5344CB8AC3E}">
+        <p14:creationId xmlns:p14="http://schemas.microsoft.com/office/powerpoint/2010/main" val="857302663"/>
+      </p:ext>
+    </p:extLst>
+  </p:cSld>
+  <p:clrMapOvr>
+    <a:masterClrMapping/>
+  </p:clrMapOvr>
+</p:sld>
+</file>
+
+<file path=ppt/slides/slide11.xml><?xml version="1.0" encoding="utf-8"?>
+<p:sld xmlns:a="http://schemas.openxmlformats.org/drawingml/2006/main" xmlns:r="http://schemas.openxmlformats.org/officeDocument/2006/relationships" xmlns:p="http://schemas.openxmlformats.org/presentationml/2006/main">
+  <p:cSld>
+    <p:spTree>
+      <p:nvGrpSpPr>
+        <p:cNvPr id="1" name=""/>
+        <p:cNvGrpSpPr/>
+        <p:nvPr/>
+      </p:nvGrpSpPr>
+      <p:grpSpPr>
+        <a:xfrm>
+          <a:off x="0" y="0"/>
+          <a:ext cx="0" cy="0"/>
+          <a:chOff x="0" y="0"/>
+          <a:chExt cx="0" cy="0"/>
+        </a:xfrm>
+      </p:grpSpPr>
+      <p:sp>
+        <p:nvSpPr>
+          <p:cNvPr id="2" name="Title 1"/>
+          <p:cNvSpPr>
+            <a:spLocks noGrp="1"/>
+          </p:cNvSpPr>
+          <p:nvPr>
+            <p:ph type="title"/>
+          </p:nvPr>
+        </p:nvSpPr>
+        <p:spPr/>
+        <p:txBody>
+          <a:bodyPr/>
+          <a:lstStyle/>
+          <a:p>
+            <a:r>
+              <a:rPr lang="en-US" b="1" dirty="0"/>
+              <a:t>Entity Framework </a:t>
+            </a:r>
+            <a:r>
+              <a:rPr lang="en-US" b="1" dirty="0" smtClean="0"/>
+              <a:t>Documentation</a:t>
+            </a:r>
+            <a:endParaRPr lang="en-US" dirty="0"/>
+          </a:p>
+        </p:txBody>
+      </p:sp>
+      <p:sp>
+        <p:nvSpPr>
+          <p:cNvPr id="3" name="Content Placeholder 2"/>
+          <p:cNvSpPr>
+            <a:spLocks noGrp="1"/>
+          </p:cNvSpPr>
+          <p:nvPr>
+            <p:ph idx="1"/>
+          </p:nvPr>
+        </p:nvSpPr>
+        <p:spPr/>
+        <p:txBody>
+          <a:bodyPr>
+            <a:normAutofit/>
+          </a:bodyPr>
+          <a:lstStyle/>
+          <a:p>
+            <a:pPr marL="0" indent="0">
+              <a:buNone/>
+            </a:pPr>
+            <a:r>
+              <a:rPr lang="en-US" sz="2000" dirty="0"/>
+              <a:t>Entity Framework is an object-relational mapper (O/RM) that enables .NET developers to work with a database using .NET objects. It eliminates the need for most of the data-access code that developers usually need to write</a:t>
+            </a:r>
+            <a:r>
+              <a:rPr lang="en-US" sz="2000" dirty="0" smtClean="0"/>
+              <a:t>.</a:t>
+            </a:r>
+          </a:p>
+          <a:p>
+            <a:pPr marL="0" indent="0">
+              <a:buNone/>
+            </a:pPr>
+            <a:endParaRPr lang="en-US" sz="2000" dirty="0"/>
+          </a:p>
+          <a:p>
+            <a:pPr marL="0" indent="0">
+              <a:buNone/>
+            </a:pPr>
+            <a:r>
+              <a:rPr lang="en-US" sz="2000">
+                <a:hlinkClick r:id="rId2"/>
+              </a:rPr>
+              <a:t>https://docs.microsoft.com/en-us/ef/#pivot=entityfmwk&amp;panel=entityfmwk1</a:t>
+            </a:r>
+            <a:endParaRPr lang="en-US" sz="2000" smtClean="0"/>
+          </a:p>
+          <a:p>
+            <a:pPr marL="0" indent="0">
+              <a:buNone/>
+            </a:pPr>
+            <a:endParaRPr lang="en-US" sz="2000" dirty="0"/>
+          </a:p>
+        </p:txBody>
+      </p:sp>
+    </p:spTree>
+    <p:extLst>
+      <p:ext uri="{BB962C8B-B14F-4D97-AF65-F5344CB8AC3E}">
+        <p14:creationId xmlns:p14="http://schemas.microsoft.com/office/powerpoint/2010/main" val="3444943664"/>
+      </p:ext>
+    </p:extLst>
+  </p:cSld>
+  <p:clrMapOvr>
+    <a:masterClrMapping/>
+  </p:clrMapOvr>
+</p:sld>
+</file>
+
+<file path=ppt/slides/slide12.xml><?xml version="1.0" encoding="utf-8"?>
+<p:sld xmlns:a="http://schemas.openxmlformats.org/drawingml/2006/main" xmlns:r="http://schemas.openxmlformats.org/officeDocument/2006/relationships" xmlns:p="http://schemas.openxmlformats.org/presentationml/2006/main">
+  <p:cSld>
+    <p:spTree>
+      <p:nvGrpSpPr>
+        <p:cNvPr id="1" name=""/>
+        <p:cNvGrpSpPr/>
+        <p:nvPr/>
+      </p:nvGrpSpPr>
+      <p:grpSpPr>
+        <a:xfrm>
+          <a:off x="0" y="0"/>
+          <a:ext cx="0" cy="0"/>
+          <a:chOff x="0" y="0"/>
+          <a:chExt cx="0" cy="0"/>
+        </a:xfrm>
+      </p:grpSpPr>
+      <p:sp>
+        <p:nvSpPr>
+          <p:cNvPr id="2" name="Title 1"/>
+          <p:cNvSpPr>
+            <a:spLocks noGrp="1"/>
+          </p:cNvSpPr>
+          <p:nvPr>
+            <p:ph type="title"/>
+          </p:nvPr>
+        </p:nvSpPr>
+        <p:spPr/>
+        <p:txBody>
+          <a:bodyPr/>
+          <a:lstStyle/>
+          <a:p>
+            <a:r>
+              <a:rPr lang="en-US" dirty="0" smtClean="0"/>
+              <a:t>Entity Framework loading</a:t>
+            </a:r>
+            <a:endParaRPr lang="en-US" dirty="0"/>
+          </a:p>
+        </p:txBody>
+      </p:sp>
+      <p:sp>
+        <p:nvSpPr>
+          <p:cNvPr id="3" name="Content Placeholder 2"/>
+          <p:cNvSpPr>
+            <a:spLocks noGrp="1"/>
+          </p:cNvSpPr>
+          <p:nvPr>
+            <p:ph idx="1"/>
+          </p:nvPr>
+        </p:nvSpPr>
+        <p:spPr/>
+        <p:txBody>
+          <a:bodyPr/>
+          <a:lstStyle/>
+          <a:p>
+            <a:r>
+              <a:rPr lang="en-US" dirty="0"/>
+              <a:t>Lazy loading is delaying the loading of related data, until you specifically request for it. </a:t>
+            </a:r>
+            <a:endParaRPr lang="en-US" dirty="0" smtClean="0"/>
+          </a:p>
+          <a:p>
+            <a:r>
+              <a:rPr lang="en-US" dirty="0"/>
+              <a:t>Eager loading is the process whereby a query for one type of entity also loads related entities as part of the query, so that we don't need to execute a separate query for related entities. Eager loading is achieved using the </a:t>
+            </a:r>
+            <a:r>
+              <a:rPr lang="en-US" dirty="0">
+                <a:solidFill>
+                  <a:schemeClr val="accent6"/>
+                </a:solidFill>
+              </a:rPr>
+              <a:t>Include() method</a:t>
+            </a:r>
+            <a:r>
+              <a:rPr lang="en-US" dirty="0"/>
+              <a:t>.</a:t>
+            </a:r>
+          </a:p>
+        </p:txBody>
+      </p:sp>
+    </p:spTree>
+    <p:extLst>
+      <p:ext uri="{BB962C8B-B14F-4D97-AF65-F5344CB8AC3E}">
+        <p14:creationId xmlns:p14="http://schemas.microsoft.com/office/powerpoint/2010/main" val="1623254597"/>
+      </p:ext>
+    </p:extLst>
+  </p:cSld>
+  <p:clrMapOvr>
+    <a:masterClrMapping/>
+  </p:clrMapOvr>
+</p:sld>
+</file>
+
 <file path=ppt/slides/slide2.xml><?xml version="1.0" encoding="utf-8"?>
 <p:sld xmlns:a="http://schemas.openxmlformats.org/drawingml/2006/main" xmlns:r="http://schemas.openxmlformats.org/officeDocument/2006/relationships" xmlns:p="http://schemas.openxmlformats.org/presentationml/2006/main">
   <p:cSld>
@@ -3901,6 +4260,166 @@
     <p:extLst>
       <p:ext uri="{BB962C8B-B14F-4D97-AF65-F5344CB8AC3E}">
         <p14:creationId xmlns:p14="http://schemas.microsoft.com/office/powerpoint/2010/main" val="3266365538"/>
+      </p:ext>
+    </p:extLst>
+  </p:cSld>
+  <p:clrMapOvr>
+    <a:masterClrMapping/>
+  </p:clrMapOvr>
+</p:sld>
+</file>
+
+<file path=ppt/slides/slide9.xml><?xml version="1.0" encoding="utf-8"?>
+<p:sld xmlns:a="http://schemas.openxmlformats.org/drawingml/2006/main" xmlns:r="http://schemas.openxmlformats.org/officeDocument/2006/relationships" xmlns:p="http://schemas.openxmlformats.org/presentationml/2006/main">
+  <p:cSld>
+    <p:spTree>
+      <p:nvGrpSpPr>
+        <p:cNvPr id="1" name=""/>
+        <p:cNvGrpSpPr/>
+        <p:nvPr/>
+      </p:nvGrpSpPr>
+      <p:grpSpPr>
+        <a:xfrm>
+          <a:off x="0" y="0"/>
+          <a:ext cx="0" cy="0"/>
+          <a:chOff x="0" y="0"/>
+          <a:chExt cx="0" cy="0"/>
+        </a:xfrm>
+      </p:grpSpPr>
+      <p:sp>
+        <p:nvSpPr>
+          <p:cNvPr id="2" name="Title 1"/>
+          <p:cNvSpPr>
+            <a:spLocks noGrp="1"/>
+          </p:cNvSpPr>
+          <p:nvPr>
+            <p:ph type="title"/>
+          </p:nvPr>
+        </p:nvSpPr>
+        <p:spPr/>
+        <p:txBody>
+          <a:bodyPr/>
+          <a:lstStyle/>
+          <a:p>
+            <a:r>
+              <a:rPr lang="en-US" dirty="0" smtClean="0"/>
+              <a:t>C# Reference/C# Guide</a:t>
+            </a:r>
+            <a:endParaRPr lang="en-US" dirty="0"/>
+          </a:p>
+        </p:txBody>
+      </p:sp>
+      <p:sp>
+        <p:nvSpPr>
+          <p:cNvPr id="3" name="Content Placeholder 2"/>
+          <p:cNvSpPr>
+            <a:spLocks noGrp="1"/>
+          </p:cNvSpPr>
+          <p:nvPr>
+            <p:ph idx="1"/>
+          </p:nvPr>
+        </p:nvSpPr>
+        <p:spPr/>
+        <p:txBody>
+          <a:bodyPr/>
+          <a:lstStyle/>
+          <a:p>
+            <a:pPr marL="0" indent="0">
+              <a:buNone/>
+            </a:pPr>
+            <a:r>
+              <a:rPr lang="en-US" sz="2000" dirty="0"/>
+              <a:t>C# keywords, operators, special characters, preprocessor directives, compiler options, and compiler errors and warnings</a:t>
+            </a:r>
+            <a:r>
+              <a:rPr lang="en-US" sz="2000" dirty="0" smtClean="0"/>
+              <a:t>.</a:t>
+            </a:r>
+          </a:p>
+          <a:p>
+            <a:pPr marL="0" indent="0">
+              <a:buNone/>
+            </a:pPr>
+            <a:r>
+              <a:rPr lang="en-US" sz="2000" dirty="0">
+                <a:hlinkClick r:id="rId2"/>
+              </a:rPr>
+              <a:t>https://docs.microsoft.com/en-us/dotnet/csharp/language-reference</a:t>
+            </a:r>
+            <a:r>
+              <a:rPr lang="en-US" sz="2000" dirty="0" smtClean="0">
+                <a:hlinkClick r:id="rId2"/>
+              </a:rPr>
+              <a:t>/</a:t>
+            </a:r>
+            <a:endParaRPr lang="en-US" sz="2000" dirty="0" smtClean="0"/>
+          </a:p>
+          <a:p>
+            <a:pPr marL="0" indent="0">
+              <a:buNone/>
+            </a:pPr>
+            <a:r>
+              <a:rPr lang="en-US" sz="2000" dirty="0" smtClean="0"/>
+              <a:t>The </a:t>
+            </a:r>
+            <a:r>
+              <a:rPr lang="en-US" sz="2000" dirty="0"/>
+              <a:t>C# guide provides many resources about the C# language. This site has many different audiences. Depending on your experience with programming, or with the C# language and .NET, you may wish to explore different sections of this guide</a:t>
+            </a:r>
+            <a:r>
+              <a:rPr lang="en-US" sz="2000" dirty="0" smtClean="0"/>
+              <a:t>.</a:t>
+            </a:r>
+          </a:p>
+          <a:p>
+            <a:pPr marL="0" indent="0">
+              <a:buNone/>
+            </a:pPr>
+            <a:r>
+              <a:rPr lang="en-US" sz="2000" dirty="0">
+                <a:hlinkClick r:id="rId3"/>
+              </a:rPr>
+              <a:t>https://</a:t>
+            </a:r>
+            <a:r>
+              <a:rPr lang="en-US" sz="2000" dirty="0" smtClean="0">
+                <a:hlinkClick r:id="rId3"/>
+              </a:rPr>
+              <a:t>docs.microsoft.com/en-us/dotnet/csharp/index</a:t>
+            </a:r>
+            <a:endParaRPr lang="en-US" sz="2000" dirty="0" smtClean="0"/>
+          </a:p>
+          <a:p>
+            <a:r>
+              <a:rPr lang="en-US" sz="2000" dirty="0" smtClean="0"/>
+              <a:t>For brand new developers</a:t>
+            </a:r>
+          </a:p>
+          <a:p>
+            <a:r>
+              <a:rPr lang="en-US" sz="2000" dirty="0" smtClean="0"/>
+              <a:t>For developers new to C#</a:t>
+            </a:r>
+          </a:p>
+          <a:p>
+            <a:r>
+              <a:rPr lang="en-US" sz="2000" dirty="0"/>
+              <a:t>Experienced C# developers:</a:t>
+            </a:r>
+            <a:endParaRPr lang="en-US" sz="2000" dirty="0" smtClean="0"/>
+          </a:p>
+          <a:p>
+            <a:pPr marL="0" indent="0">
+              <a:buNone/>
+            </a:pPr>
+            <a:endParaRPr lang="en-US" dirty="0"/>
+          </a:p>
+        </p:txBody>
+      </p:sp>
+    </p:spTree>
+    <p:extLst>
+      <p:ext uri="{BB962C8B-B14F-4D97-AF65-F5344CB8AC3E}">
+        <p14:creationId xmlns:p14="http://schemas.microsoft.com/office/powerpoint/2010/main" val="2919905854"/>
       </p:ext>
     </p:extLst>
   </p:cSld>

</xml_diff>

<commit_message>
Added NorthWindAzureInsert database script. Updated PowerPoint.
</commit_message>
<xml_diff>
--- a/PowerPoint/Working with Visual Studio.pptx
+++ b/PowerPoint/Working with Visual Studio.pptx
@@ -13,10 +13,14 @@
     <p:sldId id="261" r:id="rId7"/>
     <p:sldId id="262" r:id="rId8"/>
     <p:sldId id="263" r:id="rId9"/>
-    <p:sldId id="264" r:id="rId10"/>
-    <p:sldId id="265" r:id="rId11"/>
-    <p:sldId id="266" r:id="rId12"/>
-    <p:sldId id="267" r:id="rId13"/>
+    <p:sldId id="268" r:id="rId10"/>
+    <p:sldId id="270" r:id="rId11"/>
+    <p:sldId id="269" r:id="rId12"/>
+    <p:sldId id="264" r:id="rId13"/>
+    <p:sldId id="265" r:id="rId14"/>
+    <p:sldId id="266" r:id="rId15"/>
+    <p:sldId id="271" r:id="rId16"/>
+    <p:sldId id="267" r:id="rId17"/>
   </p:sldIdLst>
   <p:sldSz cx="12192000" cy="6858000"/>
   <p:notesSz cx="6858000" cy="9144000"/>
@@ -3079,108 +3083,43 @@
           <a:lstStyle/>
           <a:p>
             <a:r>
-              <a:rPr lang="en-US" b="1" dirty="0" smtClean="0"/>
-              <a:t>ASP.NET Core Documentation</a:t>
+              <a:rPr lang="en-US" dirty="0" smtClean="0"/>
+              <a:t>Generate from usage</a:t>
             </a:r>
             <a:endParaRPr lang="en-US" dirty="0"/>
           </a:p>
         </p:txBody>
       </p:sp>
-      <p:sp>
-        <p:nvSpPr>
-          <p:cNvPr id="3" name="Content Placeholder 2"/>
-          <p:cNvSpPr>
-            <a:spLocks noGrp="1"/>
-          </p:cNvSpPr>
+      <p:pic>
+        <p:nvPicPr>
+          <p:cNvPr id="4" name="Content Placeholder 3"/>
+          <p:cNvPicPr>
+            <a:picLocks noGrp="1" noChangeAspect="1"/>
+          </p:cNvPicPr>
           <p:nvPr>
             <p:ph idx="1"/>
           </p:nvPr>
-        </p:nvSpPr>
-        <p:spPr/>
-        <p:txBody>
-          <a:bodyPr>
-            <a:normAutofit/>
-          </a:bodyPr>
-          <a:lstStyle/>
-          <a:p>
-            <a:pPr marL="0" indent="0">
-              <a:buNone/>
-            </a:pPr>
-            <a:r>
-              <a:rPr lang="en-US" sz="2000" dirty="0"/>
-              <a:t>ASP.NET Core is a new open-source and cross-platform .NET framework for building modern cloud-based web </a:t>
-            </a:r>
-            <a:r>
-              <a:rPr lang="en-US" sz="2000" dirty="0" smtClean="0"/>
-              <a:t>applications </a:t>
-            </a:r>
-            <a:r>
-              <a:rPr lang="en-US" sz="2000" dirty="0"/>
-              <a:t>on Windows, Mac, or Linux</a:t>
-            </a:r>
-            <a:r>
-              <a:rPr lang="en-US" sz="2000" dirty="0" smtClean="0"/>
-              <a:t>.</a:t>
-            </a:r>
-          </a:p>
-          <a:p>
-            <a:pPr marL="0" indent="0">
-              <a:buNone/>
-            </a:pPr>
-            <a:endParaRPr lang="en-US" sz="2000" dirty="0"/>
-          </a:p>
-          <a:p>
-            <a:pPr marL="0" indent="0">
-              <a:buNone/>
-            </a:pPr>
-            <a:r>
-              <a:rPr lang="en-US" sz="2000" dirty="0">
-                <a:hlinkClick r:id="rId2"/>
-              </a:rPr>
-              <a:t>https://docs.microsoft.com/en-us/aspnet/?</a:t>
-            </a:r>
-            <a:r>
-              <a:rPr lang="en-US" sz="2000" dirty="0" smtClean="0">
-                <a:hlinkClick r:id="rId2"/>
-              </a:rPr>
-              <a:t>view=aspnetcore-2.2#pivot=core&amp;panel=core_overview</a:t>
-            </a:r>
-            <a:endParaRPr lang="en-US" sz="2000" dirty="0" smtClean="0"/>
-          </a:p>
-          <a:p>
-            <a:pPr marL="0" indent="0">
-              <a:buNone/>
-            </a:pPr>
-            <a:endParaRPr lang="en-US" sz="2000" dirty="0" smtClean="0"/>
-          </a:p>
-          <a:p>
-            <a:pPr marL="0" indent="0">
-              <a:buNone/>
-            </a:pPr>
-            <a:r>
-              <a:rPr lang="en-US" sz="2000" dirty="0" smtClean="0"/>
-              <a:t>Tutorials</a:t>
-            </a:r>
-            <a:endParaRPr lang="en-US" sz="2000" dirty="0"/>
-          </a:p>
-          <a:p>
-            <a:pPr marL="0" indent="0">
-              <a:buNone/>
-            </a:pPr>
-            <a:r>
-              <a:rPr lang="en-US" sz="2000" dirty="0">
-                <a:hlinkClick r:id="rId3"/>
-              </a:rPr>
-              <a:t>https://www.tutorialspoint.com/asp.net_core/</a:t>
-            </a:r>
-            <a:endParaRPr lang="en-US" sz="2000" dirty="0"/>
-          </a:p>
-        </p:txBody>
-      </p:sp>
+        </p:nvPicPr>
+        <p:blipFill>
+          <a:blip r:embed="rId2"/>
+          <a:stretch>
+            <a:fillRect/>
+          </a:stretch>
+        </p:blipFill>
+        <p:spPr>
+          <a:xfrm>
+            <a:off x="3924571" y="2163199"/>
+            <a:ext cx="4342857" cy="3676190"/>
+          </a:xfrm>
+          <a:prstGeom prst="rect">
+            <a:avLst/>
+          </a:prstGeom>
+        </p:spPr>
+      </p:pic>
     </p:spTree>
     <p:extLst>
       <p:ext uri="{BB962C8B-B14F-4D97-AF65-F5344CB8AC3E}">
-        <p14:creationId xmlns:p14="http://schemas.microsoft.com/office/powerpoint/2010/main" val="857302663"/>
+        <p14:creationId xmlns:p14="http://schemas.microsoft.com/office/powerpoint/2010/main" val="115908612"/>
       </p:ext>
     </p:extLst>
   </p:cSld>
@@ -3224,11 +3163,250 @@
           <a:p>
             <a:r>
               <a:rPr lang="en-US" b="1" dirty="0"/>
-              <a:t>Entity Framework </a:t>
-            </a:r>
+              <a:t>Use </a:t>
+            </a:r>
+            <a:r>
+              <a:rPr lang="en-US" b="1" dirty="0" err="1" smtClean="0"/>
+              <a:t>IntelliTest</a:t>
+            </a:r>
+            <a:endParaRPr lang="en-US" dirty="0"/>
+          </a:p>
+        </p:txBody>
+      </p:sp>
+      <p:pic>
+        <p:nvPicPr>
+          <p:cNvPr id="4" name="Content Placeholder 3"/>
+          <p:cNvPicPr>
+            <a:picLocks noGrp="1" noChangeAspect="1"/>
+          </p:cNvPicPr>
+          <p:nvPr>
+            <p:ph idx="1"/>
+          </p:nvPr>
+        </p:nvPicPr>
+        <p:blipFill>
+          <a:blip r:embed="rId2"/>
+          <a:stretch>
+            <a:fillRect/>
+          </a:stretch>
+        </p:blipFill>
+        <p:spPr>
+          <a:xfrm>
+            <a:off x="2653143" y="2872722"/>
+            <a:ext cx="6885714" cy="2257143"/>
+          </a:xfrm>
+          <a:prstGeom prst="rect">
+            <a:avLst/>
+          </a:prstGeom>
+        </p:spPr>
+      </p:pic>
+    </p:spTree>
+    <p:extLst>
+      <p:ext uri="{BB962C8B-B14F-4D97-AF65-F5344CB8AC3E}">
+        <p14:creationId xmlns:p14="http://schemas.microsoft.com/office/powerpoint/2010/main" val="334540536"/>
+      </p:ext>
+    </p:extLst>
+  </p:cSld>
+  <p:clrMapOvr>
+    <a:masterClrMapping/>
+  </p:clrMapOvr>
+</p:sld>
+</file>
+
+<file path=ppt/slides/slide12.xml><?xml version="1.0" encoding="utf-8"?>
+<p:sld xmlns:a="http://schemas.openxmlformats.org/drawingml/2006/main" xmlns:r="http://schemas.openxmlformats.org/officeDocument/2006/relationships" xmlns:p="http://schemas.openxmlformats.org/presentationml/2006/main">
+  <p:cSld>
+    <p:spTree>
+      <p:nvGrpSpPr>
+        <p:cNvPr id="1" name=""/>
+        <p:cNvGrpSpPr/>
+        <p:nvPr/>
+      </p:nvGrpSpPr>
+      <p:grpSpPr>
+        <a:xfrm>
+          <a:off x="0" y="0"/>
+          <a:ext cx="0" cy="0"/>
+          <a:chOff x="0" y="0"/>
+          <a:chExt cx="0" cy="0"/>
+        </a:xfrm>
+      </p:grpSpPr>
+      <p:sp>
+        <p:nvSpPr>
+          <p:cNvPr id="2" name="Title 1"/>
+          <p:cNvSpPr>
+            <a:spLocks noGrp="1"/>
+          </p:cNvSpPr>
+          <p:nvPr>
+            <p:ph type="title"/>
+          </p:nvPr>
+        </p:nvSpPr>
+        <p:spPr/>
+        <p:txBody>
+          <a:bodyPr/>
+          <a:lstStyle/>
+          <a:p>
+            <a:r>
+              <a:rPr lang="en-US" dirty="0" smtClean="0"/>
+              <a:t>C# Reference/C# Guide</a:t>
+            </a:r>
+            <a:endParaRPr lang="en-US" dirty="0"/>
+          </a:p>
+        </p:txBody>
+      </p:sp>
+      <p:sp>
+        <p:nvSpPr>
+          <p:cNvPr id="3" name="Content Placeholder 2"/>
+          <p:cNvSpPr>
+            <a:spLocks noGrp="1"/>
+          </p:cNvSpPr>
+          <p:nvPr>
+            <p:ph idx="1"/>
+          </p:nvPr>
+        </p:nvSpPr>
+        <p:spPr/>
+        <p:txBody>
+          <a:bodyPr/>
+          <a:lstStyle/>
+          <a:p>
+            <a:pPr marL="0" indent="0">
+              <a:buNone/>
+            </a:pPr>
+            <a:r>
+              <a:rPr lang="en-US" sz="2000" dirty="0"/>
+              <a:t>C# keywords, operators, special characters, preprocessor directives, compiler options, and compiler errors and warnings</a:t>
+            </a:r>
+            <a:r>
+              <a:rPr lang="en-US" sz="2000" dirty="0" smtClean="0"/>
+              <a:t>.</a:t>
+            </a:r>
+          </a:p>
+          <a:p>
+            <a:pPr marL="0" indent="0">
+              <a:buNone/>
+            </a:pPr>
+            <a:r>
+              <a:rPr lang="en-US" sz="2000" dirty="0">
+                <a:hlinkClick r:id="rId2"/>
+              </a:rPr>
+              <a:t>https://docs.microsoft.com/en-us/dotnet/csharp/language-reference</a:t>
+            </a:r>
+            <a:r>
+              <a:rPr lang="en-US" sz="2000" dirty="0" smtClean="0">
+                <a:hlinkClick r:id="rId2"/>
+              </a:rPr>
+              <a:t>/</a:t>
+            </a:r>
+            <a:endParaRPr lang="en-US" sz="2000" dirty="0" smtClean="0"/>
+          </a:p>
+          <a:p>
+            <a:pPr marL="0" indent="0">
+              <a:buNone/>
+            </a:pPr>
+            <a:r>
+              <a:rPr lang="en-US" sz="2000" dirty="0" smtClean="0"/>
+              <a:t>The </a:t>
+            </a:r>
+            <a:r>
+              <a:rPr lang="en-US" sz="2000" dirty="0"/>
+              <a:t>C# guide provides many resources about the C# language. This site has many different audiences. Depending on your experience with programming, or with the C# language and .NET, you may wish to explore different sections of this guide</a:t>
+            </a:r>
+            <a:r>
+              <a:rPr lang="en-US" sz="2000" dirty="0" smtClean="0"/>
+              <a:t>.</a:t>
+            </a:r>
+          </a:p>
+          <a:p>
+            <a:pPr marL="0" indent="0">
+              <a:buNone/>
+            </a:pPr>
+            <a:r>
+              <a:rPr lang="en-US" sz="2000" dirty="0">
+                <a:hlinkClick r:id="rId3"/>
+              </a:rPr>
+              <a:t>https://</a:t>
+            </a:r>
+            <a:r>
+              <a:rPr lang="en-US" sz="2000" dirty="0" smtClean="0">
+                <a:hlinkClick r:id="rId3"/>
+              </a:rPr>
+              <a:t>docs.microsoft.com/en-us/dotnet/csharp/index</a:t>
+            </a:r>
+            <a:endParaRPr lang="en-US" sz="2000" dirty="0" smtClean="0"/>
+          </a:p>
+          <a:p>
+            <a:r>
+              <a:rPr lang="en-US" sz="2000" dirty="0" smtClean="0"/>
+              <a:t>For brand new developers</a:t>
+            </a:r>
+          </a:p>
+          <a:p>
+            <a:r>
+              <a:rPr lang="en-US" sz="2000" dirty="0" smtClean="0"/>
+              <a:t>For developers new to C#</a:t>
+            </a:r>
+          </a:p>
+          <a:p>
+            <a:r>
+              <a:rPr lang="en-US" sz="2000" dirty="0"/>
+              <a:t>Experienced C# developers:</a:t>
+            </a:r>
+            <a:endParaRPr lang="en-US" sz="2000" dirty="0" smtClean="0"/>
+          </a:p>
+          <a:p>
+            <a:pPr marL="0" indent="0">
+              <a:buNone/>
+            </a:pPr>
+            <a:endParaRPr lang="en-US" dirty="0"/>
+          </a:p>
+        </p:txBody>
+      </p:sp>
+    </p:spTree>
+    <p:extLst>
+      <p:ext uri="{BB962C8B-B14F-4D97-AF65-F5344CB8AC3E}">
+        <p14:creationId xmlns:p14="http://schemas.microsoft.com/office/powerpoint/2010/main" val="2919905854"/>
+      </p:ext>
+    </p:extLst>
+  </p:cSld>
+  <p:clrMapOvr>
+    <a:masterClrMapping/>
+  </p:clrMapOvr>
+</p:sld>
+</file>
+
+<file path=ppt/slides/slide13.xml><?xml version="1.0" encoding="utf-8"?>
+<p:sld xmlns:a="http://schemas.openxmlformats.org/drawingml/2006/main" xmlns:r="http://schemas.openxmlformats.org/officeDocument/2006/relationships" xmlns:p="http://schemas.openxmlformats.org/presentationml/2006/main">
+  <p:cSld>
+    <p:spTree>
+      <p:nvGrpSpPr>
+        <p:cNvPr id="1" name=""/>
+        <p:cNvGrpSpPr/>
+        <p:nvPr/>
+      </p:nvGrpSpPr>
+      <p:grpSpPr>
+        <a:xfrm>
+          <a:off x="0" y="0"/>
+          <a:ext cx="0" cy="0"/>
+          <a:chOff x="0" y="0"/>
+          <a:chExt cx="0" cy="0"/>
+        </a:xfrm>
+      </p:grpSpPr>
+      <p:sp>
+        <p:nvSpPr>
+          <p:cNvPr id="2" name="Title 1"/>
+          <p:cNvSpPr>
+            <a:spLocks noGrp="1"/>
+          </p:cNvSpPr>
+          <p:nvPr>
+            <p:ph type="title"/>
+          </p:nvPr>
+        </p:nvSpPr>
+        <p:spPr/>
+        <p:txBody>
+          <a:bodyPr/>
+          <a:lstStyle/>
+          <a:p>
             <a:r>
               <a:rPr lang="en-US" b="1" dirty="0" smtClean="0"/>
-              <a:t>Documentation</a:t>
+              <a:t>ASP.NET Core Documentation</a:t>
             </a:r>
             <a:endParaRPr lang="en-US" dirty="0"/>
           </a:p>
@@ -3256,7 +3434,15 @@
             </a:pPr>
             <a:r>
               <a:rPr lang="en-US" sz="2000" dirty="0"/>
-              <a:t>Entity Framework is an object-relational mapper (O/RM) that enables .NET developers to work with a database using .NET objects. It eliminates the need for most of the data-access code that developers usually need to write</a:t>
+              <a:t>ASP.NET Core is a new open-source and cross-platform .NET framework for building modern cloud-based web </a:t>
+            </a:r>
+            <a:r>
+              <a:rPr lang="en-US" sz="2000" dirty="0" smtClean="0"/>
+              <a:t>applications </a:t>
+            </a:r>
+            <a:r>
+              <a:rPr lang="en-US" sz="2000" dirty="0"/>
+              <a:t>on Windows, Mac, or Linux</a:t>
             </a:r>
             <a:r>
               <a:rPr lang="en-US" sz="2000" dirty="0" smtClean="0"/>
@@ -3274,12 +3460,152 @@
               <a:buNone/>
             </a:pPr>
             <a:r>
-              <a:rPr lang="en-US" sz="2000">
+              <a:rPr lang="en-US" sz="2000" dirty="0">
+                <a:hlinkClick r:id="rId2"/>
+              </a:rPr>
+              <a:t>https://docs.microsoft.com/en-us/aspnet/?</a:t>
+            </a:r>
+            <a:r>
+              <a:rPr lang="en-US" sz="2000" dirty="0" smtClean="0">
+                <a:hlinkClick r:id="rId2"/>
+              </a:rPr>
+              <a:t>view=aspnetcore-2.2#pivot=core&amp;panel=core_overview</a:t>
+            </a:r>
+            <a:endParaRPr lang="en-US" sz="2000" dirty="0" smtClean="0"/>
+          </a:p>
+          <a:p>
+            <a:pPr marL="0" indent="0">
+              <a:buNone/>
+            </a:pPr>
+            <a:endParaRPr lang="en-US" sz="2000" dirty="0" smtClean="0"/>
+          </a:p>
+          <a:p>
+            <a:pPr marL="0" indent="0">
+              <a:buNone/>
+            </a:pPr>
+            <a:r>
+              <a:rPr lang="en-US" sz="2000" dirty="0" smtClean="0"/>
+              <a:t>Tutorials</a:t>
+            </a:r>
+            <a:endParaRPr lang="en-US" sz="2000" dirty="0"/>
+          </a:p>
+          <a:p>
+            <a:pPr marL="0" indent="0">
+              <a:buNone/>
+            </a:pPr>
+            <a:r>
+              <a:rPr lang="en-US" sz="2000" dirty="0">
+                <a:hlinkClick r:id="rId3"/>
+              </a:rPr>
+              <a:t>https://www.tutorialspoint.com/asp.net_core/</a:t>
+            </a:r>
+            <a:endParaRPr lang="en-US" sz="2000" dirty="0"/>
+          </a:p>
+        </p:txBody>
+      </p:sp>
+    </p:spTree>
+    <p:extLst>
+      <p:ext uri="{BB962C8B-B14F-4D97-AF65-F5344CB8AC3E}">
+        <p14:creationId xmlns:p14="http://schemas.microsoft.com/office/powerpoint/2010/main" val="857302663"/>
+      </p:ext>
+    </p:extLst>
+  </p:cSld>
+  <p:clrMapOvr>
+    <a:masterClrMapping/>
+  </p:clrMapOvr>
+</p:sld>
+</file>
+
+<file path=ppt/slides/slide14.xml><?xml version="1.0" encoding="utf-8"?>
+<p:sld xmlns:a="http://schemas.openxmlformats.org/drawingml/2006/main" xmlns:r="http://schemas.openxmlformats.org/officeDocument/2006/relationships" xmlns:p="http://schemas.openxmlformats.org/presentationml/2006/main">
+  <p:cSld>
+    <p:spTree>
+      <p:nvGrpSpPr>
+        <p:cNvPr id="1" name=""/>
+        <p:cNvGrpSpPr/>
+        <p:nvPr/>
+      </p:nvGrpSpPr>
+      <p:grpSpPr>
+        <a:xfrm>
+          <a:off x="0" y="0"/>
+          <a:ext cx="0" cy="0"/>
+          <a:chOff x="0" y="0"/>
+          <a:chExt cx="0" cy="0"/>
+        </a:xfrm>
+      </p:grpSpPr>
+      <p:sp>
+        <p:nvSpPr>
+          <p:cNvPr id="2" name="Title 1"/>
+          <p:cNvSpPr>
+            <a:spLocks noGrp="1"/>
+          </p:cNvSpPr>
+          <p:nvPr>
+            <p:ph type="title"/>
+          </p:nvPr>
+        </p:nvSpPr>
+        <p:spPr/>
+        <p:txBody>
+          <a:bodyPr/>
+          <a:lstStyle/>
+          <a:p>
+            <a:r>
+              <a:rPr lang="en-US" b="1" dirty="0"/>
+              <a:t>Entity Framework </a:t>
+            </a:r>
+            <a:r>
+              <a:rPr lang="en-US" b="1" dirty="0" smtClean="0"/>
+              <a:t>Documentation</a:t>
+            </a:r>
+            <a:endParaRPr lang="en-US" dirty="0"/>
+          </a:p>
+        </p:txBody>
+      </p:sp>
+      <p:sp>
+        <p:nvSpPr>
+          <p:cNvPr id="3" name="Content Placeholder 2"/>
+          <p:cNvSpPr>
+            <a:spLocks noGrp="1"/>
+          </p:cNvSpPr>
+          <p:nvPr>
+            <p:ph idx="1"/>
+          </p:nvPr>
+        </p:nvSpPr>
+        <p:spPr/>
+        <p:txBody>
+          <a:bodyPr>
+            <a:normAutofit/>
+          </a:bodyPr>
+          <a:lstStyle/>
+          <a:p>
+            <a:pPr marL="0" indent="0">
+              <a:buNone/>
+            </a:pPr>
+            <a:r>
+              <a:rPr lang="en-US" sz="2000" dirty="0"/>
+              <a:t>Entity Framework is an object-relational mapper (O/RM) that enables .NET developers to work with a database using .NET objects. It eliminates the need for most of the data-access code that developers usually need to write</a:t>
+            </a:r>
+            <a:r>
+              <a:rPr lang="en-US" sz="2000" dirty="0" smtClean="0"/>
+              <a:t>.</a:t>
+            </a:r>
+          </a:p>
+          <a:p>
+            <a:pPr marL="0" indent="0">
+              <a:buNone/>
+            </a:pPr>
+            <a:endParaRPr lang="en-US" sz="2000" dirty="0"/>
+          </a:p>
+          <a:p>
+            <a:pPr marL="0" indent="0">
+              <a:buNone/>
+            </a:pPr>
+            <a:r>
+              <a:rPr lang="en-US" sz="2000" dirty="0">
                 <a:hlinkClick r:id="rId2"/>
               </a:rPr>
               <a:t>https://docs.microsoft.com/en-us/ef/#pivot=entityfmwk&amp;panel=entityfmwk1</a:t>
             </a:r>
-            <a:endParaRPr lang="en-US" sz="2000" smtClean="0"/>
+            <a:endParaRPr lang="en-US" sz="2000" dirty="0" smtClean="0"/>
           </a:p>
           <a:p>
             <a:pPr marL="0" indent="0">
@@ -3302,7 +3628,75 @@
 </p:sld>
 </file>
 
-<file path=ppt/slides/slide12.xml><?xml version="1.0" encoding="utf-8"?>
+<file path=ppt/slides/slide15.xml><?xml version="1.0" encoding="utf-8"?>
+<p:sld xmlns:a="http://schemas.openxmlformats.org/drawingml/2006/main" xmlns:r="http://schemas.openxmlformats.org/officeDocument/2006/relationships" xmlns:p="http://schemas.openxmlformats.org/presentationml/2006/main">
+  <p:cSld>
+    <p:spTree>
+      <p:nvGrpSpPr>
+        <p:cNvPr id="1" name=""/>
+        <p:cNvGrpSpPr/>
+        <p:nvPr/>
+      </p:nvGrpSpPr>
+      <p:grpSpPr>
+        <a:xfrm>
+          <a:off x="0" y="0"/>
+          <a:ext cx="0" cy="0"/>
+          <a:chOff x="0" y="0"/>
+          <a:chExt cx="0" cy="0"/>
+        </a:xfrm>
+      </p:grpSpPr>
+      <p:sp>
+        <p:nvSpPr>
+          <p:cNvPr id="2" name="Title 1"/>
+          <p:cNvSpPr>
+            <a:spLocks noGrp="1"/>
+          </p:cNvSpPr>
+          <p:nvPr>
+            <p:ph type="title"/>
+          </p:nvPr>
+        </p:nvSpPr>
+        <p:spPr/>
+        <p:txBody>
+          <a:bodyPr/>
+          <a:lstStyle/>
+          <a:p>
+            <a:endParaRPr lang="en-US"/>
+          </a:p>
+        </p:txBody>
+      </p:sp>
+      <p:sp>
+        <p:nvSpPr>
+          <p:cNvPr id="3" name="Content Placeholder 2"/>
+          <p:cNvSpPr>
+            <a:spLocks noGrp="1"/>
+          </p:cNvSpPr>
+          <p:nvPr>
+            <p:ph idx="1"/>
+          </p:nvPr>
+        </p:nvSpPr>
+        <p:spPr/>
+        <p:txBody>
+          <a:bodyPr/>
+          <a:lstStyle/>
+          <a:p>
+            <a:endParaRPr lang="en-US"/>
+          </a:p>
+        </p:txBody>
+      </p:sp>
+    </p:spTree>
+    <p:extLst>
+      <p:ext uri="{BB962C8B-B14F-4D97-AF65-F5344CB8AC3E}">
+        <p14:creationId xmlns:p14="http://schemas.microsoft.com/office/powerpoint/2010/main" val="3447704533"/>
+      </p:ext>
+    </p:extLst>
+  </p:cSld>
+  <p:clrMapOvr>
+    <a:masterClrMapping/>
+  </p:clrMapOvr>
+</p:sld>
+</file>
+
+<file path=ppt/slides/slide16.xml><?xml version="1.0" encoding="utf-8"?>
 <p:sld xmlns:a="http://schemas.openxmlformats.org/drawingml/2006/main" xmlns:r="http://schemas.openxmlformats.org/officeDocument/2006/relationships" xmlns:p="http://schemas.openxmlformats.org/presentationml/2006/main">
   <p:cSld>
     <p:spTree>
@@ -4298,12 +4692,22 @@
         </p:nvSpPr>
         <p:spPr/>
         <p:txBody>
-          <a:bodyPr/>
-          <a:lstStyle/>
-          <a:p>
-            <a:r>
-              <a:rPr lang="en-US" dirty="0" smtClean="0"/>
-              <a:t>C# Reference/C# Guide</a:t>
+          <a:bodyPr>
+            <a:normAutofit/>
+          </a:bodyPr>
+          <a:lstStyle/>
+          <a:p>
+            <a:r>
+              <a:rPr lang="en-US" b="1" dirty="0" smtClean="0"/>
+              <a:t>Create </a:t>
+            </a:r>
+            <a:r>
+              <a:rPr lang="en-US" b="1" dirty="0"/>
+              <a:t>and run unit tests for managed </a:t>
+            </a:r>
+            <a:r>
+              <a:rPr lang="en-US" b="1" dirty="0" smtClean="0"/>
+              <a:t>code</a:t>
             </a:r>
             <a:endParaRPr lang="en-US" dirty="0"/>
           </a:p>
@@ -4321,7 +4725,9 @@
         </p:nvSpPr>
         <p:spPr/>
         <p:txBody>
-          <a:bodyPr/>
+          <a:bodyPr>
+            <a:normAutofit/>
+          </a:bodyPr>
           <a:lstStyle/>
           <a:p>
             <a:pPr marL="0" indent="0">
@@ -4329,7 +4735,15 @@
             </a:pPr>
             <a:r>
               <a:rPr lang="en-US" sz="2000" dirty="0"/>
-              <a:t>C# keywords, operators, special characters, preprocessor directives, compiler options, and compiler errors and warnings</a:t>
+              <a:t>This article steps you through creating, running, and customizing a series of unit tests using the Microsoft unit test framework for managed code and Visual Studio </a:t>
+            </a:r>
+            <a:r>
+              <a:rPr lang="en-US" sz="2000" b="1" dirty="0"/>
+              <a:t>Test Explorer</a:t>
+            </a:r>
+            <a:r>
+              <a:rPr lang="en-US" sz="2000" dirty="0"/>
+              <a:t>. You start with a C# project that is under development, create tests that exercise its code, run the tests, and examine the results. Then you change the project code and rerun the tests</a:t>
             </a:r>
             <a:r>
               <a:rPr lang="en-US" sz="2000" dirty="0" smtClean="0"/>
@@ -4344,82 +4758,16 @@
               <a:rPr lang="en-US" sz="2000" dirty="0">
                 <a:hlinkClick r:id="rId2"/>
               </a:rPr>
-              <a:t>https://docs.microsoft.com/en-us/dotnet/csharp/language-reference</a:t>
-            </a:r>
-            <a:r>
-              <a:rPr lang="en-US" sz="2000" dirty="0" smtClean="0">
-                <a:hlinkClick r:id="rId2"/>
-              </a:rPr>
-              <a:t>/</a:t>
-            </a:r>
-            <a:endParaRPr lang="en-US" sz="2000" dirty="0" smtClean="0"/>
-          </a:p>
-          <a:p>
-            <a:pPr marL="0" indent="0">
-              <a:buNone/>
-            </a:pPr>
-            <a:r>
-              <a:rPr lang="en-US" sz="2000" dirty="0" smtClean="0"/>
-              <a:t>The </a:t>
-            </a:r>
-            <a:r>
-              <a:rPr lang="en-US" sz="2000" dirty="0"/>
-              <a:t>C# guide provides many resources about the C# language. This site has many different audiences. Depending on your experience with programming, or with the C# language and .NET, you may wish to explore different sections of this guide</a:t>
-            </a:r>
-            <a:r>
-              <a:rPr lang="en-US" sz="2000" dirty="0" smtClean="0"/>
-              <a:t>.</a:t>
-            </a:r>
-          </a:p>
-          <a:p>
-            <a:pPr marL="0" indent="0">
-              <a:buNone/>
-            </a:pPr>
-            <a:r>
-              <a:rPr lang="en-US" sz="2000" dirty="0">
-                <a:hlinkClick r:id="rId3"/>
-              </a:rPr>
-              <a:t>https://</a:t>
-            </a:r>
-            <a:r>
-              <a:rPr lang="en-US" sz="2000" dirty="0" smtClean="0">
-                <a:hlinkClick r:id="rId3"/>
-              </a:rPr>
-              <a:t>docs.microsoft.com/en-us/dotnet/csharp/index</a:t>
-            </a:r>
-            <a:endParaRPr lang="en-US" sz="2000" dirty="0" smtClean="0"/>
-          </a:p>
-          <a:p>
-            <a:r>
-              <a:rPr lang="en-US" sz="2000" dirty="0" smtClean="0"/>
-              <a:t>For brand new developers</a:t>
-            </a:r>
-          </a:p>
-          <a:p>
-            <a:r>
-              <a:rPr lang="en-US" sz="2000" dirty="0" smtClean="0"/>
-              <a:t>For developers new to C#</a:t>
-            </a:r>
-          </a:p>
-          <a:p>
-            <a:r>
-              <a:rPr lang="en-US" sz="2000" dirty="0"/>
-              <a:t>Experienced C# developers:</a:t>
-            </a:r>
-            <a:endParaRPr lang="en-US" sz="2000" dirty="0" smtClean="0"/>
-          </a:p>
-          <a:p>
-            <a:pPr marL="0" indent="0">
-              <a:buNone/>
-            </a:pPr>
-            <a:endParaRPr lang="en-US" dirty="0"/>
+              <a:t>https://docs.microsoft.com/en-us/visualstudio/test/walkthrough-creating-and-running-unit-tests-for-managed-code?view=vs-2019</a:t>
+            </a:r>
+            <a:endParaRPr lang="en-US" sz="2000" dirty="0"/>
           </a:p>
         </p:txBody>
       </p:sp>
     </p:spTree>
     <p:extLst>
       <p:ext uri="{BB962C8B-B14F-4D97-AF65-F5344CB8AC3E}">
-        <p14:creationId xmlns:p14="http://schemas.microsoft.com/office/powerpoint/2010/main" val="2919905854"/>
+        <p14:creationId xmlns:p14="http://schemas.microsoft.com/office/powerpoint/2010/main" val="2966917900"/>
       </p:ext>
     </p:extLst>
   </p:cSld>

</xml_diff>

<commit_message>
Bunch of changes related to EF demo code in unit test.
</commit_message>
<xml_diff>
--- a/PowerPoint/Working with Visual Studio.pptx
+++ b/PowerPoint/Working with Visual Studio.pptx
@@ -20,7 +20,12 @@
     <p:sldId id="265" r:id="rId14"/>
     <p:sldId id="266" r:id="rId15"/>
     <p:sldId id="271" r:id="rId16"/>
-    <p:sldId id="267" r:id="rId17"/>
+    <p:sldId id="272" r:id="rId17"/>
+    <p:sldId id="273" r:id="rId18"/>
+    <p:sldId id="275" r:id="rId19"/>
+    <p:sldId id="274" r:id="rId20"/>
+    <p:sldId id="267" r:id="rId21"/>
+    <p:sldId id="276" r:id="rId22"/>
   </p:sldIdLst>
   <p:sldSz cx="12192000" cy="6858000"/>
   <p:notesSz cx="6858000" cy="9144000"/>
@@ -3660,7 +3665,19 @@
           <a:bodyPr/>
           <a:lstStyle/>
           <a:p>
-            <a:endParaRPr lang="en-US"/>
+            <a:r>
+              <a:rPr lang="en-US" dirty="0" smtClean="0"/>
+              <a:t>Entity </a:t>
+            </a:r>
+            <a:r>
+              <a:rPr lang="en-US" dirty="0" err="1" smtClean="0"/>
+              <a:t>Frameowork</a:t>
+            </a:r>
+            <a:r>
+              <a:rPr lang="en-US" dirty="0" smtClean="0"/>
+              <a:t> Reading data (simple)</a:t>
+            </a:r>
+            <a:endParaRPr lang="en-US" dirty="0"/>
           </a:p>
         </p:txBody>
       </p:sp>
@@ -3679,10 +3696,43 @@
           <a:bodyPr/>
           <a:lstStyle/>
           <a:p>
-            <a:endParaRPr lang="en-US"/>
-          </a:p>
-        </p:txBody>
-      </p:sp>
+            <a:r>
+              <a:rPr lang="en-US" dirty="0" smtClean="0"/>
+              <a:t>Read data by primary key</a:t>
+            </a:r>
+          </a:p>
+          <a:p>
+            <a:pPr marL="0" indent="0">
+              <a:buNone/>
+            </a:pPr>
+            <a:endParaRPr lang="en-US" dirty="0"/>
+          </a:p>
+        </p:txBody>
+      </p:sp>
+      <p:pic>
+        <p:nvPicPr>
+          <p:cNvPr id="4" name="Picture 3"/>
+          <p:cNvPicPr>
+            <a:picLocks noChangeAspect="1"/>
+          </p:cNvPicPr>
+          <p:nvPr/>
+        </p:nvPicPr>
+        <p:blipFill>
+          <a:blip r:embed="rId2"/>
+          <a:stretch>
+            <a:fillRect/>
+          </a:stretch>
+        </p:blipFill>
+        <p:spPr>
+          <a:xfrm>
+            <a:off x="2014602" y="2473638"/>
+            <a:ext cx="8028571" cy="2447619"/>
+          </a:xfrm>
+          <a:prstGeom prst="rect">
+            <a:avLst/>
+          </a:prstGeom>
+        </p:spPr>
+      </p:pic>
     </p:spTree>
     <p:extLst>
       <p:ext uri="{BB962C8B-B14F-4D97-AF65-F5344CB8AC3E}">
@@ -3730,7 +3780,7 @@
           <a:p>
             <a:r>
               <a:rPr lang="en-US" dirty="0" smtClean="0"/>
-              <a:t>Entity Framework loading</a:t>
+              <a:t>Entity Framework Read taking control</a:t>
             </a:r>
             <a:endParaRPr lang="en-US" dirty="0"/>
           </a:p>
@@ -3752,35 +3802,346 @@
           <a:lstStyle/>
           <a:p>
             <a:r>
-              <a:rPr lang="en-US" dirty="0"/>
-              <a:t>Lazy loading is delaying the loading of related data, until you specifically request for it. </a:t>
-            </a:r>
-            <a:endParaRPr lang="en-US" dirty="0" smtClean="0"/>
-          </a:p>
-          <a:p>
-            <a:r>
-              <a:rPr lang="en-US" dirty="0"/>
-              <a:t>Eager loading is the process whereby a query for one type of entity also loads related entities as part of the query, so that we don't need to execute a separate query for related entities. Eager loading is achieved using the </a:t>
-            </a:r>
-            <a:r>
-              <a:rPr lang="en-US" dirty="0">
-                <a:solidFill>
-                  <a:schemeClr val="accent6"/>
-                </a:solidFill>
-              </a:rPr>
-              <a:t>Include() method</a:t>
-            </a:r>
-            <a:r>
-              <a:rPr lang="en-US" dirty="0"/>
-              <a:t>.</a:t>
-            </a:r>
-          </a:p>
-        </p:txBody>
-      </p:sp>
+              <a:rPr lang="en-US" dirty="0" smtClean="0"/>
+              <a:t>Loading navigation properties</a:t>
+            </a:r>
+          </a:p>
+          <a:p>
+            <a:pPr marL="0" indent="0">
+              <a:buNone/>
+            </a:pPr>
+            <a:endParaRPr lang="en-US" dirty="0"/>
+          </a:p>
+        </p:txBody>
+      </p:sp>
+      <p:pic>
+        <p:nvPicPr>
+          <p:cNvPr id="4" name="Picture 3"/>
+          <p:cNvPicPr>
+            <a:picLocks noChangeAspect="1"/>
+          </p:cNvPicPr>
+          <p:nvPr/>
+        </p:nvPicPr>
+        <p:blipFill>
+          <a:blip r:embed="rId2"/>
+          <a:stretch>
+            <a:fillRect/>
+          </a:stretch>
+        </p:blipFill>
+        <p:spPr>
+          <a:xfrm>
+            <a:off x="2076952" y="2523505"/>
+            <a:ext cx="8038095" cy="2666667"/>
+          </a:xfrm>
+          <a:prstGeom prst="rect">
+            <a:avLst/>
+          </a:prstGeom>
+        </p:spPr>
+      </p:pic>
     </p:spTree>
     <p:extLst>
       <p:ext uri="{BB962C8B-B14F-4D97-AF65-F5344CB8AC3E}">
-        <p14:creationId xmlns:p14="http://schemas.microsoft.com/office/powerpoint/2010/main" val="1623254597"/>
+        <p14:creationId xmlns:p14="http://schemas.microsoft.com/office/powerpoint/2010/main" val="516452176"/>
+      </p:ext>
+    </p:extLst>
+  </p:cSld>
+  <p:clrMapOvr>
+    <a:masterClrMapping/>
+  </p:clrMapOvr>
+</p:sld>
+</file>
+
+<file path=ppt/slides/slide17.xml><?xml version="1.0" encoding="utf-8"?>
+<p:sld xmlns:a="http://schemas.openxmlformats.org/drawingml/2006/main" xmlns:r="http://schemas.openxmlformats.org/officeDocument/2006/relationships" xmlns:p="http://schemas.openxmlformats.org/presentationml/2006/main">
+  <p:cSld>
+    <p:spTree>
+      <p:nvGrpSpPr>
+        <p:cNvPr id="1" name=""/>
+        <p:cNvGrpSpPr/>
+        <p:nvPr/>
+      </p:nvGrpSpPr>
+      <p:grpSpPr>
+        <a:xfrm>
+          <a:off x="0" y="0"/>
+          <a:ext cx="0" cy="0"/>
+          <a:chOff x="0" y="0"/>
+          <a:chExt cx="0" cy="0"/>
+        </a:xfrm>
+      </p:grpSpPr>
+      <p:sp>
+        <p:nvSpPr>
+          <p:cNvPr id="2" name="Title 1"/>
+          <p:cNvSpPr>
+            <a:spLocks noGrp="1"/>
+          </p:cNvSpPr>
+          <p:nvPr>
+            <p:ph type="title"/>
+          </p:nvPr>
+        </p:nvSpPr>
+        <p:spPr/>
+        <p:txBody>
+          <a:bodyPr/>
+          <a:lstStyle/>
+          <a:p>
+            <a:r>
+              <a:rPr lang="en-US" dirty="0" smtClean="0"/>
+              <a:t>Entity Framework joins</a:t>
+            </a:r>
+            <a:endParaRPr lang="en-US" dirty="0"/>
+          </a:p>
+        </p:txBody>
+      </p:sp>
+      <p:pic>
+        <p:nvPicPr>
+          <p:cNvPr id="4" name="Content Placeholder 3"/>
+          <p:cNvPicPr>
+            <a:picLocks noGrp="1" noChangeAspect="1"/>
+          </p:cNvPicPr>
+          <p:nvPr>
+            <p:ph idx="1"/>
+          </p:nvPr>
+        </p:nvPicPr>
+        <p:blipFill>
+          <a:blip r:embed="rId2"/>
+          <a:stretch>
+            <a:fillRect/>
+          </a:stretch>
+        </p:blipFill>
+        <p:spPr>
+          <a:xfrm>
+            <a:off x="2720886" y="1825625"/>
+            <a:ext cx="6750228" cy="4351338"/>
+          </a:xfrm>
+          <a:prstGeom prst="rect">
+            <a:avLst/>
+          </a:prstGeom>
+        </p:spPr>
+      </p:pic>
+    </p:spTree>
+    <p:extLst>
+      <p:ext uri="{BB962C8B-B14F-4D97-AF65-F5344CB8AC3E}">
+        <p14:creationId xmlns:p14="http://schemas.microsoft.com/office/powerpoint/2010/main" val="714560842"/>
+      </p:ext>
+    </p:extLst>
+  </p:cSld>
+  <p:clrMapOvr>
+    <a:masterClrMapping/>
+  </p:clrMapOvr>
+</p:sld>
+</file>
+
+<file path=ppt/slides/slide18.xml><?xml version="1.0" encoding="utf-8"?>
+<p:sld xmlns:a="http://schemas.openxmlformats.org/drawingml/2006/main" xmlns:r="http://schemas.openxmlformats.org/officeDocument/2006/relationships" xmlns:p="http://schemas.openxmlformats.org/presentationml/2006/main">
+  <p:cSld>
+    <p:spTree>
+      <p:nvGrpSpPr>
+        <p:cNvPr id="1" name=""/>
+        <p:cNvGrpSpPr/>
+        <p:nvPr/>
+      </p:nvGrpSpPr>
+      <p:grpSpPr>
+        <a:xfrm>
+          <a:off x="0" y="0"/>
+          <a:ext cx="0" cy="0"/>
+          <a:chOff x="0" y="0"/>
+          <a:chExt cx="0" cy="0"/>
+        </a:xfrm>
+      </p:grpSpPr>
+      <p:sp>
+        <p:nvSpPr>
+          <p:cNvPr id="2" name="Title 1"/>
+          <p:cNvSpPr>
+            <a:spLocks noGrp="1"/>
+          </p:cNvSpPr>
+          <p:nvPr>
+            <p:ph type="title"/>
+          </p:nvPr>
+        </p:nvSpPr>
+        <p:spPr/>
+        <p:txBody>
+          <a:bodyPr/>
+          <a:lstStyle/>
+          <a:p>
+            <a:r>
+              <a:rPr lang="en-US" dirty="0" smtClean="0"/>
+              <a:t>Entity Framework Tracking vs No-Tracking</a:t>
+            </a:r>
+            <a:endParaRPr lang="en-US" dirty="0"/>
+          </a:p>
+        </p:txBody>
+      </p:sp>
+      <p:sp>
+        <p:nvSpPr>
+          <p:cNvPr id="3" name="Content Placeholder 2"/>
+          <p:cNvSpPr>
+            <a:spLocks noGrp="1"/>
+          </p:cNvSpPr>
+          <p:nvPr>
+            <p:ph idx="1"/>
+          </p:nvPr>
+        </p:nvSpPr>
+        <p:spPr/>
+        <p:txBody>
+          <a:bodyPr>
+            <a:normAutofit/>
+          </a:bodyPr>
+          <a:lstStyle/>
+          <a:p>
+            <a:pPr marL="0" indent="0">
+              <a:buNone/>
+            </a:pPr>
+            <a:r>
+              <a:rPr lang="en-US" sz="2000" dirty="0"/>
+              <a:t>Tracking behavior controls whether or not Entity Framework Core will keep information about an entity instance in its change tracker. If an entity is tracked, any changes detected in the entity will be persisted to the database during </a:t>
+            </a:r>
+            <a:r>
+              <a:rPr lang="en-US" sz="2000" dirty="0" err="1"/>
+              <a:t>SaveChanges</a:t>
+            </a:r>
+            <a:r>
+              <a:rPr lang="en-US" sz="2000" dirty="0"/>
+              <a:t>(). Entity Framework Core will also fix-up navigation properties between entities that are obtained from a tracking query and entities that were previously loaded into </a:t>
+            </a:r>
+            <a:r>
+              <a:rPr lang="en-US" sz="2000" dirty="0" smtClean="0"/>
+              <a:t>the </a:t>
+            </a:r>
+            <a:r>
+              <a:rPr lang="en-US" sz="2000" dirty="0" err="1"/>
+              <a:t>DbContext</a:t>
+            </a:r>
+            <a:r>
+              <a:rPr lang="en-US" sz="2000" dirty="0"/>
+              <a:t> instance</a:t>
+            </a:r>
+            <a:r>
+              <a:rPr lang="en-US" sz="2000" dirty="0" smtClean="0"/>
+              <a:t>.</a:t>
+            </a:r>
+          </a:p>
+          <a:p>
+            <a:pPr marL="0" indent="0">
+              <a:buNone/>
+            </a:pPr>
+            <a:endParaRPr lang="en-US" sz="2000" dirty="0"/>
+          </a:p>
+        </p:txBody>
+      </p:sp>
+    </p:spTree>
+    <p:extLst>
+      <p:ext uri="{BB962C8B-B14F-4D97-AF65-F5344CB8AC3E}">
+        <p14:creationId xmlns:p14="http://schemas.microsoft.com/office/powerpoint/2010/main" val="4084256449"/>
+      </p:ext>
+    </p:extLst>
+  </p:cSld>
+  <p:clrMapOvr>
+    <a:masterClrMapping/>
+  </p:clrMapOvr>
+</p:sld>
+</file>
+
+<file path=ppt/slides/slide19.xml><?xml version="1.0" encoding="utf-8"?>
+<p:sld xmlns:a="http://schemas.openxmlformats.org/drawingml/2006/main" xmlns:r="http://schemas.openxmlformats.org/officeDocument/2006/relationships" xmlns:p="http://schemas.openxmlformats.org/presentationml/2006/main">
+  <p:cSld>
+    <p:spTree>
+      <p:nvGrpSpPr>
+        <p:cNvPr id="1" name=""/>
+        <p:cNvGrpSpPr/>
+        <p:nvPr/>
+      </p:nvGrpSpPr>
+      <p:grpSpPr>
+        <a:xfrm>
+          <a:off x="0" y="0"/>
+          <a:ext cx="0" cy="0"/>
+          <a:chOff x="0" y="0"/>
+          <a:chExt cx="0" cy="0"/>
+        </a:xfrm>
+      </p:grpSpPr>
+      <p:sp>
+        <p:nvSpPr>
+          <p:cNvPr id="2" name="Title 1"/>
+          <p:cNvSpPr>
+            <a:spLocks noGrp="1"/>
+          </p:cNvSpPr>
+          <p:nvPr>
+            <p:ph type="title"/>
+          </p:nvPr>
+        </p:nvSpPr>
+        <p:spPr/>
+        <p:txBody>
+          <a:bodyPr/>
+          <a:lstStyle/>
+          <a:p>
+            <a:r>
+              <a:rPr lang="en-US" dirty="0" smtClean="0"/>
+              <a:t>Entity Framework – No-Tacking</a:t>
+            </a:r>
+            <a:endParaRPr lang="en-US" dirty="0"/>
+          </a:p>
+        </p:txBody>
+      </p:sp>
+      <p:sp>
+        <p:nvSpPr>
+          <p:cNvPr id="3" name="Content Placeholder 2"/>
+          <p:cNvSpPr>
+            <a:spLocks noGrp="1"/>
+          </p:cNvSpPr>
+          <p:nvPr>
+            <p:ph idx="1"/>
+          </p:nvPr>
+        </p:nvSpPr>
+        <p:spPr/>
+        <p:txBody>
+          <a:bodyPr/>
+          <a:lstStyle/>
+          <a:p>
+            <a:pPr marL="0" indent="0">
+              <a:buNone/>
+            </a:pPr>
+            <a:endParaRPr lang="en-US" dirty="0" smtClean="0"/>
+          </a:p>
+          <a:p>
+            <a:pPr marL="0" indent="0">
+              <a:buNone/>
+            </a:pPr>
+            <a:endParaRPr lang="en-US" dirty="0" smtClean="0"/>
+          </a:p>
+          <a:p>
+            <a:pPr marL="0" indent="0">
+              <a:buNone/>
+            </a:pPr>
+            <a:endParaRPr lang="en-US" dirty="0"/>
+          </a:p>
+        </p:txBody>
+      </p:sp>
+      <p:pic>
+        <p:nvPicPr>
+          <p:cNvPr id="4" name="Picture 3"/>
+          <p:cNvPicPr>
+            <a:picLocks noChangeAspect="1"/>
+          </p:cNvPicPr>
+          <p:nvPr/>
+        </p:nvPicPr>
+        <p:blipFill>
+          <a:blip r:embed="rId2"/>
+          <a:stretch>
+            <a:fillRect/>
+          </a:stretch>
+        </p:blipFill>
+        <p:spPr>
+          <a:xfrm>
+            <a:off x="838200" y="1422178"/>
+            <a:ext cx="8398080" cy="5366864"/>
+          </a:xfrm>
+          <a:prstGeom prst="rect">
+            <a:avLst/>
+          </a:prstGeom>
+        </p:spPr>
+      </p:pic>
+    </p:spTree>
+    <p:extLst>
+      <p:ext uri="{BB962C8B-B14F-4D97-AF65-F5344CB8AC3E}">
+        <p14:creationId xmlns:p14="http://schemas.microsoft.com/office/powerpoint/2010/main" val="388563490"/>
       </p:ext>
     </p:extLst>
   </p:cSld>
@@ -3882,6 +4243,388 @@
       </p:par>
     </p:tnLst>
   </p:timing>
+</p:sld>
+</file>
+
+<file path=ppt/slides/slide20.xml><?xml version="1.0" encoding="utf-8"?>
+<p:sld xmlns:a="http://schemas.openxmlformats.org/drawingml/2006/main" xmlns:r="http://schemas.openxmlformats.org/officeDocument/2006/relationships" xmlns:p="http://schemas.openxmlformats.org/presentationml/2006/main">
+  <p:cSld>
+    <p:spTree>
+      <p:nvGrpSpPr>
+        <p:cNvPr id="1" name=""/>
+        <p:cNvGrpSpPr/>
+        <p:nvPr/>
+      </p:nvGrpSpPr>
+      <p:grpSpPr>
+        <a:xfrm>
+          <a:off x="0" y="0"/>
+          <a:ext cx="0" cy="0"/>
+          <a:chOff x="0" y="0"/>
+          <a:chExt cx="0" cy="0"/>
+        </a:xfrm>
+      </p:grpSpPr>
+      <p:sp>
+        <p:nvSpPr>
+          <p:cNvPr id="2" name="Title 1"/>
+          <p:cNvSpPr>
+            <a:spLocks noGrp="1"/>
+          </p:cNvSpPr>
+          <p:nvPr>
+            <p:ph type="title"/>
+          </p:nvPr>
+        </p:nvSpPr>
+        <p:spPr/>
+        <p:txBody>
+          <a:bodyPr/>
+          <a:lstStyle/>
+          <a:p>
+            <a:r>
+              <a:rPr lang="en-US" dirty="0" smtClean="0"/>
+              <a:t>Entity Framework loading</a:t>
+            </a:r>
+            <a:endParaRPr lang="en-US" dirty="0"/>
+          </a:p>
+        </p:txBody>
+      </p:sp>
+      <p:sp>
+        <p:nvSpPr>
+          <p:cNvPr id="3" name="Content Placeholder 2"/>
+          <p:cNvSpPr>
+            <a:spLocks noGrp="1"/>
+          </p:cNvSpPr>
+          <p:nvPr>
+            <p:ph idx="1"/>
+          </p:nvPr>
+        </p:nvSpPr>
+        <p:spPr/>
+        <p:txBody>
+          <a:bodyPr/>
+          <a:lstStyle/>
+          <a:p>
+            <a:r>
+              <a:rPr lang="en-US" dirty="0"/>
+              <a:t>Lazy loading is delaying the loading of related data, until you specifically request for it. </a:t>
+            </a:r>
+            <a:endParaRPr lang="en-US" dirty="0" smtClean="0"/>
+          </a:p>
+          <a:p>
+            <a:r>
+              <a:rPr lang="en-US" dirty="0"/>
+              <a:t>Eager loading is the process whereby a query for one type of entity also loads related entities as part of the query, so that we don't need to execute a separate query for related entities. Eager loading is achieved using the </a:t>
+            </a:r>
+            <a:r>
+              <a:rPr lang="en-US" dirty="0">
+                <a:solidFill>
+                  <a:schemeClr val="accent6"/>
+                </a:solidFill>
+              </a:rPr>
+              <a:t>Include() method</a:t>
+            </a:r>
+            <a:r>
+              <a:rPr lang="en-US" dirty="0"/>
+              <a:t>.</a:t>
+            </a:r>
+          </a:p>
+        </p:txBody>
+      </p:sp>
+    </p:spTree>
+    <p:extLst>
+      <p:ext uri="{BB962C8B-B14F-4D97-AF65-F5344CB8AC3E}">
+        <p14:creationId xmlns:p14="http://schemas.microsoft.com/office/powerpoint/2010/main" val="1623254597"/>
+      </p:ext>
+    </p:extLst>
+  </p:cSld>
+  <p:clrMapOvr>
+    <a:masterClrMapping/>
+  </p:clrMapOvr>
+</p:sld>
+</file>
+
+<file path=ppt/slides/slide21.xml><?xml version="1.0" encoding="utf-8"?>
+<p:sld xmlns:a="http://schemas.openxmlformats.org/drawingml/2006/main" xmlns:r="http://schemas.openxmlformats.org/officeDocument/2006/relationships" xmlns:p="http://schemas.openxmlformats.org/presentationml/2006/main">
+  <p:cSld>
+    <p:spTree>
+      <p:nvGrpSpPr>
+        <p:cNvPr id="1" name=""/>
+        <p:cNvGrpSpPr/>
+        <p:nvPr/>
+      </p:nvGrpSpPr>
+      <p:grpSpPr>
+        <a:xfrm>
+          <a:off x="0" y="0"/>
+          <a:ext cx="0" cy="0"/>
+          <a:chOff x="0" y="0"/>
+          <a:chExt cx="0" cy="0"/>
+        </a:xfrm>
+      </p:grpSpPr>
+      <p:sp>
+        <p:nvSpPr>
+          <p:cNvPr id="2" name="Title 1"/>
+          <p:cNvSpPr>
+            <a:spLocks noGrp="1"/>
+          </p:cNvSpPr>
+          <p:nvPr>
+            <p:ph type="title"/>
+          </p:nvPr>
+        </p:nvSpPr>
+        <p:spPr/>
+        <p:txBody>
+          <a:bodyPr/>
+          <a:lstStyle/>
+          <a:p>
+            <a:r>
+              <a:rPr lang="en-US" dirty="0" smtClean="0"/>
+              <a:t>Entity Framework – raw queries</a:t>
+            </a:r>
+            <a:endParaRPr lang="en-US" dirty="0"/>
+          </a:p>
+        </p:txBody>
+      </p:sp>
+      <p:sp>
+        <p:nvSpPr>
+          <p:cNvPr id="3" name="Content Placeholder 2"/>
+          <p:cNvSpPr>
+            <a:spLocks noGrp="1"/>
+          </p:cNvSpPr>
+          <p:nvPr>
+            <p:ph idx="1"/>
+          </p:nvPr>
+        </p:nvSpPr>
+        <p:spPr/>
+        <p:txBody>
+          <a:bodyPr>
+            <a:normAutofit/>
+          </a:bodyPr>
+          <a:lstStyle/>
+          <a:p>
+            <a:pPr marL="0" indent="0">
+              <a:buNone/>
+            </a:pPr>
+            <a:r>
+              <a:rPr lang="en-US" sz="2000" dirty="0"/>
+              <a:t>Entity Framework Core allows you to drop down to raw SQL queries when working with a relational database. This can be useful if the query you want to perform can't be expressed using LINQ, or if using a LINQ query is resulting in inefficient SQL queries. Raw SQL queries can return entity types or, starting with EF </a:t>
+            </a:r>
+            <a:r>
+              <a:rPr lang="en-US" sz="2000" dirty="0" smtClean="0"/>
+              <a:t>Core </a:t>
+            </a:r>
+            <a:r>
+              <a:rPr lang="en-US" sz="2000" dirty="0"/>
+              <a:t>2.1, query types that are part of your model</a:t>
+            </a:r>
+            <a:r>
+              <a:rPr lang="en-US" sz="2000" dirty="0" smtClean="0"/>
+              <a:t>.</a:t>
+            </a:r>
+          </a:p>
+          <a:p>
+            <a:pPr marL="0" indent="0">
+              <a:buNone/>
+            </a:pPr>
+            <a:r>
+              <a:rPr lang="en-US" sz="2000" dirty="0" smtClean="0"/>
+              <a:t>In EF6</a:t>
+            </a:r>
+          </a:p>
+        </p:txBody>
+      </p:sp>
+      <p:sp>
+        <p:nvSpPr>
+          <p:cNvPr id="4" name="Rectangle 1"/>
+          <p:cNvSpPr>
+            <a:spLocks noChangeArrowheads="1"/>
+          </p:cNvSpPr>
+          <p:nvPr/>
+        </p:nvSpPr>
+        <p:spPr bwMode="auto">
+          <a:xfrm>
+            <a:off x="847288" y="3443617"/>
+            <a:ext cx="9806731" cy="230832"/>
+          </a:xfrm>
+          <a:prstGeom prst="rect">
+            <a:avLst/>
+          </a:prstGeom>
+          <a:solidFill>
+            <a:srgbClr val="FFFFFF"/>
+          </a:solidFill>
+          <a:ln>
+            <a:noFill/>
+          </a:ln>
+          <a:effectLst/>
+          <a:extLst>
+            <a:ext uri="{91240B29-F687-4F45-9708-019B960494DF}">
+              <a14:hiddenLine xmlns:a14="http://schemas.microsoft.com/office/drawing/2010/main" w="9525">
+                <a:solidFill>
+                  <a:schemeClr val="tx1"/>
+                </a:solidFill>
+                <a:miter lim="800000"/>
+                <a:headEnd/>
+                <a:tailEnd/>
+              </a14:hiddenLine>
+            </a:ext>
+            <a:ext uri="{AF507438-7753-43E0-B8FC-AC1667EBCBE1}">
+              <a14:hiddenEffects xmlns:a14="http://schemas.microsoft.com/office/drawing/2010/main">
+                <a:effectLst>
+                  <a:outerShdw dist="35921" dir="2700000" algn="ctr" rotWithShape="0">
+                    <a:schemeClr val="bg2"/>
+                  </a:outerShdw>
+                </a:effectLst>
+              </a14:hiddenEffects>
+            </a:ext>
+          </a:extLst>
+        </p:spPr>
+        <p:txBody>
+          <a:bodyPr vert="horz" wrap="square" lIns="91440" tIns="45720" rIns="91440" bIns="45720" numCol="1" anchor="ctr" anchorCtr="0" compatLnSpc="1">
+            <a:prstTxWarp prst="textNoShape">
+              <a:avLst/>
+            </a:prstTxWarp>
+            <a:spAutoFit/>
+          </a:bodyPr>
+          <a:lstStyle/>
+          <a:p>
+            <a:pPr marL="0" marR="0" lvl="0" indent="0" algn="l" defTabSz="914400" rtl="0" eaLnBrk="0" fontAlgn="base" latinLnBrk="0" hangingPunct="0">
+              <a:lnSpc>
+                <a:spcPct val="100000"/>
+              </a:lnSpc>
+              <a:spcBef>
+                <a:spcPct val="0"/>
+              </a:spcBef>
+              <a:spcAft>
+                <a:spcPct val="0"/>
+              </a:spcAft>
+              <a:buClrTx/>
+              <a:buSzTx/>
+              <a:buFontTx/>
+              <a:buNone/>
+              <a:tabLst/>
+            </a:pPr>
+            <a:r>
+              <a:rPr kumimoji="0" lang="en-US" altLang="en-US" sz="900" b="0" i="0" u="none" strike="noStrike" cap="none" normalizeH="0" baseline="0" dirty="0" smtClean="0">
+                <a:ln>
+                  <a:noFill/>
+                </a:ln>
+                <a:solidFill>
+                  <a:srgbClr val="0000FF"/>
+                </a:solidFill>
+                <a:effectLst/>
+                <a:latin typeface="Consolas" panose="020B0609020204030204" pitchFamily="49" charset="0"/>
+              </a:rPr>
+              <a:t>var</a:t>
+            </a:r>
+            <a:r>
+              <a:rPr kumimoji="0" lang="en-US" altLang="en-US" sz="900" b="0" i="0" u="none" strike="noStrike" cap="none" normalizeH="0" baseline="0" dirty="0" smtClean="0">
+                <a:ln>
+                  <a:noFill/>
+                </a:ln>
+                <a:solidFill>
+                  <a:srgbClr val="000000"/>
+                </a:solidFill>
+                <a:effectLst/>
+                <a:latin typeface="Consolas" panose="020B0609020204030204" pitchFamily="49" charset="0"/>
+              </a:rPr>
+              <a:t> demo = </a:t>
+            </a:r>
+            <a:r>
+              <a:rPr kumimoji="0" lang="en-US" altLang="en-US" sz="900" b="0" i="0" u="none" strike="noStrike" cap="none" normalizeH="0" baseline="0" dirty="0" err="1" smtClean="0">
+                <a:ln>
+                  <a:noFill/>
+                </a:ln>
+                <a:solidFill>
+                  <a:srgbClr val="000000"/>
+                </a:solidFill>
+                <a:effectLst/>
+                <a:latin typeface="Consolas" panose="020B0609020204030204" pitchFamily="49" charset="0"/>
+              </a:rPr>
+              <a:t>context.Countries.SqlQuery</a:t>
+            </a:r>
+            <a:r>
+              <a:rPr kumimoji="0" lang="en-US" altLang="en-US" sz="900" b="0" i="0" u="none" strike="noStrike" cap="none" normalizeH="0" baseline="0" dirty="0" smtClean="0">
+                <a:ln>
+                  <a:noFill/>
+                </a:ln>
+                <a:solidFill>
+                  <a:srgbClr val="000000"/>
+                </a:solidFill>
+                <a:effectLst/>
+                <a:latin typeface="Consolas" panose="020B0609020204030204" pitchFamily="49" charset="0"/>
+              </a:rPr>
+              <a:t>(</a:t>
+            </a:r>
+            <a:r>
+              <a:rPr kumimoji="0" lang="en-US" altLang="en-US" sz="900" b="0" i="0" u="none" strike="noStrike" cap="none" normalizeH="0" baseline="0" dirty="0" smtClean="0">
+                <a:ln>
+                  <a:noFill/>
+                </a:ln>
+                <a:solidFill>
+                  <a:srgbClr val="A31515"/>
+                </a:solidFill>
+                <a:effectLst/>
+                <a:latin typeface="Consolas" panose="020B0609020204030204" pitchFamily="49" charset="0"/>
+              </a:rPr>
+              <a:t>"TODO"</a:t>
+            </a:r>
+            <a:r>
+              <a:rPr kumimoji="0" lang="en-US" altLang="en-US" sz="900" b="0" i="0" u="none" strike="noStrike" cap="none" normalizeH="0" baseline="0" dirty="0" smtClean="0">
+                <a:ln>
+                  <a:noFill/>
+                </a:ln>
+                <a:solidFill>
+                  <a:srgbClr val="000000"/>
+                </a:solidFill>
+                <a:effectLst/>
+                <a:latin typeface="Consolas" panose="020B0609020204030204" pitchFamily="49" charset="0"/>
+              </a:rPr>
+              <a:t>).</a:t>
+            </a:r>
+            <a:r>
+              <a:rPr kumimoji="0" lang="en-US" altLang="en-US" sz="900" b="0" i="0" u="none" strike="noStrike" cap="none" normalizeH="0" baseline="0" dirty="0" err="1" smtClean="0">
+                <a:ln>
+                  <a:noFill/>
+                </a:ln>
+                <a:solidFill>
+                  <a:srgbClr val="000000"/>
+                </a:solidFill>
+                <a:effectLst/>
+                <a:latin typeface="Consolas" panose="020B0609020204030204" pitchFamily="49" charset="0"/>
+              </a:rPr>
+              <a:t>ToList</a:t>
+            </a:r>
+            <a:r>
+              <a:rPr kumimoji="0" lang="en-US" altLang="en-US" sz="900" b="0" i="0" u="none" strike="noStrike" cap="none" normalizeH="0" baseline="0" dirty="0" smtClean="0">
+                <a:ln>
+                  <a:noFill/>
+                </a:ln>
+                <a:solidFill>
+                  <a:srgbClr val="000000"/>
+                </a:solidFill>
+                <a:effectLst/>
+                <a:latin typeface="Consolas" panose="020B0609020204030204" pitchFamily="49" charset="0"/>
+              </a:rPr>
+              <a:t>(); </a:t>
+            </a:r>
+            <a:endParaRPr kumimoji="0" lang="en-US" altLang="en-US" sz="1800" b="0" i="0" u="none" strike="noStrike" cap="none" normalizeH="0" baseline="0" dirty="0" smtClean="0">
+              <a:ln>
+                <a:noFill/>
+              </a:ln>
+              <a:solidFill>
+                <a:schemeClr val="tx1"/>
+              </a:solidFill>
+              <a:effectLst/>
+              <a:latin typeface="Arial" panose="020B0604020202020204" pitchFamily="34" charset="0"/>
+            </a:endParaRPr>
+          </a:p>
+        </p:txBody>
+      </p:sp>
+    </p:spTree>
+    <p:extLst>
+      <p:ext uri="{BB962C8B-B14F-4D97-AF65-F5344CB8AC3E}">
+        <p14:creationId xmlns:p14="http://schemas.microsoft.com/office/powerpoint/2010/main" val="3009528866"/>
+      </p:ext>
+    </p:extLst>
+  </p:cSld>
+  <p:clrMapOvr>
+    <a:masterClrMapping/>
+  </p:clrMapOvr>
 </p:sld>
 </file>
 

</xml_diff>

<commit_message>
Added ASP.NET simple startup, Updated Power Point.
</commit_message>
<xml_diff>
--- a/PowerPoint/Working with Visual Studio.pptx
+++ b/PowerPoint/Working with Visual Studio.pptx
@@ -17,15 +17,22 @@
     <p:sldId id="270" r:id="rId11"/>
     <p:sldId id="269" r:id="rId12"/>
     <p:sldId id="264" r:id="rId13"/>
-    <p:sldId id="265" r:id="rId14"/>
-    <p:sldId id="266" r:id="rId15"/>
-    <p:sldId id="271" r:id="rId16"/>
-    <p:sldId id="272" r:id="rId17"/>
-    <p:sldId id="273" r:id="rId18"/>
-    <p:sldId id="275" r:id="rId19"/>
-    <p:sldId id="274" r:id="rId20"/>
-    <p:sldId id="267" r:id="rId21"/>
-    <p:sldId id="276" r:id="rId22"/>
+    <p:sldId id="277" r:id="rId14"/>
+    <p:sldId id="281" r:id="rId15"/>
+    <p:sldId id="282" r:id="rId16"/>
+    <p:sldId id="283" r:id="rId17"/>
+    <p:sldId id="284" r:id="rId18"/>
+    <p:sldId id="278" r:id="rId19"/>
+    <p:sldId id="279" r:id="rId20"/>
+    <p:sldId id="265" r:id="rId21"/>
+    <p:sldId id="266" r:id="rId22"/>
+    <p:sldId id="271" r:id="rId23"/>
+    <p:sldId id="272" r:id="rId24"/>
+    <p:sldId id="273" r:id="rId25"/>
+    <p:sldId id="275" r:id="rId26"/>
+    <p:sldId id="274" r:id="rId27"/>
+    <p:sldId id="267" r:id="rId28"/>
+    <p:sldId id="276" r:id="rId29"/>
   </p:sldIdLst>
   <p:sldSz cx="12192000" cy="6858000"/>
   <p:notesSz cx="6858000" cy="9144000"/>
@@ -263,7 +270,7 @@
           <a:p>
             <a:fld id="{595C178B-5A77-496A-9807-14D7EFE9DB5D}" type="datetimeFigureOut">
               <a:rPr lang="en-US" smtClean="0"/>
-              <a:t>6/7/2019</a:t>
+              <a:t>6/10/2019</a:t>
             </a:fld>
             <a:endParaRPr lang="en-US"/>
           </a:p>
@@ -433,7 +440,7 @@
           <a:p>
             <a:fld id="{595C178B-5A77-496A-9807-14D7EFE9DB5D}" type="datetimeFigureOut">
               <a:rPr lang="en-US" smtClean="0"/>
-              <a:t>6/7/2019</a:t>
+              <a:t>6/10/2019</a:t>
             </a:fld>
             <a:endParaRPr lang="en-US"/>
           </a:p>
@@ -613,7 +620,7 @@
           <a:p>
             <a:fld id="{595C178B-5A77-496A-9807-14D7EFE9DB5D}" type="datetimeFigureOut">
               <a:rPr lang="en-US" smtClean="0"/>
-              <a:t>6/7/2019</a:t>
+              <a:t>6/10/2019</a:t>
             </a:fld>
             <a:endParaRPr lang="en-US"/>
           </a:p>
@@ -783,7 +790,7 @@
           <a:p>
             <a:fld id="{595C178B-5A77-496A-9807-14D7EFE9DB5D}" type="datetimeFigureOut">
               <a:rPr lang="en-US" smtClean="0"/>
-              <a:t>6/7/2019</a:t>
+              <a:t>6/10/2019</a:t>
             </a:fld>
             <a:endParaRPr lang="en-US"/>
           </a:p>
@@ -1029,7 +1036,7 @@
           <a:p>
             <a:fld id="{595C178B-5A77-496A-9807-14D7EFE9DB5D}" type="datetimeFigureOut">
               <a:rPr lang="en-US" smtClean="0"/>
-              <a:t>6/7/2019</a:t>
+              <a:t>6/10/2019</a:t>
             </a:fld>
             <a:endParaRPr lang="en-US"/>
           </a:p>
@@ -1261,7 +1268,7 @@
           <a:p>
             <a:fld id="{595C178B-5A77-496A-9807-14D7EFE9DB5D}" type="datetimeFigureOut">
               <a:rPr lang="en-US" smtClean="0"/>
-              <a:t>6/7/2019</a:t>
+              <a:t>6/10/2019</a:t>
             </a:fld>
             <a:endParaRPr lang="en-US"/>
           </a:p>
@@ -1628,7 +1635,7 @@
           <a:p>
             <a:fld id="{595C178B-5A77-496A-9807-14D7EFE9DB5D}" type="datetimeFigureOut">
               <a:rPr lang="en-US" smtClean="0"/>
-              <a:t>6/7/2019</a:t>
+              <a:t>6/10/2019</a:t>
             </a:fld>
             <a:endParaRPr lang="en-US"/>
           </a:p>
@@ -1746,7 +1753,7 @@
           <a:p>
             <a:fld id="{595C178B-5A77-496A-9807-14D7EFE9DB5D}" type="datetimeFigureOut">
               <a:rPr lang="en-US" smtClean="0"/>
-              <a:t>6/7/2019</a:t>
+              <a:t>6/10/2019</a:t>
             </a:fld>
             <a:endParaRPr lang="en-US"/>
           </a:p>
@@ -1841,7 +1848,7 @@
           <a:p>
             <a:fld id="{595C178B-5A77-496A-9807-14D7EFE9DB5D}" type="datetimeFigureOut">
               <a:rPr lang="en-US" smtClean="0"/>
-              <a:t>6/7/2019</a:t>
+              <a:t>6/10/2019</a:t>
             </a:fld>
             <a:endParaRPr lang="en-US"/>
           </a:p>
@@ -2118,7 +2125,7 @@
           <a:p>
             <a:fld id="{595C178B-5A77-496A-9807-14D7EFE9DB5D}" type="datetimeFigureOut">
               <a:rPr lang="en-US" smtClean="0"/>
-              <a:t>6/7/2019</a:t>
+              <a:t>6/10/2019</a:t>
             </a:fld>
             <a:endParaRPr lang="en-US"/>
           </a:p>
@@ -2371,7 +2378,7 @@
           <a:p>
             <a:fld id="{595C178B-5A77-496A-9807-14D7EFE9DB5D}" type="datetimeFigureOut">
               <a:rPr lang="en-US" smtClean="0"/>
-              <a:t>6/7/2019</a:t>
+              <a:t>6/10/2019</a:t>
             </a:fld>
             <a:endParaRPr lang="en-US"/>
           </a:p>
@@ -2584,7 +2591,7 @@
           <a:p>
             <a:fld id="{595C178B-5A77-496A-9807-14D7EFE9DB5D}" type="datetimeFigureOut">
               <a:rPr lang="en-US" smtClean="0"/>
-              <a:t>6/7/2019</a:t>
+              <a:t>6/10/2019</a:t>
             </a:fld>
             <a:endParaRPr lang="en-US"/>
           </a:p>
@@ -3410,8 +3417,8 @@
           <a:lstStyle/>
           <a:p>
             <a:r>
-              <a:rPr lang="en-US" b="1" dirty="0" smtClean="0"/>
-              <a:t>ASP.NET Core Documentation</a:t>
+              <a:rPr lang="en-US" dirty="0" smtClean="0"/>
+              <a:t>C# Good to know</a:t>
             </a:r>
             <a:endParaRPr lang="en-US" dirty="0"/>
           </a:p>
@@ -3430,88 +3437,130 @@
         <p:spPr/>
         <p:txBody>
           <a:bodyPr>
-            <a:normAutofit/>
+            <a:normAutofit fontScale="92500"/>
           </a:bodyPr>
           <a:lstStyle/>
           <a:p>
-            <a:pPr marL="0" indent="0">
-              <a:buNone/>
-            </a:pPr>
-            <a:r>
-              <a:rPr lang="en-US" sz="2000" dirty="0"/>
-              <a:t>ASP.NET Core is a new open-source and cross-platform .NET framework for building modern cloud-based web </a:t>
-            </a:r>
-            <a:r>
-              <a:rPr lang="en-US" sz="2000" dirty="0" smtClean="0"/>
-              <a:t>applications </a:t>
-            </a:r>
-            <a:r>
-              <a:rPr lang="en-US" sz="2000" dirty="0"/>
-              <a:t>on Windows, Mac, or Linux</a:t>
-            </a:r>
-            <a:r>
-              <a:rPr lang="en-US" sz="2000" dirty="0" smtClean="0"/>
+            <a:r>
+              <a:rPr lang="en-US" dirty="0" smtClean="0"/>
+              <a:t>Everything is a class in C#</a:t>
+            </a:r>
+          </a:p>
+          <a:p>
+            <a:r>
+              <a:rPr lang="en-US" dirty="0" smtClean="0"/>
+              <a:t>Web and service projects starting point is the main project, </a:t>
+            </a:r>
+            <a:r>
+              <a:rPr lang="en-US" dirty="0" err="1" smtClean="0"/>
+              <a:t>program.cs</a:t>
+            </a:r>
+            <a:endParaRPr lang="en-US" dirty="0" smtClean="0"/>
+          </a:p>
+          <a:p>
+            <a:r>
+              <a:rPr lang="en-US" dirty="0" smtClean="0"/>
+              <a:t>Class project have no entry point class, classes may via </a:t>
+            </a:r>
+            <a:r>
+              <a:rPr lang="en-US" dirty="0" err="1" smtClean="0"/>
+              <a:t>ctor</a:t>
+            </a:r>
+            <a:r>
+              <a:rPr lang="en-US" dirty="0" smtClean="0"/>
               <a:t>.</a:t>
             </a:r>
           </a:p>
           <a:p>
-            <a:pPr marL="0" indent="0">
-              <a:buNone/>
-            </a:pPr>
-            <a:endParaRPr lang="en-US" sz="2000" dirty="0"/>
-          </a:p>
-          <a:p>
-            <a:pPr marL="0" indent="0">
-              <a:buNone/>
-            </a:pPr>
-            <a:r>
-              <a:rPr lang="en-US" sz="2000" dirty="0">
+            <a:r>
+              <a:rPr lang="en-US" dirty="0" smtClean="0"/>
+              <a:t>C# is case sensitive, example, </a:t>
+            </a:r>
+            <a:r>
+              <a:rPr lang="en-US" dirty="0" err="1" smtClean="0"/>
+              <a:t>firstName</a:t>
+            </a:r>
+            <a:r>
+              <a:rPr lang="en-US" dirty="0" smtClean="0"/>
+              <a:t> is different than </a:t>
+            </a:r>
+            <a:r>
+              <a:rPr lang="en-US" dirty="0" err="1" smtClean="0"/>
+              <a:t>FirstName</a:t>
+            </a:r>
+            <a:r>
+              <a:rPr lang="en-US" dirty="0" smtClean="0"/>
+              <a:t>.</a:t>
+            </a:r>
+          </a:p>
+          <a:p>
+            <a:r>
+              <a:rPr lang="en-US" dirty="0" smtClean="0"/>
+              <a:t>C# string concatenation “Karen ” + “Payne” (see next bullet)</a:t>
+            </a:r>
+          </a:p>
+          <a:p>
+            <a:r>
+              <a:rPr lang="en-US" dirty="0"/>
+              <a:t>C# </a:t>
+            </a:r>
+            <a:r>
+              <a:rPr lang="en-US" dirty="0">
                 <a:hlinkClick r:id="rId2"/>
               </a:rPr>
-              <a:t>https://docs.microsoft.com/en-us/aspnet/?</a:t>
-            </a:r>
-            <a:r>
-              <a:rPr lang="en-US" sz="2000" dirty="0" smtClean="0">
+              <a:t>$ - string </a:t>
+            </a:r>
+            <a:r>
+              <a:rPr lang="en-US" dirty="0" smtClean="0">
                 <a:hlinkClick r:id="rId2"/>
               </a:rPr>
-              <a:t>view=aspnetcore-2.2#pivot=core&amp;panel=core_overview</a:t>
-            </a:r>
-            <a:endParaRPr lang="en-US" sz="2000" dirty="0" smtClean="0"/>
-          </a:p>
-          <a:p>
-            <a:pPr marL="0" indent="0">
-              <a:buNone/>
-            </a:pPr>
-            <a:endParaRPr lang="en-US" sz="2000" dirty="0" smtClean="0"/>
-          </a:p>
-          <a:p>
-            <a:pPr marL="0" indent="0">
-              <a:buNone/>
-            </a:pPr>
-            <a:r>
-              <a:rPr lang="en-US" sz="2000" dirty="0" smtClean="0"/>
-              <a:t>Tutorials</a:t>
-            </a:r>
-            <a:endParaRPr lang="en-US" sz="2000" dirty="0"/>
-          </a:p>
-          <a:p>
-            <a:pPr marL="0" indent="0">
-              <a:buNone/>
-            </a:pPr>
-            <a:r>
-              <a:rPr lang="en-US" sz="2000" dirty="0">
-                <a:hlinkClick r:id="rId3"/>
-              </a:rPr>
-              <a:t>https://www.tutorialspoint.com/asp.net_core/</a:t>
-            </a:r>
-            <a:endParaRPr lang="en-US" sz="2000" dirty="0"/>
+              <a:t>interpolation</a:t>
+            </a:r>
+            <a:r>
+              <a:rPr lang="en-US" dirty="0" smtClean="0"/>
+              <a:t>.</a:t>
+            </a:r>
+          </a:p>
+          <a:p>
+            <a:r>
+              <a:rPr lang="en-US" dirty="0" smtClean="0"/>
+              <a:t>C# math, +, +=, ==, -, -=, *= </a:t>
+            </a:r>
+            <a:r>
+              <a:rPr lang="en-US" dirty="0" err="1" smtClean="0"/>
+              <a:t>etc</a:t>
+            </a:r>
+            <a:endParaRPr lang="en-US" dirty="0" smtClean="0"/>
+          </a:p>
+          <a:p>
+            <a:r>
+              <a:rPr lang="en-US" dirty="0" smtClean="0"/>
+              <a:t>C# strings use </a:t>
+            </a:r>
+            <a:r>
+              <a:rPr lang="en-US" dirty="0" err="1" smtClean="0"/>
+              <a:t>StringBuilder</a:t>
+            </a:r>
+            <a:r>
+              <a:rPr lang="en-US" dirty="0" smtClean="0"/>
+              <a:t> for large strings.</a:t>
+            </a:r>
+          </a:p>
+          <a:p>
+            <a:r>
+              <a:rPr lang="en-US" dirty="0" smtClean="0"/>
+              <a:t>C# String class - explore</a:t>
+            </a:r>
+          </a:p>
+          <a:p>
+            <a:endParaRPr lang="en-US" dirty="0"/>
           </a:p>
         </p:txBody>
       </p:sp>
     </p:spTree>
     <p:extLst>
       <p:ext uri="{BB962C8B-B14F-4D97-AF65-F5344CB8AC3E}">
-        <p14:creationId xmlns:p14="http://schemas.microsoft.com/office/powerpoint/2010/main" val="857302663"/>
+        <p14:creationId xmlns:p14="http://schemas.microsoft.com/office/powerpoint/2010/main" val="3187349993"/>
       </p:ext>
     </p:extLst>
   </p:cSld>
@@ -3554,6 +3603,958 @@
           <a:lstStyle/>
           <a:p>
             <a:r>
+              <a:rPr lang="en-US" dirty="0"/>
+              <a:t>C# Good to know</a:t>
+            </a:r>
+          </a:p>
+        </p:txBody>
+      </p:sp>
+      <p:sp>
+        <p:nvSpPr>
+          <p:cNvPr id="3" name="Content Placeholder 2"/>
+          <p:cNvSpPr>
+            <a:spLocks noGrp="1"/>
+          </p:cNvSpPr>
+          <p:nvPr>
+            <p:ph idx="1"/>
+          </p:nvPr>
+        </p:nvSpPr>
+        <p:spPr/>
+        <p:txBody>
+          <a:bodyPr/>
+          <a:lstStyle/>
+          <a:p>
+            <a:r>
+              <a:rPr lang="en-US" dirty="0" smtClean="0"/>
+              <a:t>Declaring</a:t>
+            </a:r>
+          </a:p>
+          <a:p>
+            <a:pPr marL="0" indent="0">
+              <a:buNone/>
+            </a:pPr>
+            <a:endParaRPr lang="en-US" dirty="0"/>
+          </a:p>
+        </p:txBody>
+      </p:sp>
+      <p:pic>
+        <p:nvPicPr>
+          <p:cNvPr id="4" name="Picture 3"/>
+          <p:cNvPicPr>
+            <a:picLocks noChangeAspect="1"/>
+          </p:cNvPicPr>
+          <p:nvPr/>
+        </p:nvPicPr>
+        <p:blipFill>
+          <a:blip r:embed="rId2"/>
+          <a:stretch>
+            <a:fillRect/>
+          </a:stretch>
+        </p:blipFill>
+        <p:spPr>
+          <a:xfrm>
+            <a:off x="1101356" y="2248250"/>
+            <a:ext cx="4341311" cy="4609750"/>
+          </a:xfrm>
+          <a:prstGeom prst="rect">
+            <a:avLst/>
+          </a:prstGeom>
+        </p:spPr>
+      </p:pic>
+      <p:pic>
+        <p:nvPicPr>
+          <p:cNvPr id="5" name="Picture 6" descr="C:\Users\paynek\AppData\Local\Temp\SNAGHTML1efae880.PNG"/>
+          <p:cNvPicPr>
+            <a:picLocks noChangeAspect="1" noChangeArrowheads="1"/>
+          </p:cNvPicPr>
+          <p:nvPr/>
+        </p:nvPicPr>
+        <p:blipFill>
+          <a:blip r:embed="rId3">
+            <a:extLst>
+              <a:ext uri="{28A0092B-C50C-407E-A947-70E740481C1C}">
+                <a14:useLocalDpi xmlns:a14="http://schemas.microsoft.com/office/drawing/2010/main" val="0"/>
+              </a:ext>
+            </a:extLst>
+          </a:blip>
+          <a:srcRect/>
+          <a:stretch>
+            <a:fillRect/>
+          </a:stretch>
+        </p:blipFill>
+        <p:spPr bwMode="auto">
+          <a:xfrm>
+            <a:off x="6357131" y="835024"/>
+            <a:ext cx="4333875" cy="1981201"/>
+          </a:xfrm>
+          <a:prstGeom prst="rect">
+            <a:avLst/>
+          </a:prstGeom>
+          <a:noFill/>
+          <a:extLst>
+            <a:ext uri="{909E8E84-426E-40DD-AFC4-6F175D3DCCD1}">
+              <a14:hiddenFill xmlns:a14="http://schemas.microsoft.com/office/drawing/2010/main">
+                <a:solidFill>
+                  <a:srgbClr val="FFFFFF"/>
+                </a:solidFill>
+              </a14:hiddenFill>
+            </a:ext>
+          </a:extLst>
+        </p:spPr>
+      </p:pic>
+    </p:spTree>
+    <p:extLst>
+      <p:ext uri="{BB962C8B-B14F-4D97-AF65-F5344CB8AC3E}">
+        <p14:creationId xmlns:p14="http://schemas.microsoft.com/office/powerpoint/2010/main" val="3508947583"/>
+      </p:ext>
+    </p:extLst>
+  </p:cSld>
+  <p:clrMapOvr>
+    <a:masterClrMapping/>
+  </p:clrMapOvr>
+</p:sld>
+</file>
+
+<file path=ppt/slides/slide15.xml><?xml version="1.0" encoding="utf-8"?>
+<p:sld xmlns:a="http://schemas.openxmlformats.org/drawingml/2006/main" xmlns:r="http://schemas.openxmlformats.org/officeDocument/2006/relationships" xmlns:p="http://schemas.openxmlformats.org/presentationml/2006/main">
+  <p:cSld>
+    <p:spTree>
+      <p:nvGrpSpPr>
+        <p:cNvPr id="1" name=""/>
+        <p:cNvGrpSpPr/>
+        <p:nvPr/>
+      </p:nvGrpSpPr>
+      <p:grpSpPr>
+        <a:xfrm>
+          <a:off x="0" y="0"/>
+          <a:ext cx="0" cy="0"/>
+          <a:chOff x="0" y="0"/>
+          <a:chExt cx="0" cy="0"/>
+        </a:xfrm>
+      </p:grpSpPr>
+      <p:sp>
+        <p:nvSpPr>
+          <p:cNvPr id="2" name="Title 1"/>
+          <p:cNvSpPr>
+            <a:spLocks noGrp="1"/>
+          </p:cNvSpPr>
+          <p:nvPr>
+            <p:ph type="title"/>
+          </p:nvPr>
+        </p:nvSpPr>
+        <p:spPr/>
+        <p:txBody>
+          <a:bodyPr/>
+          <a:lstStyle/>
+          <a:p>
+            <a:r>
+              <a:rPr lang="en-US" dirty="0" smtClean="0"/>
+              <a:t>Escaping</a:t>
+            </a:r>
+            <a:endParaRPr lang="en-US" dirty="0"/>
+          </a:p>
+        </p:txBody>
+      </p:sp>
+      <p:sp>
+        <p:nvSpPr>
+          <p:cNvPr id="5" name="Content Placeholder 4"/>
+          <p:cNvSpPr>
+            <a:spLocks noGrp="1"/>
+          </p:cNvSpPr>
+          <p:nvPr>
+            <p:ph idx="1"/>
+          </p:nvPr>
+        </p:nvSpPr>
+        <p:spPr>
+          <a:xfrm>
+            <a:off x="838200" y="1666234"/>
+            <a:ext cx="10515600" cy="4351338"/>
+          </a:xfrm>
+        </p:spPr>
+        <p:txBody>
+          <a:bodyPr/>
+          <a:lstStyle/>
+          <a:p>
+            <a:r>
+              <a:rPr lang="en-US" dirty="0" smtClean="0"/>
+              <a:t>\\ and </a:t>
+            </a:r>
+            <a:r>
+              <a:rPr lang="en-US" dirty="0" smtClean="0">
+                <a:hlinkClick r:id="rId2"/>
+              </a:rPr>
+              <a:t>@ verbatim</a:t>
+            </a:r>
+            <a:endParaRPr lang="en-US" dirty="0" smtClean="0"/>
+          </a:p>
+        </p:txBody>
+      </p:sp>
+      <p:pic>
+        <p:nvPicPr>
+          <p:cNvPr id="7" name="Picture 6"/>
+          <p:cNvPicPr>
+            <a:picLocks noChangeAspect="1"/>
+          </p:cNvPicPr>
+          <p:nvPr/>
+        </p:nvPicPr>
+        <p:blipFill>
+          <a:blip r:embed="rId3"/>
+          <a:stretch>
+            <a:fillRect/>
+          </a:stretch>
+        </p:blipFill>
+        <p:spPr>
+          <a:xfrm>
+            <a:off x="3158214" y="2548802"/>
+            <a:ext cx="4533333" cy="552381"/>
+          </a:xfrm>
+          <a:prstGeom prst="rect">
+            <a:avLst/>
+          </a:prstGeom>
+        </p:spPr>
+      </p:pic>
+    </p:spTree>
+    <p:extLst>
+      <p:ext uri="{BB962C8B-B14F-4D97-AF65-F5344CB8AC3E}">
+        <p14:creationId xmlns:p14="http://schemas.microsoft.com/office/powerpoint/2010/main" val="465215437"/>
+      </p:ext>
+    </p:extLst>
+  </p:cSld>
+  <p:clrMapOvr>
+    <a:masterClrMapping/>
+  </p:clrMapOvr>
+</p:sld>
+</file>
+
+<file path=ppt/slides/slide16.xml><?xml version="1.0" encoding="utf-8"?>
+<p:sld xmlns:a="http://schemas.openxmlformats.org/drawingml/2006/main" xmlns:r="http://schemas.openxmlformats.org/officeDocument/2006/relationships" xmlns:p="http://schemas.openxmlformats.org/presentationml/2006/main">
+  <p:cSld>
+    <p:spTree>
+      <p:nvGrpSpPr>
+        <p:cNvPr id="1" name=""/>
+        <p:cNvGrpSpPr/>
+        <p:nvPr/>
+      </p:nvGrpSpPr>
+      <p:grpSpPr>
+        <a:xfrm>
+          <a:off x="0" y="0"/>
+          <a:ext cx="0" cy="0"/>
+          <a:chOff x="0" y="0"/>
+          <a:chExt cx="0" cy="0"/>
+        </a:xfrm>
+      </p:grpSpPr>
+      <p:sp>
+        <p:nvSpPr>
+          <p:cNvPr id="2" name="Title 1"/>
+          <p:cNvSpPr>
+            <a:spLocks noGrp="1"/>
+          </p:cNvSpPr>
+          <p:nvPr>
+            <p:ph type="title"/>
+          </p:nvPr>
+        </p:nvSpPr>
+        <p:spPr/>
+        <p:txBody>
+          <a:bodyPr/>
+          <a:lstStyle/>
+          <a:p>
+            <a:r>
+              <a:rPr lang="en-US" dirty="0" smtClean="0"/>
+              <a:t>Old school</a:t>
+            </a:r>
+            <a:endParaRPr lang="en-US" dirty="0"/>
+          </a:p>
+        </p:txBody>
+      </p:sp>
+      <p:sp>
+        <p:nvSpPr>
+          <p:cNvPr id="3" name="Content Placeholder 2"/>
+          <p:cNvSpPr>
+            <a:spLocks noGrp="1"/>
+          </p:cNvSpPr>
+          <p:nvPr>
+            <p:ph idx="1"/>
+          </p:nvPr>
+        </p:nvSpPr>
+        <p:spPr/>
+        <p:txBody>
+          <a:bodyPr/>
+          <a:lstStyle/>
+          <a:p>
+            <a:r>
+              <a:rPr lang="en-US" dirty="0" smtClean="0"/>
+              <a:t>Find item in array</a:t>
+            </a:r>
+          </a:p>
+          <a:p>
+            <a:pPr marL="0" indent="0">
+              <a:buNone/>
+            </a:pPr>
+            <a:endParaRPr lang="en-US" dirty="0"/>
+          </a:p>
+        </p:txBody>
+      </p:sp>
+      <p:pic>
+        <p:nvPicPr>
+          <p:cNvPr id="4" name="Picture 3"/>
+          <p:cNvPicPr>
+            <a:picLocks noChangeAspect="1"/>
+          </p:cNvPicPr>
+          <p:nvPr/>
+        </p:nvPicPr>
+        <p:blipFill>
+          <a:blip r:embed="rId2"/>
+          <a:stretch>
+            <a:fillRect/>
+          </a:stretch>
+        </p:blipFill>
+        <p:spPr>
+          <a:xfrm>
+            <a:off x="2420427" y="2641418"/>
+            <a:ext cx="4666667" cy="2447619"/>
+          </a:xfrm>
+          <a:prstGeom prst="rect">
+            <a:avLst/>
+          </a:prstGeom>
+        </p:spPr>
+      </p:pic>
+    </p:spTree>
+    <p:extLst>
+      <p:ext uri="{BB962C8B-B14F-4D97-AF65-F5344CB8AC3E}">
+        <p14:creationId xmlns:p14="http://schemas.microsoft.com/office/powerpoint/2010/main" val="1665538290"/>
+      </p:ext>
+    </p:extLst>
+  </p:cSld>
+  <p:clrMapOvr>
+    <a:masterClrMapping/>
+  </p:clrMapOvr>
+</p:sld>
+</file>
+
+<file path=ppt/slides/slide17.xml><?xml version="1.0" encoding="utf-8"?>
+<p:sld xmlns:a="http://schemas.openxmlformats.org/drawingml/2006/main" xmlns:r="http://schemas.openxmlformats.org/officeDocument/2006/relationships" xmlns:p="http://schemas.openxmlformats.org/presentationml/2006/main">
+  <p:cSld>
+    <p:spTree>
+      <p:nvGrpSpPr>
+        <p:cNvPr id="1" name=""/>
+        <p:cNvGrpSpPr/>
+        <p:nvPr/>
+      </p:nvGrpSpPr>
+      <p:grpSpPr>
+        <a:xfrm>
+          <a:off x="0" y="0"/>
+          <a:ext cx="0" cy="0"/>
+          <a:chOff x="0" y="0"/>
+          <a:chExt cx="0" cy="0"/>
+        </a:xfrm>
+      </p:grpSpPr>
+      <p:sp>
+        <p:nvSpPr>
+          <p:cNvPr id="2" name="Title 1"/>
+          <p:cNvSpPr>
+            <a:spLocks noGrp="1"/>
+          </p:cNvSpPr>
+          <p:nvPr>
+            <p:ph type="title"/>
+          </p:nvPr>
+        </p:nvSpPr>
+        <p:spPr/>
+        <p:txBody>
+          <a:bodyPr/>
+          <a:lstStyle/>
+          <a:p>
+            <a:r>
+              <a:rPr lang="en-US" dirty="0" smtClean="0"/>
+              <a:t>New school</a:t>
+            </a:r>
+            <a:endParaRPr lang="en-US" dirty="0"/>
+          </a:p>
+        </p:txBody>
+      </p:sp>
+      <p:sp>
+        <p:nvSpPr>
+          <p:cNvPr id="3" name="Content Placeholder 2"/>
+          <p:cNvSpPr>
+            <a:spLocks noGrp="1"/>
+          </p:cNvSpPr>
+          <p:nvPr>
+            <p:ph idx="1"/>
+          </p:nvPr>
+        </p:nvSpPr>
+        <p:spPr/>
+        <p:txBody>
+          <a:bodyPr/>
+          <a:lstStyle/>
+          <a:p>
+            <a:r>
+              <a:rPr lang="en-US" dirty="0"/>
+              <a:t>Find item in array</a:t>
+            </a:r>
+          </a:p>
+          <a:p>
+            <a:endParaRPr lang="en-US" dirty="0"/>
+          </a:p>
+        </p:txBody>
+      </p:sp>
+      <p:pic>
+        <p:nvPicPr>
+          <p:cNvPr id="4098" name="Picture 2" descr="C:\Users\paynek\AppData\Local\Temp\SNAGHTML1f4e2bee.PNG"/>
+          <p:cNvPicPr>
+            <a:picLocks noChangeAspect="1" noChangeArrowheads="1"/>
+          </p:cNvPicPr>
+          <p:nvPr/>
+        </p:nvPicPr>
+        <p:blipFill>
+          <a:blip r:embed="rId2">
+            <a:extLst>
+              <a:ext uri="{28A0092B-C50C-407E-A947-70E740481C1C}">
+                <a14:useLocalDpi xmlns:a14="http://schemas.microsoft.com/office/drawing/2010/main" val="0"/>
+              </a:ext>
+            </a:extLst>
+          </a:blip>
+          <a:srcRect/>
+          <a:stretch>
+            <a:fillRect/>
+          </a:stretch>
+        </p:blipFill>
+        <p:spPr bwMode="auto">
+          <a:xfrm>
+            <a:off x="3032999" y="2775955"/>
+            <a:ext cx="5505450" cy="2924176"/>
+          </a:xfrm>
+          <a:prstGeom prst="rect">
+            <a:avLst/>
+          </a:prstGeom>
+          <a:noFill/>
+          <a:extLst>
+            <a:ext uri="{909E8E84-426E-40DD-AFC4-6F175D3DCCD1}">
+              <a14:hiddenFill xmlns:a14="http://schemas.microsoft.com/office/drawing/2010/main">
+                <a:solidFill>
+                  <a:srgbClr val="FFFFFF"/>
+                </a:solidFill>
+              </a14:hiddenFill>
+            </a:ext>
+          </a:extLst>
+        </p:spPr>
+      </p:pic>
+    </p:spTree>
+    <p:extLst>
+      <p:ext uri="{BB962C8B-B14F-4D97-AF65-F5344CB8AC3E}">
+        <p14:creationId xmlns:p14="http://schemas.microsoft.com/office/powerpoint/2010/main" val="3176537759"/>
+      </p:ext>
+    </p:extLst>
+  </p:cSld>
+  <p:clrMapOvr>
+    <a:masterClrMapping/>
+  </p:clrMapOvr>
+</p:sld>
+</file>
+
+<file path=ppt/slides/slide18.xml><?xml version="1.0" encoding="utf-8"?>
+<p:sld xmlns:a="http://schemas.openxmlformats.org/drawingml/2006/main" xmlns:r="http://schemas.openxmlformats.org/officeDocument/2006/relationships" xmlns:p="http://schemas.openxmlformats.org/presentationml/2006/main">
+  <p:cSld>
+    <p:spTree>
+      <p:nvGrpSpPr>
+        <p:cNvPr id="1" name=""/>
+        <p:cNvGrpSpPr/>
+        <p:nvPr/>
+      </p:nvGrpSpPr>
+      <p:grpSpPr>
+        <a:xfrm>
+          <a:off x="0" y="0"/>
+          <a:ext cx="0" cy="0"/>
+          <a:chOff x="0" y="0"/>
+          <a:chExt cx="0" cy="0"/>
+        </a:xfrm>
+      </p:grpSpPr>
+      <p:sp>
+        <p:nvSpPr>
+          <p:cNvPr id="2" name="Title 1"/>
+          <p:cNvSpPr>
+            <a:spLocks noGrp="1"/>
+          </p:cNvSpPr>
+          <p:nvPr>
+            <p:ph type="title"/>
+          </p:nvPr>
+        </p:nvSpPr>
+        <p:spPr/>
+        <p:txBody>
+          <a:bodyPr/>
+          <a:lstStyle/>
+          <a:p>
+            <a:r>
+              <a:rPr lang="en-US" dirty="0"/>
+              <a:t>C# Good to know</a:t>
+            </a:r>
+          </a:p>
+        </p:txBody>
+      </p:sp>
+      <p:sp>
+        <p:nvSpPr>
+          <p:cNvPr id="3" name="Content Placeholder 2"/>
+          <p:cNvSpPr>
+            <a:spLocks noGrp="1"/>
+          </p:cNvSpPr>
+          <p:nvPr>
+            <p:ph idx="1"/>
+          </p:nvPr>
+        </p:nvSpPr>
+        <p:spPr/>
+        <p:txBody>
+          <a:bodyPr/>
+          <a:lstStyle/>
+          <a:p>
+            <a:r>
+              <a:rPr lang="en-US" dirty="0" smtClean="0"/>
+              <a:t>Classes may be extended using extension methods</a:t>
+            </a:r>
+          </a:p>
+          <a:p>
+            <a:pPr marL="0" indent="0">
+              <a:buNone/>
+            </a:pPr>
+            <a:r>
+              <a:rPr lang="en-US" dirty="0" smtClean="0"/>
+              <a:t> </a:t>
+            </a:r>
+            <a:endParaRPr lang="en-US" dirty="0"/>
+          </a:p>
+        </p:txBody>
+      </p:sp>
+      <p:pic>
+        <p:nvPicPr>
+          <p:cNvPr id="4" name="Picture 3"/>
+          <p:cNvPicPr>
+            <a:picLocks noChangeAspect="1"/>
+          </p:cNvPicPr>
+          <p:nvPr/>
+        </p:nvPicPr>
+        <p:blipFill>
+          <a:blip r:embed="rId2"/>
+          <a:stretch>
+            <a:fillRect/>
+          </a:stretch>
+        </p:blipFill>
+        <p:spPr>
+          <a:xfrm>
+            <a:off x="2207435" y="2296226"/>
+            <a:ext cx="6200000" cy="4228571"/>
+          </a:xfrm>
+          <a:prstGeom prst="rect">
+            <a:avLst/>
+          </a:prstGeom>
+        </p:spPr>
+      </p:pic>
+    </p:spTree>
+    <p:extLst>
+      <p:ext uri="{BB962C8B-B14F-4D97-AF65-F5344CB8AC3E}">
+        <p14:creationId xmlns:p14="http://schemas.microsoft.com/office/powerpoint/2010/main" val="3986134717"/>
+      </p:ext>
+    </p:extLst>
+  </p:cSld>
+  <p:clrMapOvr>
+    <a:masterClrMapping/>
+  </p:clrMapOvr>
+  <p:timing>
+    <p:tnLst>
+      <p:par>
+        <p:cTn id="1" dur="indefinite" restart="never" nodeType="tmRoot"/>
+      </p:par>
+    </p:tnLst>
+  </p:timing>
+</p:sld>
+</file>
+
+<file path=ppt/slides/slide19.xml><?xml version="1.0" encoding="utf-8"?>
+<p:sld xmlns:a="http://schemas.openxmlformats.org/drawingml/2006/main" xmlns:r="http://schemas.openxmlformats.org/officeDocument/2006/relationships" xmlns:p="http://schemas.openxmlformats.org/presentationml/2006/main">
+  <p:cSld>
+    <p:spTree>
+      <p:nvGrpSpPr>
+        <p:cNvPr id="1" name=""/>
+        <p:cNvGrpSpPr/>
+        <p:nvPr/>
+      </p:nvGrpSpPr>
+      <p:grpSpPr>
+        <a:xfrm>
+          <a:off x="0" y="0"/>
+          <a:ext cx="0" cy="0"/>
+          <a:chOff x="0" y="0"/>
+          <a:chExt cx="0" cy="0"/>
+        </a:xfrm>
+      </p:grpSpPr>
+      <p:sp>
+        <p:nvSpPr>
+          <p:cNvPr id="2" name="Title 1"/>
+          <p:cNvSpPr>
+            <a:spLocks noGrp="1"/>
+          </p:cNvSpPr>
+          <p:nvPr>
+            <p:ph type="title"/>
+          </p:nvPr>
+        </p:nvSpPr>
+        <p:spPr/>
+        <p:txBody>
+          <a:bodyPr/>
+          <a:lstStyle/>
+          <a:p>
+            <a:r>
+              <a:rPr lang="en-US" dirty="0"/>
+              <a:t>C# Good to know</a:t>
+            </a:r>
+          </a:p>
+        </p:txBody>
+      </p:sp>
+      <p:sp>
+        <p:nvSpPr>
+          <p:cNvPr id="3" name="Content Placeholder 2"/>
+          <p:cNvSpPr>
+            <a:spLocks noGrp="1"/>
+          </p:cNvSpPr>
+          <p:nvPr>
+            <p:ph idx="1"/>
+          </p:nvPr>
+        </p:nvSpPr>
+        <p:spPr/>
+        <p:txBody>
+          <a:bodyPr/>
+          <a:lstStyle/>
+          <a:p>
+            <a:r>
+              <a:rPr lang="en-US" dirty="0"/>
+              <a:t>Classes may be extended using extension methods</a:t>
+            </a:r>
+          </a:p>
+          <a:p>
+            <a:pPr marL="0" indent="0">
+              <a:buNone/>
+            </a:pPr>
+            <a:endParaRPr lang="en-US" dirty="0"/>
+          </a:p>
+        </p:txBody>
+      </p:sp>
+      <p:pic>
+        <p:nvPicPr>
+          <p:cNvPr id="4" name="Picture 3"/>
+          <p:cNvPicPr>
+            <a:picLocks noChangeAspect="1"/>
+          </p:cNvPicPr>
+          <p:nvPr/>
+        </p:nvPicPr>
+        <p:blipFill>
+          <a:blip r:embed="rId2"/>
+          <a:stretch>
+            <a:fillRect/>
+          </a:stretch>
+        </p:blipFill>
+        <p:spPr>
+          <a:xfrm>
+            <a:off x="3540153" y="2225530"/>
+            <a:ext cx="4234615" cy="4541348"/>
+          </a:xfrm>
+          <a:prstGeom prst="rect">
+            <a:avLst/>
+          </a:prstGeom>
+        </p:spPr>
+      </p:pic>
+    </p:spTree>
+    <p:extLst>
+      <p:ext uri="{BB962C8B-B14F-4D97-AF65-F5344CB8AC3E}">
+        <p14:creationId xmlns:p14="http://schemas.microsoft.com/office/powerpoint/2010/main" val="1875669824"/>
+      </p:ext>
+    </p:extLst>
+  </p:cSld>
+  <p:clrMapOvr>
+    <a:masterClrMapping/>
+  </p:clrMapOvr>
+  <p:timing>
+    <p:tnLst>
+      <p:par>
+        <p:cTn id="1" dur="indefinite" restart="never" nodeType="tmRoot"/>
+      </p:par>
+    </p:tnLst>
+  </p:timing>
+</p:sld>
+</file>
+
+<file path=ppt/slides/slide2.xml><?xml version="1.0" encoding="utf-8"?>
+<p:sld xmlns:a="http://schemas.openxmlformats.org/drawingml/2006/main" xmlns:r="http://schemas.openxmlformats.org/officeDocument/2006/relationships" xmlns:p="http://schemas.openxmlformats.org/presentationml/2006/main">
+  <p:cSld>
+    <p:spTree>
+      <p:nvGrpSpPr>
+        <p:cNvPr id="1" name=""/>
+        <p:cNvGrpSpPr/>
+        <p:nvPr/>
+      </p:nvGrpSpPr>
+      <p:grpSpPr>
+        <a:xfrm>
+          <a:off x="0" y="0"/>
+          <a:ext cx="0" cy="0"/>
+          <a:chOff x="0" y="0"/>
+          <a:chExt cx="0" cy="0"/>
+        </a:xfrm>
+      </p:grpSpPr>
+      <p:sp>
+        <p:nvSpPr>
+          <p:cNvPr id="2" name="Title 1"/>
+          <p:cNvSpPr>
+            <a:spLocks noGrp="1"/>
+          </p:cNvSpPr>
+          <p:nvPr>
+            <p:ph type="title"/>
+          </p:nvPr>
+        </p:nvSpPr>
+        <p:spPr/>
+        <p:txBody>
+          <a:bodyPr/>
+          <a:lstStyle/>
+          <a:p>
+            <a:r>
+              <a:rPr lang="en-US" dirty="0" smtClean="0"/>
+              <a:t>Introduction</a:t>
+            </a:r>
+            <a:endParaRPr lang="en-US" dirty="0"/>
+          </a:p>
+        </p:txBody>
+      </p:sp>
+      <p:sp>
+        <p:nvSpPr>
+          <p:cNvPr id="3" name="Content Placeholder 2"/>
+          <p:cNvSpPr>
+            <a:spLocks noGrp="1"/>
+          </p:cNvSpPr>
+          <p:nvPr>
+            <p:ph idx="1"/>
+          </p:nvPr>
+        </p:nvSpPr>
+        <p:spPr/>
+        <p:txBody>
+          <a:bodyPr>
+            <a:normAutofit/>
+          </a:bodyPr>
+          <a:lstStyle/>
+          <a:p>
+            <a:r>
+              <a:rPr lang="en-US" sz="2000" dirty="0" smtClean="0"/>
+              <a:t>Is a creative launch pad that you use to edit, debug and build code.</a:t>
+            </a:r>
+          </a:p>
+          <a:p>
+            <a:r>
+              <a:rPr lang="en-US" sz="2000" dirty="0"/>
+              <a:t>F</a:t>
+            </a:r>
+            <a:r>
+              <a:rPr lang="en-US" sz="2000" dirty="0" smtClean="0"/>
+              <a:t>eature-rich program that can be used for many aspects of software development</a:t>
+            </a:r>
+            <a:endParaRPr lang="en-US" sz="2000" dirty="0"/>
+          </a:p>
+        </p:txBody>
+      </p:sp>
+    </p:spTree>
+    <p:extLst>
+      <p:ext uri="{BB962C8B-B14F-4D97-AF65-F5344CB8AC3E}">
+        <p14:creationId xmlns:p14="http://schemas.microsoft.com/office/powerpoint/2010/main" val="1666761066"/>
+      </p:ext>
+    </p:extLst>
+  </p:cSld>
+  <p:clrMapOvr>
+    <a:masterClrMapping/>
+  </p:clrMapOvr>
+  <p:timing>
+    <p:tnLst>
+      <p:par>
+        <p:cTn id="1" dur="indefinite" restart="never" nodeType="tmRoot"/>
+      </p:par>
+    </p:tnLst>
+  </p:timing>
+</p:sld>
+</file>
+
+<file path=ppt/slides/slide20.xml><?xml version="1.0" encoding="utf-8"?>
+<p:sld xmlns:a="http://schemas.openxmlformats.org/drawingml/2006/main" xmlns:r="http://schemas.openxmlformats.org/officeDocument/2006/relationships" xmlns:p="http://schemas.openxmlformats.org/presentationml/2006/main">
+  <p:cSld>
+    <p:spTree>
+      <p:nvGrpSpPr>
+        <p:cNvPr id="1" name=""/>
+        <p:cNvGrpSpPr/>
+        <p:nvPr/>
+      </p:nvGrpSpPr>
+      <p:grpSpPr>
+        <a:xfrm>
+          <a:off x="0" y="0"/>
+          <a:ext cx="0" cy="0"/>
+          <a:chOff x="0" y="0"/>
+          <a:chExt cx="0" cy="0"/>
+        </a:xfrm>
+      </p:grpSpPr>
+      <p:sp>
+        <p:nvSpPr>
+          <p:cNvPr id="2" name="Title 1"/>
+          <p:cNvSpPr>
+            <a:spLocks noGrp="1"/>
+          </p:cNvSpPr>
+          <p:nvPr>
+            <p:ph type="title"/>
+          </p:nvPr>
+        </p:nvSpPr>
+        <p:spPr/>
+        <p:txBody>
+          <a:bodyPr/>
+          <a:lstStyle/>
+          <a:p>
+            <a:r>
+              <a:rPr lang="en-US" b="1" dirty="0" smtClean="0"/>
+              <a:t>ASP.NET Core Documentation</a:t>
+            </a:r>
+            <a:endParaRPr lang="en-US" dirty="0"/>
+          </a:p>
+        </p:txBody>
+      </p:sp>
+      <p:sp>
+        <p:nvSpPr>
+          <p:cNvPr id="3" name="Content Placeholder 2"/>
+          <p:cNvSpPr>
+            <a:spLocks noGrp="1"/>
+          </p:cNvSpPr>
+          <p:nvPr>
+            <p:ph idx="1"/>
+          </p:nvPr>
+        </p:nvSpPr>
+        <p:spPr/>
+        <p:txBody>
+          <a:bodyPr>
+            <a:normAutofit/>
+          </a:bodyPr>
+          <a:lstStyle/>
+          <a:p>
+            <a:pPr marL="0" indent="0">
+              <a:buNone/>
+            </a:pPr>
+            <a:r>
+              <a:rPr lang="en-US" sz="2000" dirty="0"/>
+              <a:t>ASP.NET Core is a new open-source and cross-platform .NET framework for building modern cloud-based web </a:t>
+            </a:r>
+            <a:r>
+              <a:rPr lang="en-US" sz="2000" dirty="0" smtClean="0"/>
+              <a:t>applications </a:t>
+            </a:r>
+            <a:r>
+              <a:rPr lang="en-US" sz="2000" dirty="0"/>
+              <a:t>on Windows, Mac, or Linux</a:t>
+            </a:r>
+            <a:r>
+              <a:rPr lang="en-US" sz="2000" dirty="0" smtClean="0"/>
+              <a:t>.</a:t>
+            </a:r>
+          </a:p>
+          <a:p>
+            <a:pPr marL="0" indent="0">
+              <a:buNone/>
+            </a:pPr>
+            <a:endParaRPr lang="en-US" sz="2000" dirty="0"/>
+          </a:p>
+          <a:p>
+            <a:pPr marL="0" indent="0">
+              <a:buNone/>
+            </a:pPr>
+            <a:r>
+              <a:rPr lang="en-US" sz="2000" dirty="0">
+                <a:hlinkClick r:id="rId2"/>
+              </a:rPr>
+              <a:t>https://docs.microsoft.com/en-us/aspnet/?</a:t>
+            </a:r>
+            <a:r>
+              <a:rPr lang="en-US" sz="2000" dirty="0" smtClean="0">
+                <a:hlinkClick r:id="rId2"/>
+              </a:rPr>
+              <a:t>view=aspnetcore-2.2#pivot=core&amp;panel=core_overview</a:t>
+            </a:r>
+            <a:endParaRPr lang="en-US" sz="2000" dirty="0" smtClean="0"/>
+          </a:p>
+          <a:p>
+            <a:pPr marL="0" indent="0">
+              <a:buNone/>
+            </a:pPr>
+            <a:endParaRPr lang="en-US" sz="2000" dirty="0" smtClean="0"/>
+          </a:p>
+          <a:p>
+            <a:pPr marL="0" indent="0">
+              <a:buNone/>
+            </a:pPr>
+            <a:r>
+              <a:rPr lang="en-US" sz="2000" dirty="0" smtClean="0"/>
+              <a:t>Tutorials</a:t>
+            </a:r>
+            <a:endParaRPr lang="en-US" sz="2000" dirty="0"/>
+          </a:p>
+          <a:p>
+            <a:pPr marL="0" indent="0">
+              <a:buNone/>
+            </a:pPr>
+            <a:r>
+              <a:rPr lang="en-US" sz="2000" dirty="0">
+                <a:hlinkClick r:id="rId3"/>
+              </a:rPr>
+              <a:t>https://www.tutorialspoint.com/asp.net_core/</a:t>
+            </a:r>
+            <a:endParaRPr lang="en-US" sz="2000" dirty="0"/>
+          </a:p>
+        </p:txBody>
+      </p:sp>
+    </p:spTree>
+    <p:extLst>
+      <p:ext uri="{BB962C8B-B14F-4D97-AF65-F5344CB8AC3E}">
+        <p14:creationId xmlns:p14="http://schemas.microsoft.com/office/powerpoint/2010/main" val="857302663"/>
+      </p:ext>
+    </p:extLst>
+  </p:cSld>
+  <p:clrMapOvr>
+    <a:masterClrMapping/>
+  </p:clrMapOvr>
+  <p:timing>
+    <p:tnLst>
+      <p:par>
+        <p:cTn id="1" dur="indefinite" restart="never" nodeType="tmRoot"/>
+      </p:par>
+    </p:tnLst>
+  </p:timing>
+</p:sld>
+</file>
+
+<file path=ppt/slides/slide21.xml><?xml version="1.0" encoding="utf-8"?>
+<p:sld xmlns:a="http://schemas.openxmlformats.org/drawingml/2006/main" xmlns:r="http://schemas.openxmlformats.org/officeDocument/2006/relationships" xmlns:p="http://schemas.openxmlformats.org/presentationml/2006/main">
+  <p:cSld>
+    <p:spTree>
+      <p:nvGrpSpPr>
+        <p:cNvPr id="1" name=""/>
+        <p:cNvGrpSpPr/>
+        <p:nvPr/>
+      </p:nvGrpSpPr>
+      <p:grpSpPr>
+        <a:xfrm>
+          <a:off x="0" y="0"/>
+          <a:ext cx="0" cy="0"/>
+          <a:chOff x="0" y="0"/>
+          <a:chExt cx="0" cy="0"/>
+        </a:xfrm>
+      </p:grpSpPr>
+      <p:sp>
+        <p:nvSpPr>
+          <p:cNvPr id="2" name="Title 1"/>
+          <p:cNvSpPr>
+            <a:spLocks noGrp="1"/>
+          </p:cNvSpPr>
+          <p:nvPr>
+            <p:ph type="title"/>
+          </p:nvPr>
+        </p:nvSpPr>
+        <p:spPr/>
+        <p:txBody>
+          <a:bodyPr/>
+          <a:lstStyle/>
+          <a:p>
+            <a:r>
               <a:rPr lang="en-US" b="1" dirty="0"/>
               <a:t>Entity Framework </a:t>
             </a:r>
@@ -3633,7 +4634,7 @@
 </p:sld>
 </file>
 
-<file path=ppt/slides/slide15.xml><?xml version="1.0" encoding="utf-8"?>
+<file path=ppt/slides/slide22.xml><?xml version="1.0" encoding="utf-8"?>
 <p:sld xmlns:a="http://schemas.openxmlformats.org/drawingml/2006/main" xmlns:r="http://schemas.openxmlformats.org/officeDocument/2006/relationships" xmlns:p="http://schemas.openxmlformats.org/presentationml/2006/main">
   <p:cSld>
     <p:spTree>
@@ -3746,7 +4747,7 @@
 </p:sld>
 </file>
 
-<file path=ppt/slides/slide16.xml><?xml version="1.0" encoding="utf-8"?>
+<file path=ppt/slides/slide23.xml><?xml version="1.0" encoding="utf-8"?>
 <p:sld xmlns:a="http://schemas.openxmlformats.org/drawingml/2006/main" xmlns:r="http://schemas.openxmlformats.org/officeDocument/2006/relationships" xmlns:p="http://schemas.openxmlformats.org/presentationml/2006/main">
   <p:cSld>
     <p:spTree>
@@ -3851,7 +4852,7 @@
 </p:sld>
 </file>
 
-<file path=ppt/slides/slide17.xml><?xml version="1.0" encoding="utf-8"?>
+<file path=ppt/slides/slide24.xml><?xml version="1.0" encoding="utf-8"?>
 <p:sld xmlns:a="http://schemas.openxmlformats.org/drawingml/2006/main" xmlns:r="http://schemas.openxmlformats.org/officeDocument/2006/relationships" xmlns:p="http://schemas.openxmlformats.org/presentationml/2006/main">
   <p:cSld>
     <p:spTree>
@@ -3930,7 +4931,7 @@
 </p:sld>
 </file>
 
-<file path=ppt/slides/slide18.xml><?xml version="1.0" encoding="utf-8"?>
+<file path=ppt/slides/slide25.xml><?xml version="1.0" encoding="utf-8"?>
 <p:sld xmlns:a="http://schemas.openxmlformats.org/drawingml/2006/main" xmlns:r="http://schemas.openxmlformats.org/officeDocument/2006/relationships" xmlns:p="http://schemas.openxmlformats.org/presentationml/2006/main">
   <p:cSld>
     <p:spTree>
@@ -4040,7 +5041,7 @@
 </p:sld>
 </file>
 
-<file path=ppt/slides/slide19.xml><?xml version="1.0" encoding="utf-8"?>
+<file path=ppt/slides/slide26.xml><?xml version="1.0" encoding="utf-8"?>
 <p:sld xmlns:a="http://schemas.openxmlformats.org/drawingml/2006/main" xmlns:r="http://schemas.openxmlformats.org/officeDocument/2006/relationships" xmlns:p="http://schemas.openxmlformats.org/presentationml/2006/main">
   <p:cSld>
     <p:spTree>
@@ -4151,7 +5152,7 @@
 </p:sld>
 </file>
 
-<file path=ppt/slides/slide2.xml><?xml version="1.0" encoding="utf-8"?>
+<file path=ppt/slides/slide27.xml><?xml version="1.0" encoding="utf-8"?>
 <p:sld xmlns:a="http://schemas.openxmlformats.org/drawingml/2006/main" xmlns:r="http://schemas.openxmlformats.org/officeDocument/2006/relationships" xmlns:p="http://schemas.openxmlformats.org/presentationml/2006/main">
   <p:cSld>
     <p:spTree>
@@ -4185,101 +5186,6 @@
           <a:p>
             <a:r>
               <a:rPr lang="en-US" dirty="0" smtClean="0"/>
-              <a:t>Introduction</a:t>
-            </a:r>
-            <a:endParaRPr lang="en-US" dirty="0"/>
-          </a:p>
-        </p:txBody>
-      </p:sp>
-      <p:sp>
-        <p:nvSpPr>
-          <p:cNvPr id="3" name="Content Placeholder 2"/>
-          <p:cNvSpPr>
-            <a:spLocks noGrp="1"/>
-          </p:cNvSpPr>
-          <p:nvPr>
-            <p:ph idx="1"/>
-          </p:nvPr>
-        </p:nvSpPr>
-        <p:spPr/>
-        <p:txBody>
-          <a:bodyPr>
-            <a:normAutofit/>
-          </a:bodyPr>
-          <a:lstStyle/>
-          <a:p>
-            <a:r>
-              <a:rPr lang="en-US" sz="2000" dirty="0" smtClean="0"/>
-              <a:t>Is a creative launch pad that you use to edit, debug and build code.</a:t>
-            </a:r>
-          </a:p>
-          <a:p>
-            <a:r>
-              <a:rPr lang="en-US" sz="2000" dirty="0"/>
-              <a:t>F</a:t>
-            </a:r>
-            <a:r>
-              <a:rPr lang="en-US" sz="2000" dirty="0" smtClean="0"/>
-              <a:t>eature-rich program that can be used for many aspects of software development</a:t>
-            </a:r>
-            <a:endParaRPr lang="en-US" sz="2000" dirty="0"/>
-          </a:p>
-        </p:txBody>
-      </p:sp>
-    </p:spTree>
-    <p:extLst>
-      <p:ext uri="{BB962C8B-B14F-4D97-AF65-F5344CB8AC3E}">
-        <p14:creationId xmlns:p14="http://schemas.microsoft.com/office/powerpoint/2010/main" val="1666761066"/>
-      </p:ext>
-    </p:extLst>
-  </p:cSld>
-  <p:clrMapOvr>
-    <a:masterClrMapping/>
-  </p:clrMapOvr>
-  <p:timing>
-    <p:tnLst>
-      <p:par>
-        <p:cTn id="1" dur="indefinite" restart="never" nodeType="tmRoot"/>
-      </p:par>
-    </p:tnLst>
-  </p:timing>
-</p:sld>
-</file>
-
-<file path=ppt/slides/slide20.xml><?xml version="1.0" encoding="utf-8"?>
-<p:sld xmlns:a="http://schemas.openxmlformats.org/drawingml/2006/main" xmlns:r="http://schemas.openxmlformats.org/officeDocument/2006/relationships" xmlns:p="http://schemas.openxmlformats.org/presentationml/2006/main">
-  <p:cSld>
-    <p:spTree>
-      <p:nvGrpSpPr>
-        <p:cNvPr id="1" name=""/>
-        <p:cNvGrpSpPr/>
-        <p:nvPr/>
-      </p:nvGrpSpPr>
-      <p:grpSpPr>
-        <a:xfrm>
-          <a:off x="0" y="0"/>
-          <a:ext cx="0" cy="0"/>
-          <a:chOff x="0" y="0"/>
-          <a:chExt cx="0" cy="0"/>
-        </a:xfrm>
-      </p:grpSpPr>
-      <p:sp>
-        <p:nvSpPr>
-          <p:cNvPr id="2" name="Title 1"/>
-          <p:cNvSpPr>
-            <a:spLocks noGrp="1"/>
-          </p:cNvSpPr>
-          <p:nvPr>
-            <p:ph type="title"/>
-          </p:nvPr>
-        </p:nvSpPr>
-        <p:spPr/>
-        <p:txBody>
-          <a:bodyPr/>
-          <a:lstStyle/>
-          <a:p>
-            <a:r>
-              <a:rPr lang="en-US" dirty="0" smtClean="0"/>
               <a:t>Entity Framework loading</a:t>
             </a:r>
             <a:endParaRPr lang="en-US" dirty="0"/>
@@ -4340,7 +5246,7 @@
 </p:sld>
 </file>
 
-<file path=ppt/slides/slide21.xml><?xml version="1.0" encoding="utf-8"?>
+<file path=ppt/slides/slide28.xml><?xml version="1.0" encoding="utf-8"?>
 <p:sld xmlns:a="http://schemas.openxmlformats.org/drawingml/2006/main" xmlns:r="http://schemas.openxmlformats.org/officeDocument/2006/relationships" xmlns:p="http://schemas.openxmlformats.org/presentationml/2006/main">
   <p:cSld>
     <p:spTree>

</xml_diff>

<commit_message>
Updated power point, refactors on test.
</commit_message>
<xml_diff>
--- a/PowerPoint/Working with Visual Studio.pptx
+++ b/PowerPoint/Working with Visual Studio.pptx
@@ -270,7 +270,7 @@
           <a:p>
             <a:fld id="{595C178B-5A77-496A-9807-14D7EFE9DB5D}" type="datetimeFigureOut">
               <a:rPr lang="en-US" smtClean="0"/>
-              <a:t>6/10/2019</a:t>
+              <a:t>6/11/2019</a:t>
             </a:fld>
             <a:endParaRPr lang="en-US"/>
           </a:p>
@@ -440,7 +440,7 @@
           <a:p>
             <a:fld id="{595C178B-5A77-496A-9807-14D7EFE9DB5D}" type="datetimeFigureOut">
               <a:rPr lang="en-US" smtClean="0"/>
-              <a:t>6/10/2019</a:t>
+              <a:t>6/11/2019</a:t>
             </a:fld>
             <a:endParaRPr lang="en-US"/>
           </a:p>
@@ -620,7 +620,7 @@
           <a:p>
             <a:fld id="{595C178B-5A77-496A-9807-14D7EFE9DB5D}" type="datetimeFigureOut">
               <a:rPr lang="en-US" smtClean="0"/>
-              <a:t>6/10/2019</a:t>
+              <a:t>6/11/2019</a:t>
             </a:fld>
             <a:endParaRPr lang="en-US"/>
           </a:p>
@@ -790,7 +790,7 @@
           <a:p>
             <a:fld id="{595C178B-5A77-496A-9807-14D7EFE9DB5D}" type="datetimeFigureOut">
               <a:rPr lang="en-US" smtClean="0"/>
-              <a:t>6/10/2019</a:t>
+              <a:t>6/11/2019</a:t>
             </a:fld>
             <a:endParaRPr lang="en-US"/>
           </a:p>
@@ -1036,7 +1036,7 @@
           <a:p>
             <a:fld id="{595C178B-5A77-496A-9807-14D7EFE9DB5D}" type="datetimeFigureOut">
               <a:rPr lang="en-US" smtClean="0"/>
-              <a:t>6/10/2019</a:t>
+              <a:t>6/11/2019</a:t>
             </a:fld>
             <a:endParaRPr lang="en-US"/>
           </a:p>
@@ -1268,7 +1268,7 @@
           <a:p>
             <a:fld id="{595C178B-5A77-496A-9807-14D7EFE9DB5D}" type="datetimeFigureOut">
               <a:rPr lang="en-US" smtClean="0"/>
-              <a:t>6/10/2019</a:t>
+              <a:t>6/11/2019</a:t>
             </a:fld>
             <a:endParaRPr lang="en-US"/>
           </a:p>
@@ -1635,7 +1635,7 @@
           <a:p>
             <a:fld id="{595C178B-5A77-496A-9807-14D7EFE9DB5D}" type="datetimeFigureOut">
               <a:rPr lang="en-US" smtClean="0"/>
-              <a:t>6/10/2019</a:t>
+              <a:t>6/11/2019</a:t>
             </a:fld>
             <a:endParaRPr lang="en-US"/>
           </a:p>
@@ -1753,7 +1753,7 @@
           <a:p>
             <a:fld id="{595C178B-5A77-496A-9807-14D7EFE9DB5D}" type="datetimeFigureOut">
               <a:rPr lang="en-US" smtClean="0"/>
-              <a:t>6/10/2019</a:t>
+              <a:t>6/11/2019</a:t>
             </a:fld>
             <a:endParaRPr lang="en-US"/>
           </a:p>
@@ -1848,7 +1848,7 @@
           <a:p>
             <a:fld id="{595C178B-5A77-496A-9807-14D7EFE9DB5D}" type="datetimeFigureOut">
               <a:rPr lang="en-US" smtClean="0"/>
-              <a:t>6/10/2019</a:t>
+              <a:t>6/11/2019</a:t>
             </a:fld>
             <a:endParaRPr lang="en-US"/>
           </a:p>
@@ -2125,7 +2125,7 @@
           <a:p>
             <a:fld id="{595C178B-5A77-496A-9807-14D7EFE9DB5D}" type="datetimeFigureOut">
               <a:rPr lang="en-US" smtClean="0"/>
-              <a:t>6/10/2019</a:t>
+              <a:t>6/11/2019</a:t>
             </a:fld>
             <a:endParaRPr lang="en-US"/>
           </a:p>
@@ -2378,7 +2378,7 @@
           <a:p>
             <a:fld id="{595C178B-5A77-496A-9807-14D7EFE9DB5D}" type="datetimeFigureOut">
               <a:rPr lang="en-US" smtClean="0"/>
-              <a:t>6/10/2019</a:t>
+              <a:t>6/11/2019</a:t>
             </a:fld>
             <a:endParaRPr lang="en-US"/>
           </a:p>
@@ -2591,7 +2591,7 @@
           <a:p>
             <a:fld id="{595C178B-5A77-496A-9807-14D7EFE9DB5D}" type="datetimeFigureOut">
               <a:rPr lang="en-US" smtClean="0"/>
-              <a:t>6/10/2019</a:t>
+              <a:t>6/11/2019</a:t>
             </a:fld>
             <a:endParaRPr lang="en-US"/>
           </a:p>
@@ -3276,7 +3276,9 @@
         </p:nvSpPr>
         <p:spPr/>
         <p:txBody>
-          <a:bodyPr/>
+          <a:bodyPr>
+            <a:normAutofit lnSpcReduction="10000"/>
+          </a:bodyPr>
           <a:lstStyle/>
           <a:p>
             <a:pPr marL="0" indent="0">
@@ -3359,7 +3361,33 @@
           <a:p>
             <a:r>
               <a:rPr lang="en-US" sz="2000" dirty="0"/>
-              <a:t>Experienced C# developers:</a:t>
+              <a:t>Experienced C# developers</a:t>
+            </a:r>
+            <a:r>
+              <a:rPr lang="en-US" sz="2000" dirty="0" smtClean="0"/>
+              <a:t>:</a:t>
+            </a:r>
+          </a:p>
+          <a:p>
+            <a:r>
+              <a:rPr lang="en-US" sz="2000" dirty="0" smtClean="0"/>
+              <a:t>Using resources on the web – example (style </a:t>
+            </a:r>
+            <a:r>
+              <a:rPr lang="en-US" sz="2000" smtClean="0"/>
+              <a:t>of author)</a:t>
+            </a:r>
+            <a:endParaRPr lang="en-US" sz="2000" dirty="0" smtClean="0"/>
+          </a:p>
+          <a:p>
+            <a:pPr marL="0" indent="0">
+              <a:buNone/>
+            </a:pPr>
+            <a:r>
+              <a:rPr lang="en-US" sz="2000" dirty="0">
+                <a:hlinkClick r:id="rId4"/>
+              </a:rPr>
+              <a:t>https://www.tutorialspoint.com/csharp/index.htm</a:t>
             </a:r>
             <a:endParaRPr lang="en-US" sz="2000" dirty="0" smtClean="0"/>
           </a:p>
@@ -5748,12 +5776,42 @@
               <a:rPr lang="en-US" sz="2000" dirty="0" smtClean="0"/>
               <a:t>. Quick Actions can be applied by using the light bulb      or screwdriver          or by pressing CTRL+. </a:t>
             </a:r>
+            <a:endParaRPr lang="en-US" sz="2000" dirty="0" smtClean="0"/>
+          </a:p>
+          <a:p>
+            <a:r>
+              <a:rPr lang="en-US" sz="2000" dirty="0" smtClean="0"/>
+              <a:t>This item is when Resharper is installed      which is another layer of helper/assistance.</a:t>
+            </a:r>
+          </a:p>
+          <a:p>
+            <a:r>
+              <a:rPr lang="en-US" sz="2000" dirty="0" smtClean="0"/>
+              <a:t>Suggestions, create a list as shown here.</a:t>
+            </a:r>
+          </a:p>
+          <a:p>
+            <a:endParaRPr lang="en-US" sz="2000" dirty="0" smtClean="0"/>
           </a:p>
           <a:p>
             <a:pPr marL="0" indent="0">
               <a:buNone/>
             </a:pPr>
             <a:endParaRPr lang="en-US" sz="1200" dirty="0" smtClean="0"/>
+          </a:p>
+          <a:p>
+            <a:r>
+              <a:rPr lang="en-US" sz="2000" dirty="0" smtClean="0"/>
+              <a:t>Note </a:t>
+            </a:r>
+            <a:r>
+              <a:rPr lang="en-US" sz="2000" dirty="0"/>
+              <a:t>the </a:t>
+            </a:r>
+            <a:r>
+              <a:rPr lang="en-US" sz="2000" dirty="0" smtClean="0"/>
+              <a:t>squiggles, a refactor is being recommended.</a:t>
+            </a:r>
           </a:p>
           <a:p>
             <a:pPr marL="0" indent="0">
@@ -5819,6 +5877,102 @@
           <a:xfrm>
             <a:off x="6584433" y="2673005"/>
             <a:ext cx="190476" cy="314286"/>
+          </a:xfrm>
+          <a:prstGeom prst="rect">
+            <a:avLst/>
+          </a:prstGeom>
+        </p:spPr>
+      </p:pic>
+      <p:pic>
+        <p:nvPicPr>
+          <p:cNvPr id="4" name="Picture 3"/>
+          <p:cNvPicPr>
+            <a:picLocks noChangeAspect="1"/>
+          </p:cNvPicPr>
+          <p:nvPr/>
+        </p:nvPicPr>
+        <p:blipFill>
+          <a:blip r:embed="rId4"/>
+          <a:stretch>
+            <a:fillRect/>
+          </a:stretch>
+        </p:blipFill>
+        <p:spPr>
+          <a:xfrm>
+            <a:off x="5278173" y="3097958"/>
+            <a:ext cx="209524" cy="276190"/>
+          </a:xfrm>
+          <a:prstGeom prst="rect">
+            <a:avLst/>
+          </a:prstGeom>
+        </p:spPr>
+      </p:pic>
+      <p:pic>
+        <p:nvPicPr>
+          <p:cNvPr id="5" name="Picture 4"/>
+          <p:cNvPicPr>
+            <a:picLocks noChangeAspect="1"/>
+          </p:cNvPicPr>
+          <p:nvPr/>
+        </p:nvPicPr>
+        <p:blipFill>
+          <a:blip r:embed="rId5"/>
+          <a:stretch>
+            <a:fillRect/>
+          </a:stretch>
+        </p:blipFill>
+        <p:spPr>
+          <a:xfrm>
+            <a:off x="1213190" y="3845914"/>
+            <a:ext cx="3104762" cy="676190"/>
+          </a:xfrm>
+          <a:prstGeom prst="rect">
+            <a:avLst/>
+          </a:prstGeom>
+        </p:spPr>
+      </p:pic>
+      <p:pic>
+        <p:nvPicPr>
+          <p:cNvPr id="8" name="Picture 7"/>
+          <p:cNvPicPr>
+            <a:picLocks noChangeAspect="1"/>
+          </p:cNvPicPr>
+          <p:nvPr/>
+        </p:nvPicPr>
+        <p:blipFill>
+          <a:blip r:embed="rId6"/>
+          <a:stretch>
+            <a:fillRect/>
+          </a:stretch>
+        </p:blipFill>
+        <p:spPr>
+          <a:xfrm>
+            <a:off x="1213190" y="5066530"/>
+            <a:ext cx="4274507" cy="483907"/>
+          </a:xfrm>
+          <a:prstGeom prst="rect">
+            <a:avLst/>
+          </a:prstGeom>
+        </p:spPr>
+      </p:pic>
+      <p:pic>
+        <p:nvPicPr>
+          <p:cNvPr id="9" name="Picture 8"/>
+          <p:cNvPicPr>
+            <a:picLocks noChangeAspect="1"/>
+          </p:cNvPicPr>
+          <p:nvPr/>
+        </p:nvPicPr>
+        <p:blipFill>
+          <a:blip r:embed="rId7"/>
+          <a:stretch>
+            <a:fillRect/>
+          </a:stretch>
+        </p:blipFill>
+        <p:spPr>
+          <a:xfrm>
+            <a:off x="6096000" y="5293294"/>
+            <a:ext cx="4361905" cy="257143"/>
           </a:xfrm>
           <a:prstGeom prst="rect">
             <a:avLst/>

</xml_diff>

<commit_message>
List validator attruibute rule
</commit_message>
<xml_diff>
--- a/PowerPoint/Working with Visual Studio.pptx
+++ b/PowerPoint/Working with Visual Studio.pptx
@@ -5242,16 +5242,16 @@
           <a:lstStyle/>
           <a:p>
             <a:r>
+              <a:rPr lang="en-US" smtClean="0"/>
+              <a:t>Entity </a:t>
+            </a:r>
+            <a:r>
+              <a:rPr lang="en-US" smtClean="0"/>
+              <a:t>Framework </a:t>
+            </a:r>
+            <a:r>
               <a:rPr lang="en-US" dirty="0" smtClean="0"/>
-              <a:t>Entity </a:t>
-            </a:r>
-            <a:r>
-              <a:rPr lang="en-US" dirty="0" err="1" smtClean="0"/>
-              <a:t>Frameowork</a:t>
-            </a:r>
-            <a:r>
-              <a:rPr lang="en-US" dirty="0" smtClean="0"/>
-              <a:t> Reading data (simple)</a:t>
+              <a:t>Reading data (simple)</a:t>
             </a:r>
             <a:endParaRPr lang="en-US" dirty="0"/>
           </a:p>

</xml_diff>

<commit_message>
Minor updates, updated power point slide
</commit_message>
<xml_diff>
--- a/PowerPoint/Working with Visual Studio.pptx
+++ b/PowerPoint/Working with Visual Studio.pptx
@@ -28,17 +28,20 @@
     <p:sldId id="284" r:id="rId22"/>
     <p:sldId id="278" r:id="rId23"/>
     <p:sldId id="279" r:id="rId24"/>
-    <p:sldId id="265" r:id="rId25"/>
-    <p:sldId id="289" r:id="rId26"/>
-    <p:sldId id="290" r:id="rId27"/>
-    <p:sldId id="266" r:id="rId28"/>
-    <p:sldId id="271" r:id="rId29"/>
-    <p:sldId id="272" r:id="rId30"/>
-    <p:sldId id="273" r:id="rId31"/>
-    <p:sldId id="275" r:id="rId32"/>
-    <p:sldId id="274" r:id="rId33"/>
-    <p:sldId id="267" r:id="rId34"/>
-    <p:sldId id="276" r:id="rId35"/>
+    <p:sldId id="291" r:id="rId25"/>
+    <p:sldId id="265" r:id="rId26"/>
+    <p:sldId id="293" r:id="rId27"/>
+    <p:sldId id="289" r:id="rId28"/>
+    <p:sldId id="290" r:id="rId29"/>
+    <p:sldId id="292" r:id="rId30"/>
+    <p:sldId id="266" r:id="rId31"/>
+    <p:sldId id="271" r:id="rId32"/>
+    <p:sldId id="272" r:id="rId33"/>
+    <p:sldId id="273" r:id="rId34"/>
+    <p:sldId id="275" r:id="rId35"/>
+    <p:sldId id="274" r:id="rId36"/>
+    <p:sldId id="267" r:id="rId37"/>
+    <p:sldId id="276" r:id="rId38"/>
   </p:sldIdLst>
   <p:sldSz cx="12192000" cy="6858000"/>
   <p:notesSz cx="6858000" cy="9144000"/>
@@ -276,7 +279,7 @@
           <a:p>
             <a:fld id="{595C178B-5A77-496A-9807-14D7EFE9DB5D}" type="datetimeFigureOut">
               <a:rPr lang="en-US" smtClean="0"/>
-              <a:t>6/13/2019</a:t>
+              <a:t>6/14/2019</a:t>
             </a:fld>
             <a:endParaRPr lang="en-US"/>
           </a:p>
@@ -446,7 +449,7 @@
           <a:p>
             <a:fld id="{595C178B-5A77-496A-9807-14D7EFE9DB5D}" type="datetimeFigureOut">
               <a:rPr lang="en-US" smtClean="0"/>
-              <a:t>6/13/2019</a:t>
+              <a:t>6/14/2019</a:t>
             </a:fld>
             <a:endParaRPr lang="en-US"/>
           </a:p>
@@ -626,7 +629,7 @@
           <a:p>
             <a:fld id="{595C178B-5A77-496A-9807-14D7EFE9DB5D}" type="datetimeFigureOut">
               <a:rPr lang="en-US" smtClean="0"/>
-              <a:t>6/13/2019</a:t>
+              <a:t>6/14/2019</a:t>
             </a:fld>
             <a:endParaRPr lang="en-US"/>
           </a:p>
@@ -796,7 +799,7 @@
           <a:p>
             <a:fld id="{595C178B-5A77-496A-9807-14D7EFE9DB5D}" type="datetimeFigureOut">
               <a:rPr lang="en-US" smtClean="0"/>
-              <a:t>6/13/2019</a:t>
+              <a:t>6/14/2019</a:t>
             </a:fld>
             <a:endParaRPr lang="en-US"/>
           </a:p>
@@ -1042,7 +1045,7 @@
           <a:p>
             <a:fld id="{595C178B-5A77-496A-9807-14D7EFE9DB5D}" type="datetimeFigureOut">
               <a:rPr lang="en-US" smtClean="0"/>
-              <a:t>6/13/2019</a:t>
+              <a:t>6/14/2019</a:t>
             </a:fld>
             <a:endParaRPr lang="en-US"/>
           </a:p>
@@ -1274,7 +1277,7 @@
           <a:p>
             <a:fld id="{595C178B-5A77-496A-9807-14D7EFE9DB5D}" type="datetimeFigureOut">
               <a:rPr lang="en-US" smtClean="0"/>
-              <a:t>6/13/2019</a:t>
+              <a:t>6/14/2019</a:t>
             </a:fld>
             <a:endParaRPr lang="en-US"/>
           </a:p>
@@ -1641,7 +1644,7 @@
           <a:p>
             <a:fld id="{595C178B-5A77-496A-9807-14D7EFE9DB5D}" type="datetimeFigureOut">
               <a:rPr lang="en-US" smtClean="0"/>
-              <a:t>6/13/2019</a:t>
+              <a:t>6/14/2019</a:t>
             </a:fld>
             <a:endParaRPr lang="en-US"/>
           </a:p>
@@ -1759,7 +1762,7 @@
           <a:p>
             <a:fld id="{595C178B-5A77-496A-9807-14D7EFE9DB5D}" type="datetimeFigureOut">
               <a:rPr lang="en-US" smtClean="0"/>
-              <a:t>6/13/2019</a:t>
+              <a:t>6/14/2019</a:t>
             </a:fld>
             <a:endParaRPr lang="en-US"/>
           </a:p>
@@ -1854,7 +1857,7 @@
           <a:p>
             <a:fld id="{595C178B-5A77-496A-9807-14D7EFE9DB5D}" type="datetimeFigureOut">
               <a:rPr lang="en-US" smtClean="0"/>
-              <a:t>6/13/2019</a:t>
+              <a:t>6/14/2019</a:t>
             </a:fld>
             <a:endParaRPr lang="en-US"/>
           </a:p>
@@ -2131,7 +2134,7 @@
           <a:p>
             <a:fld id="{595C178B-5A77-496A-9807-14D7EFE9DB5D}" type="datetimeFigureOut">
               <a:rPr lang="en-US" smtClean="0"/>
-              <a:t>6/13/2019</a:t>
+              <a:t>6/14/2019</a:t>
             </a:fld>
             <a:endParaRPr lang="en-US"/>
           </a:p>
@@ -2384,7 +2387,7 @@
           <a:p>
             <a:fld id="{595C178B-5A77-496A-9807-14D7EFE9DB5D}" type="datetimeFigureOut">
               <a:rPr lang="en-US" smtClean="0"/>
-              <a:t>6/13/2019</a:t>
+              <a:t>6/14/2019</a:t>
             </a:fld>
             <a:endParaRPr lang="en-US"/>
           </a:p>
@@ -2597,7 +2600,7 @@
           <a:p>
             <a:fld id="{595C178B-5A77-496A-9807-14D7EFE9DB5D}" type="datetimeFigureOut">
               <a:rPr lang="en-US" smtClean="0"/>
-              <a:t>6/13/2019</a:t>
+              <a:t>6/14/2019</a:t>
             </a:fld>
             <a:endParaRPr lang="en-US"/>
           </a:p>
@@ -3123,6 +3126,18 @@
   <p:clrMapOvr>
     <a:masterClrMapping/>
   </p:clrMapOvr>
+  <mc:AlternateContent xmlns:mc="http://schemas.openxmlformats.org/markup-compatibility/2006">
+    <mc:Choice xmlns:p15="http://schemas.microsoft.com/office/powerpoint/2012/main" Requires="p15">
+      <p:transition xmlns:p14="http://schemas.microsoft.com/office/powerpoint/2010/main" spd="slow" p14:dur="6000">
+        <p15:prstTrans prst="curtains"/>
+      </p:transition>
+    </mc:Choice>
+    <mc:Fallback>
+      <p:transition spd="slow">
+        <p:fade/>
+      </p:transition>
+    </mc:Fallback>
+  </mc:AlternateContent>
   <p:timing>
     <p:tnLst>
       <p:par>
@@ -3245,6 +3260,18 @@
   <p:clrMapOvr>
     <a:masterClrMapping/>
   </p:clrMapOvr>
+  <mc:AlternateContent xmlns:mc="http://schemas.openxmlformats.org/markup-compatibility/2006">
+    <mc:Choice xmlns:p14="http://schemas.microsoft.com/office/powerpoint/2010/main" Requires="p14">
+      <p:transition spd="med" p14:dur="700">
+        <p:fade/>
+      </p:transition>
+    </mc:Choice>
+    <mc:Fallback>
+      <p:transition spd="med">
+        <p:fade/>
+      </p:transition>
+    </mc:Fallback>
+  </mc:AlternateContent>
   <p:timing>
     <p:tnLst>
       <p:par>
@@ -3366,6 +3393,18 @@
   <p:clrMapOvr>
     <a:masterClrMapping/>
   </p:clrMapOvr>
+  <mc:AlternateContent xmlns:mc="http://schemas.openxmlformats.org/markup-compatibility/2006">
+    <mc:Choice xmlns:p14="http://schemas.microsoft.com/office/powerpoint/2010/main" Requires="p14">
+      <p:transition spd="med" p14:dur="700">
+        <p:fade/>
+      </p:transition>
+    </mc:Choice>
+    <mc:Fallback>
+      <p:transition spd="med">
+        <p:fade/>
+      </p:transition>
+    </mc:Fallback>
+  </mc:AlternateContent>
   <p:timing>
     <p:tnLst>
       <p:par>
@@ -3469,6 +3508,25 @@
   <p:clrMapOvr>
     <a:masterClrMapping/>
   </p:clrMapOvr>
+  <mc:AlternateContent xmlns:mc="http://schemas.openxmlformats.org/markup-compatibility/2006">
+    <mc:Choice xmlns:p15="http://schemas.microsoft.com/office/powerpoint/2012/main" Requires="p15">
+      <p:transition xmlns:p14="http://schemas.microsoft.com/office/powerpoint/2010/main" spd="slow" p14:dur="2000">
+        <p15:prstTrans prst="fallOver"/>
+      </p:transition>
+    </mc:Choice>
+    <mc:Fallback>
+      <p:transition spd="slow">
+        <p:fade/>
+      </p:transition>
+    </mc:Fallback>
+  </mc:AlternateContent>
+  <p:timing>
+    <p:tnLst>
+      <p:par>
+        <p:cTn id="1" dur="indefinite" restart="never" nodeType="tmRoot"/>
+      </p:par>
+    </p:tnLst>
+  </p:timing>
 </p:sld>
 </file>
 
@@ -3583,6 +3641,25 @@
   <p:clrMapOvr>
     <a:masterClrMapping/>
   </p:clrMapOvr>
+  <mc:AlternateContent xmlns:mc="http://schemas.openxmlformats.org/markup-compatibility/2006">
+    <mc:Choice xmlns:p14="http://schemas.microsoft.com/office/powerpoint/2010/main" Requires="p14">
+      <p:transition spd="med" p14:dur="700">
+        <p:fade/>
+      </p:transition>
+    </mc:Choice>
+    <mc:Fallback>
+      <p:transition spd="med">
+        <p:fade/>
+      </p:transition>
+    </mc:Fallback>
+  </mc:AlternateContent>
+  <p:timing>
+    <p:tnLst>
+      <p:par>
+        <p:cTn id="1" dur="indefinite" restart="never" nodeType="tmRoot"/>
+      </p:par>
+    </p:tnLst>
+  </p:timing>
 </p:sld>
 </file>
 
@@ -3662,6 +3739,25 @@
   <p:clrMapOvr>
     <a:masterClrMapping/>
   </p:clrMapOvr>
+  <mc:AlternateContent xmlns:mc="http://schemas.openxmlformats.org/markup-compatibility/2006">
+    <mc:Choice xmlns:p14="http://schemas.microsoft.com/office/powerpoint/2010/main" Requires="p14">
+      <p:transition spd="med" p14:dur="700">
+        <p:fade/>
+      </p:transition>
+    </mc:Choice>
+    <mc:Fallback>
+      <p:transition spd="med">
+        <p:fade/>
+      </p:transition>
+    </mc:Fallback>
+  </mc:AlternateContent>
+  <p:timing>
+    <p:tnLst>
+      <p:par>
+        <p:cTn id="1" dur="indefinite" restart="never" nodeType="tmRoot"/>
+      </p:par>
+    </p:tnLst>
+  </p:timing>
 </p:sld>
 </file>
 
@@ -3745,6 +3841,25 @@
   <p:clrMapOvr>
     <a:masterClrMapping/>
   </p:clrMapOvr>
+  <mc:AlternateContent xmlns:mc="http://schemas.openxmlformats.org/markup-compatibility/2006">
+    <mc:Choice xmlns:p14="http://schemas.microsoft.com/office/powerpoint/2010/main" Requires="p14">
+      <p:transition spd="med" p14:dur="700">
+        <p:fade/>
+      </p:transition>
+    </mc:Choice>
+    <mc:Fallback>
+      <p:transition spd="med">
+        <p:fade/>
+      </p:transition>
+    </mc:Fallback>
+  </mc:AlternateContent>
+  <p:timing>
+    <p:tnLst>
+      <p:par>
+        <p:cTn id="1" dur="indefinite" restart="never" nodeType="tmRoot"/>
+      </p:par>
+    </p:tnLst>
+  </p:timing>
 </p:sld>
 </file>
 
@@ -3934,6 +4049,25 @@
   <p:clrMapOvr>
     <a:masterClrMapping/>
   </p:clrMapOvr>
+  <mc:AlternateContent xmlns:mc="http://schemas.openxmlformats.org/markup-compatibility/2006">
+    <mc:Choice xmlns:p14="http://schemas.microsoft.com/office/powerpoint/2010/main" Requires="p14">
+      <p:transition spd="med" p14:dur="700">
+        <p:fade/>
+      </p:transition>
+    </mc:Choice>
+    <mc:Fallback>
+      <p:transition spd="med">
+        <p:fade/>
+      </p:transition>
+    </mc:Fallback>
+  </mc:AlternateContent>
+  <p:timing>
+    <p:tnLst>
+      <p:par>
+        <p:cTn id="1" dur="indefinite" restart="never" nodeType="tmRoot"/>
+      </p:par>
+    </p:tnLst>
+  </p:timing>
 </p:sld>
 </file>
 
@@ -4120,6 +4254,25 @@
   <p:clrMapOvr>
     <a:masterClrMapping/>
   </p:clrMapOvr>
+  <mc:AlternateContent xmlns:mc="http://schemas.openxmlformats.org/markup-compatibility/2006">
+    <mc:Choice xmlns:p14="http://schemas.microsoft.com/office/powerpoint/2010/main" Requires="p14">
+      <p:transition spd="med" p14:dur="700">
+        <p:fade/>
+      </p:transition>
+    </mc:Choice>
+    <mc:Fallback>
+      <p:transition spd="med">
+        <p:fade/>
+      </p:transition>
+    </mc:Fallback>
+  </mc:AlternateContent>
+  <p:timing>
+    <p:tnLst>
+      <p:par>
+        <p:cTn id="1" dur="indefinite" restart="never" nodeType="tmRoot"/>
+      </p:par>
+    </p:tnLst>
+  </p:timing>
 </p:sld>
 </file>
 
@@ -4265,6 +4418,25 @@
   <p:clrMapOvr>
     <a:masterClrMapping/>
   </p:clrMapOvr>
+  <mc:AlternateContent xmlns:mc="http://schemas.openxmlformats.org/markup-compatibility/2006">
+    <mc:Choice xmlns:p14="http://schemas.microsoft.com/office/powerpoint/2010/main" Requires="p14">
+      <p:transition spd="med" p14:dur="700">
+        <p:fade/>
+      </p:transition>
+    </mc:Choice>
+    <mc:Fallback>
+      <p:transition spd="med">
+        <p:fade/>
+      </p:transition>
+    </mc:Fallback>
+  </mc:AlternateContent>
+  <p:timing>
+    <p:tnLst>
+      <p:par>
+        <p:cTn id="1" dur="indefinite" restart="never" nodeType="tmRoot"/>
+      </p:par>
+    </p:tnLst>
+  </p:timing>
 </p:sld>
 </file>
 
@@ -4376,6 +4548,25 @@
   <p:clrMapOvr>
     <a:masterClrMapping/>
   </p:clrMapOvr>
+  <mc:AlternateContent xmlns:mc="http://schemas.openxmlformats.org/markup-compatibility/2006">
+    <mc:Choice xmlns:p14="http://schemas.microsoft.com/office/powerpoint/2010/main" Requires="p14">
+      <p:transition spd="med" p14:dur="700">
+        <p:fade/>
+      </p:transition>
+    </mc:Choice>
+    <mc:Fallback>
+      <p:transition spd="med">
+        <p:fade/>
+      </p:transition>
+    </mc:Fallback>
+  </mc:AlternateContent>
+  <p:timing>
+    <p:tnLst>
+      <p:par>
+        <p:cTn id="1" dur="indefinite" restart="never" nodeType="tmRoot"/>
+      </p:par>
+    </p:tnLst>
+  </p:timing>
 </p:sld>
 </file>
 
@@ -4488,6 +4679,18 @@
   <p:clrMapOvr>
     <a:masterClrMapping/>
   </p:clrMapOvr>
+  <mc:AlternateContent xmlns:mc="http://schemas.openxmlformats.org/markup-compatibility/2006">
+    <mc:Choice xmlns:p14="http://schemas.microsoft.com/office/powerpoint/2010/main" Requires="p14">
+      <p:transition spd="med" p14:dur="700">
+        <p:fade/>
+      </p:transition>
+    </mc:Choice>
+    <mc:Fallback>
+      <p:transition spd="med">
+        <p:fade/>
+      </p:transition>
+    </mc:Fallback>
+  </mc:AlternateContent>
   <p:timing>
     <p:tnLst>
       <p:par>
@@ -4600,6 +4803,25 @@
   <p:clrMapOvr>
     <a:masterClrMapping/>
   </p:clrMapOvr>
+  <mc:AlternateContent xmlns:mc="http://schemas.openxmlformats.org/markup-compatibility/2006">
+    <mc:Choice xmlns:p14="http://schemas.microsoft.com/office/powerpoint/2010/main" Requires="p14">
+      <p:transition spd="med" p14:dur="700">
+        <p:fade/>
+      </p:transition>
+    </mc:Choice>
+    <mc:Fallback>
+      <p:transition spd="med">
+        <p:fade/>
+      </p:transition>
+    </mc:Fallback>
+  </mc:AlternateContent>
+  <p:timing>
+    <p:tnLst>
+      <p:par>
+        <p:cTn id="1" dur="indefinite" restart="never" nodeType="tmRoot"/>
+      </p:par>
+    </p:tnLst>
+  </p:timing>
 </p:sld>
 </file>
 
@@ -4719,6 +4941,25 @@
   <p:clrMapOvr>
     <a:masterClrMapping/>
   </p:clrMapOvr>
+  <mc:AlternateContent xmlns:mc="http://schemas.openxmlformats.org/markup-compatibility/2006">
+    <mc:Choice xmlns:p14="http://schemas.microsoft.com/office/powerpoint/2010/main" Requires="p14">
+      <p:transition spd="med" p14:dur="700">
+        <p:fade/>
+      </p:transition>
+    </mc:Choice>
+    <mc:Fallback>
+      <p:transition spd="med">
+        <p:fade/>
+      </p:transition>
+    </mc:Fallback>
+  </mc:AlternateContent>
+  <p:timing>
+    <p:tnLst>
+      <p:par>
+        <p:cTn id="1" dur="indefinite" restart="never" nodeType="tmRoot"/>
+      </p:par>
+    </p:tnLst>
+  </p:timing>
 </p:sld>
 </file>
 
@@ -4827,6 +5068,18 @@
   <p:clrMapOvr>
     <a:masterClrMapping/>
   </p:clrMapOvr>
+  <mc:AlternateContent xmlns:mc="http://schemas.openxmlformats.org/markup-compatibility/2006">
+    <mc:Choice xmlns:p14="http://schemas.microsoft.com/office/powerpoint/2010/main" Requires="p14">
+      <p:transition spd="med" p14:dur="700">
+        <p:fade/>
+      </p:transition>
+    </mc:Choice>
+    <mc:Fallback>
+      <p:transition spd="med">
+        <p:fade/>
+      </p:transition>
+    </mc:Fallback>
+  </mc:AlternateContent>
   <p:timing>
     <p:tnLst>
       <p:par>
@@ -4938,6 +5191,18 @@
   <p:clrMapOvr>
     <a:masterClrMapping/>
   </p:clrMapOvr>
+  <mc:AlternateContent xmlns:mc="http://schemas.openxmlformats.org/markup-compatibility/2006">
+    <mc:Choice xmlns:p14="http://schemas.microsoft.com/office/powerpoint/2010/main" Requires="p14">
+      <p:transition spd="med" p14:dur="700">
+        <p:fade/>
+      </p:transition>
+    </mc:Choice>
+    <mc:Fallback>
+      <p:transition spd="med">
+        <p:fade/>
+      </p:transition>
+    </mc:Fallback>
+  </mc:AlternateContent>
   <p:timing>
     <p:tnLst>
       <p:par>
@@ -4980,115 +5245,58 @@
           <a:bodyPr/>
           <a:lstStyle/>
           <a:p>
-            <a:r>
-              <a:rPr lang="en-US" b="1" dirty="0" smtClean="0"/>
-              <a:t>ASP.NET Core Documentation</a:t>
-            </a:r>
             <a:endParaRPr lang="en-US" dirty="0"/>
           </a:p>
         </p:txBody>
       </p:sp>
-      <p:sp>
-        <p:nvSpPr>
-          <p:cNvPr id="3" name="Content Placeholder 2"/>
-          <p:cNvSpPr>
-            <a:spLocks noGrp="1"/>
-          </p:cNvSpPr>
+      <p:pic>
+        <p:nvPicPr>
+          <p:cNvPr id="4" name="Content Placeholder 3"/>
+          <p:cNvPicPr>
+            <a:picLocks noGrp="1" noChangeAspect="1"/>
+          </p:cNvPicPr>
           <p:nvPr>
             <p:ph idx="1"/>
           </p:nvPr>
-        </p:nvSpPr>
-        <p:spPr/>
-        <p:txBody>
-          <a:bodyPr>
-            <a:normAutofit/>
-          </a:bodyPr>
-          <a:lstStyle/>
-          <a:p>
-            <a:pPr marL="0" indent="0">
-              <a:buNone/>
-            </a:pPr>
-            <a:r>
-              <a:rPr lang="en-US" sz="2000" dirty="0"/>
-              <a:t>ASP.NET Core is a new open-source and cross-platform .NET framework for building modern cloud-based web </a:t>
-            </a:r>
-            <a:r>
-              <a:rPr lang="en-US" sz="2000" dirty="0" smtClean="0"/>
-              <a:t>applications </a:t>
-            </a:r>
-            <a:r>
-              <a:rPr lang="en-US" sz="2000" dirty="0"/>
-              <a:t>on Windows, Mac, or Linux</a:t>
-            </a:r>
-            <a:r>
-              <a:rPr lang="en-US" sz="2000" dirty="0" smtClean="0"/>
-              <a:t>.</a:t>
-            </a:r>
-          </a:p>
-          <a:p>
-            <a:pPr marL="0" indent="0">
-              <a:buNone/>
-            </a:pPr>
-            <a:endParaRPr lang="en-US" sz="2000" dirty="0"/>
-          </a:p>
-          <a:p>
-            <a:pPr marL="0" indent="0">
-              <a:buNone/>
-            </a:pPr>
-            <a:r>
-              <a:rPr lang="en-US" sz="2000" dirty="0">
-                <a:hlinkClick r:id="rId2"/>
-              </a:rPr>
-              <a:t>https://docs.microsoft.com/en-us/aspnet/?</a:t>
-            </a:r>
-            <a:r>
-              <a:rPr lang="en-US" sz="2000" dirty="0" smtClean="0">
-                <a:hlinkClick r:id="rId2"/>
-              </a:rPr>
-              <a:t>view=aspnetcore-2.2#pivot=core&amp;panel=core_overview</a:t>
-            </a:r>
-            <a:endParaRPr lang="en-US" sz="2000" dirty="0" smtClean="0"/>
-          </a:p>
-          <a:p>
-            <a:pPr marL="0" indent="0">
-              <a:buNone/>
-            </a:pPr>
-            <a:endParaRPr lang="en-US" sz="2000" dirty="0" smtClean="0"/>
-          </a:p>
-          <a:p>
-            <a:pPr marL="0" indent="0">
-              <a:buNone/>
-            </a:pPr>
-            <a:r>
-              <a:rPr lang="en-US" sz="2000" dirty="0" smtClean="0"/>
-              <a:t>Tutorials</a:t>
-            </a:r>
-            <a:endParaRPr lang="en-US" sz="2000" dirty="0"/>
-          </a:p>
-          <a:p>
-            <a:pPr marL="0" indent="0">
-              <a:buNone/>
-            </a:pPr>
-            <a:r>
-              <a:rPr lang="en-US" sz="2000" dirty="0">
-                <a:hlinkClick r:id="rId3"/>
-              </a:rPr>
-              <a:t>https://www.tutorialspoint.com/asp.net_core/</a:t>
-            </a:r>
-            <a:endParaRPr lang="en-US" sz="2000" dirty="0"/>
-          </a:p>
-        </p:txBody>
-      </p:sp>
+        </p:nvPicPr>
+        <p:blipFill>
+          <a:blip r:embed="rId2"/>
+          <a:stretch>
+            <a:fillRect/>
+          </a:stretch>
+        </p:blipFill>
+        <p:spPr>
+          <a:xfrm>
+            <a:off x="2943619" y="2063199"/>
+            <a:ext cx="6304762" cy="3876190"/>
+          </a:xfrm>
+          <a:prstGeom prst="rect">
+            <a:avLst/>
+          </a:prstGeom>
+        </p:spPr>
+      </p:pic>
     </p:spTree>
     <p:extLst>
       <p:ext uri="{BB962C8B-B14F-4D97-AF65-F5344CB8AC3E}">
-        <p14:creationId xmlns:p14="http://schemas.microsoft.com/office/powerpoint/2010/main" val="857302663"/>
+        <p14:creationId xmlns:p14="http://schemas.microsoft.com/office/powerpoint/2010/main" val="3345267437"/>
       </p:ext>
     </p:extLst>
   </p:cSld>
   <p:clrMapOvr>
     <a:masterClrMapping/>
   </p:clrMapOvr>
+  <mc:AlternateContent xmlns:mc="http://schemas.openxmlformats.org/markup-compatibility/2006">
+    <mc:Choice xmlns:p15="http://schemas.microsoft.com/office/powerpoint/2012/main" Requires="p15">
+      <p:transition xmlns:p14="http://schemas.microsoft.com/office/powerpoint/2010/main" spd="slow" p14:dur="6000">
+        <p15:prstTrans prst="curtains"/>
+      </p:transition>
+    </mc:Choice>
+    <mc:Fallback>
+      <p:transition spd="slow">
+        <p:fade/>
+      </p:transition>
+    </mc:Fallback>
+  </mc:AlternateContent>
   <p:timing>
     <p:tnLst>
       <p:par>
@@ -5132,6 +5340,302 @@
           <a:lstStyle/>
           <a:p>
             <a:r>
+              <a:rPr lang="en-US" b="1" dirty="0" smtClean="0"/>
+              <a:t>ASP.NET Core Documentation</a:t>
+            </a:r>
+            <a:endParaRPr lang="en-US" dirty="0"/>
+          </a:p>
+        </p:txBody>
+      </p:sp>
+      <p:sp>
+        <p:nvSpPr>
+          <p:cNvPr id="3" name="Content Placeholder 2"/>
+          <p:cNvSpPr>
+            <a:spLocks noGrp="1"/>
+          </p:cNvSpPr>
+          <p:nvPr>
+            <p:ph idx="1"/>
+          </p:nvPr>
+        </p:nvSpPr>
+        <p:spPr/>
+        <p:txBody>
+          <a:bodyPr>
+            <a:normAutofit/>
+          </a:bodyPr>
+          <a:lstStyle/>
+          <a:p>
+            <a:pPr marL="0" indent="0">
+              <a:buNone/>
+            </a:pPr>
+            <a:r>
+              <a:rPr lang="en-US" sz="2000" dirty="0"/>
+              <a:t>ASP.NET Core is a new open-source and cross-platform .NET framework for building modern cloud-based web </a:t>
+            </a:r>
+            <a:r>
+              <a:rPr lang="en-US" sz="2000" dirty="0" smtClean="0"/>
+              <a:t>applications </a:t>
+            </a:r>
+            <a:r>
+              <a:rPr lang="en-US" sz="2000" dirty="0"/>
+              <a:t>on Windows, Mac, or Linux</a:t>
+            </a:r>
+            <a:r>
+              <a:rPr lang="en-US" sz="2000" dirty="0" smtClean="0"/>
+              <a:t>.</a:t>
+            </a:r>
+          </a:p>
+          <a:p>
+            <a:pPr marL="0" indent="0">
+              <a:buNone/>
+            </a:pPr>
+            <a:endParaRPr lang="en-US" sz="2000" dirty="0"/>
+          </a:p>
+          <a:p>
+            <a:pPr marL="0" indent="0">
+              <a:buNone/>
+            </a:pPr>
+            <a:r>
+              <a:rPr lang="en-US" sz="2000" dirty="0">
+                <a:hlinkClick r:id="rId2"/>
+              </a:rPr>
+              <a:t>https://docs.microsoft.com/en-us/aspnet/?</a:t>
+            </a:r>
+            <a:r>
+              <a:rPr lang="en-US" sz="2000" dirty="0" smtClean="0">
+                <a:hlinkClick r:id="rId2"/>
+              </a:rPr>
+              <a:t>view=aspnetcore-2.2#pivot=core&amp;panel=core_overview</a:t>
+            </a:r>
+            <a:endParaRPr lang="en-US" sz="2000" dirty="0" smtClean="0"/>
+          </a:p>
+          <a:p>
+            <a:pPr marL="0" indent="0">
+              <a:buNone/>
+            </a:pPr>
+            <a:endParaRPr lang="en-US" sz="2000" dirty="0" smtClean="0"/>
+          </a:p>
+          <a:p>
+            <a:pPr marL="0" indent="0">
+              <a:buNone/>
+            </a:pPr>
+            <a:r>
+              <a:rPr lang="en-US" sz="2000" dirty="0" smtClean="0"/>
+              <a:t>Tutorials</a:t>
+            </a:r>
+            <a:endParaRPr lang="en-US" sz="2000" dirty="0"/>
+          </a:p>
+          <a:p>
+            <a:pPr marL="0" indent="0">
+              <a:buNone/>
+            </a:pPr>
+            <a:r>
+              <a:rPr lang="en-US" sz="2000" dirty="0">
+                <a:hlinkClick r:id="rId3"/>
+              </a:rPr>
+              <a:t>https://www.tutorialspoint.com/asp.net_core</a:t>
+            </a:r>
+            <a:r>
+              <a:rPr lang="en-US" sz="2000" dirty="0" smtClean="0">
+                <a:hlinkClick r:id="rId3"/>
+              </a:rPr>
+              <a:t>/</a:t>
+            </a:r>
+            <a:endParaRPr lang="en-US" sz="2000" dirty="0" smtClean="0"/>
+          </a:p>
+          <a:p>
+            <a:pPr marL="0" indent="0">
+              <a:buNone/>
+            </a:pPr>
+            <a:r>
+              <a:rPr lang="en-US" sz="2000" dirty="0">
+                <a:hlinkClick r:id="rId4"/>
+              </a:rPr>
+              <a:t>https://www.tutorialsteacher.com/mvc/asp.net-mvc-tutorials</a:t>
+            </a:r>
+            <a:endParaRPr lang="en-US" sz="2000" dirty="0"/>
+          </a:p>
+        </p:txBody>
+      </p:sp>
+    </p:spTree>
+    <p:extLst>
+      <p:ext uri="{BB962C8B-B14F-4D97-AF65-F5344CB8AC3E}">
+        <p14:creationId xmlns:p14="http://schemas.microsoft.com/office/powerpoint/2010/main" val="857302663"/>
+      </p:ext>
+    </p:extLst>
+  </p:cSld>
+  <p:clrMapOvr>
+    <a:masterClrMapping/>
+  </p:clrMapOvr>
+  <mc:AlternateContent xmlns:mc="http://schemas.openxmlformats.org/markup-compatibility/2006">
+    <mc:Choice xmlns:p14="http://schemas.microsoft.com/office/powerpoint/2010/main" Requires="p14">
+      <p:transition spd="med" p14:dur="700">
+        <p:fade/>
+      </p:transition>
+    </mc:Choice>
+    <mc:Fallback>
+      <p:transition spd="med">
+        <p:fade/>
+      </p:transition>
+    </mc:Fallback>
+  </mc:AlternateContent>
+  <p:timing>
+    <p:tnLst>
+      <p:par>
+        <p:cTn id="1" dur="indefinite" restart="never" nodeType="tmRoot"/>
+      </p:par>
+    </p:tnLst>
+  </p:timing>
+</p:sld>
+</file>
+
+<file path=ppt/slides/slide26.xml><?xml version="1.0" encoding="utf-8"?>
+<p:sld xmlns:a="http://schemas.openxmlformats.org/drawingml/2006/main" xmlns:r="http://schemas.openxmlformats.org/officeDocument/2006/relationships" xmlns:p="http://schemas.openxmlformats.org/presentationml/2006/main">
+  <p:cSld>
+    <p:spTree>
+      <p:nvGrpSpPr>
+        <p:cNvPr id="1" name=""/>
+        <p:cNvGrpSpPr/>
+        <p:nvPr/>
+      </p:nvGrpSpPr>
+      <p:grpSpPr>
+        <a:xfrm>
+          <a:off x="0" y="0"/>
+          <a:ext cx="0" cy="0"/>
+          <a:chOff x="0" y="0"/>
+          <a:chExt cx="0" cy="0"/>
+        </a:xfrm>
+      </p:grpSpPr>
+      <p:sp>
+        <p:nvSpPr>
+          <p:cNvPr id="2" name="Title 1"/>
+          <p:cNvSpPr>
+            <a:spLocks noGrp="1"/>
+          </p:cNvSpPr>
+          <p:nvPr>
+            <p:ph type="title"/>
+          </p:nvPr>
+        </p:nvSpPr>
+        <p:spPr/>
+        <p:txBody>
+          <a:bodyPr/>
+          <a:lstStyle/>
+          <a:p>
+            <a:r>
+              <a:rPr lang="en-US" dirty="0" smtClean="0"/>
+              <a:t>Project structure</a:t>
+            </a:r>
+            <a:endParaRPr lang="en-US" dirty="0"/>
+          </a:p>
+        </p:txBody>
+      </p:sp>
+      <p:sp>
+        <p:nvSpPr>
+          <p:cNvPr id="3" name="Content Placeholder 2"/>
+          <p:cNvSpPr>
+            <a:spLocks noGrp="1"/>
+          </p:cNvSpPr>
+          <p:nvPr>
+            <p:ph idx="1"/>
+          </p:nvPr>
+        </p:nvSpPr>
+        <p:spPr/>
+        <p:txBody>
+          <a:bodyPr/>
+          <a:lstStyle/>
+          <a:p>
+            <a:endParaRPr lang="en-US"/>
+          </a:p>
+        </p:txBody>
+      </p:sp>
+      <p:pic>
+        <p:nvPicPr>
+          <p:cNvPr id="4" name="Picture 3"/>
+          <p:cNvPicPr>
+            <a:picLocks noChangeAspect="1"/>
+          </p:cNvPicPr>
+          <p:nvPr/>
+        </p:nvPicPr>
+        <p:blipFill>
+          <a:blip r:embed="rId2"/>
+          <a:stretch>
+            <a:fillRect/>
+          </a:stretch>
+        </p:blipFill>
+        <p:spPr>
+          <a:xfrm>
+            <a:off x="8332749" y="548392"/>
+            <a:ext cx="2657143" cy="5628571"/>
+          </a:xfrm>
+          <a:prstGeom prst="rect">
+            <a:avLst/>
+          </a:prstGeom>
+        </p:spPr>
+      </p:pic>
+    </p:spTree>
+    <p:extLst>
+      <p:ext uri="{BB962C8B-B14F-4D97-AF65-F5344CB8AC3E}">
+        <p14:creationId xmlns:p14="http://schemas.microsoft.com/office/powerpoint/2010/main" val="2455966892"/>
+      </p:ext>
+    </p:extLst>
+  </p:cSld>
+  <p:clrMapOvr>
+    <a:masterClrMapping/>
+  </p:clrMapOvr>
+  <mc:AlternateContent xmlns:mc="http://schemas.openxmlformats.org/markup-compatibility/2006">
+    <mc:Choice xmlns:p14="http://schemas.microsoft.com/office/powerpoint/2010/main" Requires="p14">
+      <p:transition spd="med" p14:dur="700">
+        <p:fade/>
+      </p:transition>
+    </mc:Choice>
+    <mc:Fallback>
+      <p:transition spd="med">
+        <p:fade/>
+      </p:transition>
+    </mc:Fallback>
+  </mc:AlternateContent>
+  <p:timing>
+    <p:tnLst>
+      <p:par>
+        <p:cTn id="1" dur="indefinite" restart="never" nodeType="tmRoot"/>
+      </p:par>
+    </p:tnLst>
+  </p:timing>
+</p:sld>
+</file>
+
+<file path=ppt/slides/slide27.xml><?xml version="1.0" encoding="utf-8"?>
+<p:sld xmlns:a="http://schemas.openxmlformats.org/drawingml/2006/main" xmlns:r="http://schemas.openxmlformats.org/officeDocument/2006/relationships" xmlns:p="http://schemas.openxmlformats.org/presentationml/2006/main">
+  <p:cSld>
+    <p:spTree>
+      <p:nvGrpSpPr>
+        <p:cNvPr id="1" name=""/>
+        <p:cNvGrpSpPr/>
+        <p:nvPr/>
+      </p:nvGrpSpPr>
+      <p:grpSpPr>
+        <a:xfrm>
+          <a:off x="0" y="0"/>
+          <a:ext cx="0" cy="0"/>
+          <a:chOff x="0" y="0"/>
+          <a:chExt cx="0" cy="0"/>
+        </a:xfrm>
+      </p:grpSpPr>
+      <p:sp>
+        <p:nvSpPr>
+          <p:cNvPr id="2" name="Title 1"/>
+          <p:cNvSpPr>
+            <a:spLocks noGrp="1"/>
+          </p:cNvSpPr>
+          <p:nvPr>
+            <p:ph type="title"/>
+          </p:nvPr>
+        </p:nvSpPr>
+        <p:spPr/>
+        <p:txBody>
+          <a:bodyPr/>
+          <a:lstStyle/>
+          <a:p>
+            <a:r>
               <a:rPr lang="en-US" dirty="0" smtClean="0"/>
               <a:t>ASP.NET Data Annotations</a:t>
             </a:r>
@@ -5444,10 +5948,29 @@
   <p:clrMapOvr>
     <a:masterClrMapping/>
   </p:clrMapOvr>
+  <mc:AlternateContent xmlns:mc="http://schemas.openxmlformats.org/markup-compatibility/2006">
+    <mc:Choice xmlns:p14="http://schemas.microsoft.com/office/powerpoint/2010/main" Requires="p14">
+      <p:transition spd="med" p14:dur="700">
+        <p:fade/>
+      </p:transition>
+    </mc:Choice>
+    <mc:Fallback>
+      <p:transition spd="med">
+        <p:fade/>
+      </p:transition>
+    </mc:Fallback>
+  </mc:AlternateContent>
+  <p:timing>
+    <p:tnLst>
+      <p:par>
+        <p:cTn id="1" dur="indefinite" restart="never" nodeType="tmRoot"/>
+      </p:par>
+    </p:tnLst>
+  </p:timing>
 </p:sld>
 </file>
 
-<file path=ppt/slides/slide26.xml><?xml version="1.0" encoding="utf-8"?>
+<file path=ppt/slides/slide28.xml><?xml version="1.0" encoding="utf-8"?>
 <p:sld xmlns:a="http://schemas.openxmlformats.org/drawingml/2006/main" xmlns:r="http://schemas.openxmlformats.org/officeDocument/2006/relationships" xmlns:p="http://schemas.openxmlformats.org/presentationml/2006/main">
   <p:cSld>
     <p:spTree>
@@ -5564,10 +6087,29 @@
   <p:clrMapOvr>
     <a:masterClrMapping/>
   </p:clrMapOvr>
+  <mc:AlternateContent xmlns:mc="http://schemas.openxmlformats.org/markup-compatibility/2006">
+    <mc:Choice xmlns:p14="http://schemas.microsoft.com/office/powerpoint/2010/main" Requires="p14">
+      <p:transition spd="med" p14:dur="700">
+        <p:fade/>
+      </p:transition>
+    </mc:Choice>
+    <mc:Fallback>
+      <p:transition spd="med">
+        <p:fade/>
+      </p:transition>
+    </mc:Fallback>
+  </mc:AlternateContent>
+  <p:timing>
+    <p:tnLst>
+      <p:par>
+        <p:cTn id="1" dur="indefinite" restart="never" nodeType="tmRoot"/>
+      </p:par>
+    </p:tnLst>
+  </p:timing>
 </p:sld>
 </file>
 
-<file path=ppt/slides/slide27.xml><?xml version="1.0" encoding="utf-8"?>
+<file path=ppt/slides/slide29.xml><?xml version="1.0" encoding="utf-8"?>
 <p:sld xmlns:a="http://schemas.openxmlformats.org/drawingml/2006/main" xmlns:r="http://schemas.openxmlformats.org/officeDocument/2006/relationships" xmlns:p="http://schemas.openxmlformats.org/presentationml/2006/main">
   <p:cSld>
     <p:spTree>
@@ -5600,12 +6142,8 @@
           <a:lstStyle/>
           <a:p>
             <a:r>
-              <a:rPr lang="en-US" b="1" dirty="0"/>
-              <a:t>Entity Framework </a:t>
-            </a:r>
-            <a:r>
-              <a:rPr lang="en-US" b="1" dirty="0" smtClean="0"/>
-              <a:t>Documentation</a:t>
+              <a:rPr lang="en-US" dirty="0" smtClean="0"/>
+              <a:t>Generating HTML</a:t>
             </a:r>
             <a:endParaRPr lang="en-US" dirty="0"/>
           </a:p>
@@ -5623,53 +6161,45 @@
         </p:nvSpPr>
         <p:spPr/>
         <p:txBody>
-          <a:bodyPr>
-            <a:normAutofit/>
-          </a:bodyPr>
-          <a:lstStyle/>
-          <a:p>
-            <a:pPr marL="0" indent="0">
-              <a:buNone/>
-            </a:pPr>
-            <a:r>
-              <a:rPr lang="en-US" sz="2000" dirty="0"/>
-              <a:t>Entity Framework is an object-relational mapper (O/RM) that enables .NET developers to work with a database using .NET objects. It eliminates the need for most of the data-access code that developers usually need to write</a:t>
-            </a:r>
-            <a:r>
-              <a:rPr lang="en-US" sz="2000" dirty="0" smtClean="0"/>
-              <a:t>.</a:t>
-            </a:r>
-          </a:p>
-          <a:p>
-            <a:pPr marL="0" indent="0">
-              <a:buNone/>
-            </a:pPr>
-            <a:endParaRPr lang="en-US" sz="2000" dirty="0"/>
-          </a:p>
-          <a:p>
-            <a:pPr marL="0" indent="0">
-              <a:buNone/>
-            </a:pPr>
-            <a:r>
-              <a:rPr lang="en-US" sz="2000" dirty="0">
-                <a:hlinkClick r:id="rId2"/>
-              </a:rPr>
-              <a:t>https://docs.microsoft.com/en-us/ef/#pivot=entityfmwk&amp;panel=entityfmwk1</a:t>
-            </a:r>
-            <a:endParaRPr lang="en-US" sz="2000" dirty="0" smtClean="0"/>
-          </a:p>
-          <a:p>
-            <a:pPr marL="0" indent="0">
-              <a:buNone/>
-            </a:pPr>
-            <a:endParaRPr lang="en-US" sz="2000" dirty="0"/>
-          </a:p>
-        </p:txBody>
-      </p:sp>
+          <a:bodyPr/>
+          <a:lstStyle/>
+          <a:p>
+            <a:r>
+              <a:rPr lang="en-US" dirty="0" smtClean="0"/>
+              <a:t>Various extension methods provide ways to generated HTML</a:t>
+            </a:r>
+            <a:endParaRPr lang="en-US" dirty="0"/>
+          </a:p>
+        </p:txBody>
+      </p:sp>
+      <p:pic>
+        <p:nvPicPr>
+          <p:cNvPr id="4" name="Picture 3"/>
+          <p:cNvPicPr>
+            <a:picLocks noChangeAspect="1"/>
+          </p:cNvPicPr>
+          <p:nvPr/>
+        </p:nvPicPr>
+        <p:blipFill>
+          <a:blip r:embed="rId2"/>
+          <a:stretch>
+            <a:fillRect/>
+          </a:stretch>
+        </p:blipFill>
+        <p:spPr>
+          <a:xfrm>
+            <a:off x="1315047" y="2586143"/>
+            <a:ext cx="9561905" cy="1685714"/>
+          </a:xfrm>
+          <a:prstGeom prst="rect">
+            <a:avLst/>
+          </a:prstGeom>
+        </p:spPr>
+      </p:pic>
     </p:spTree>
     <p:extLst>
       <p:ext uri="{BB962C8B-B14F-4D97-AF65-F5344CB8AC3E}">
-        <p14:creationId xmlns:p14="http://schemas.microsoft.com/office/powerpoint/2010/main" val="3444943664"/>
+        <p14:creationId xmlns:p14="http://schemas.microsoft.com/office/powerpoint/2010/main" val="4180071635"/>
       </p:ext>
     </p:extLst>
   </p:cSld>
@@ -5679,7 +6209,7 @@
 </p:sld>
 </file>
 
-<file path=ppt/slides/slide28.xml><?xml version="1.0" encoding="utf-8"?>
+<file path=ppt/slides/slide3.xml><?xml version="1.0" encoding="utf-8"?>
 <p:sld xmlns:a="http://schemas.openxmlformats.org/drawingml/2006/main" xmlns:r="http://schemas.openxmlformats.org/officeDocument/2006/relationships" xmlns:p="http://schemas.openxmlformats.org/presentationml/2006/main">
   <p:cSld>
     <p:spTree>
@@ -5713,15 +6243,267 @@
           <a:p>
             <a:r>
               <a:rPr lang="en-US" dirty="0" smtClean="0"/>
+              <a:t>Outside the box</a:t>
+            </a:r>
+            <a:endParaRPr lang="en-US" dirty="0"/>
+          </a:p>
+        </p:txBody>
+      </p:sp>
+      <p:sp>
+        <p:nvSpPr>
+          <p:cNvPr id="3" name="Content Placeholder 2"/>
+          <p:cNvSpPr>
+            <a:spLocks noGrp="1"/>
+          </p:cNvSpPr>
+          <p:nvPr>
+            <p:ph idx="1"/>
+          </p:nvPr>
+        </p:nvSpPr>
+        <p:spPr/>
+        <p:txBody>
+          <a:bodyPr>
+            <a:normAutofit/>
+          </a:bodyPr>
+          <a:lstStyle/>
+          <a:p>
+            <a:pPr marL="0" indent="0">
+              <a:buNone/>
+            </a:pPr>
+            <a:r>
+              <a:rPr lang="en-US" sz="2000" dirty="0" smtClean="0"/>
+              <a:t>C# provides conventional methods to code along with enhanced functionality to write code more efficiently. Both conventional and enhanced versions of coding can be mixed.</a:t>
+            </a:r>
+          </a:p>
+          <a:p>
+            <a:pPr marL="0" indent="0">
+              <a:buNone/>
+            </a:pPr>
+            <a:endParaRPr lang="en-US" sz="2000" dirty="0"/>
+          </a:p>
+        </p:txBody>
+      </p:sp>
+      <p:pic>
+        <p:nvPicPr>
+          <p:cNvPr id="4" name="Picture 3"/>
+          <p:cNvPicPr>
+            <a:picLocks noChangeAspect="1"/>
+          </p:cNvPicPr>
+          <p:nvPr/>
+        </p:nvPicPr>
+        <p:blipFill>
+          <a:blip r:embed="rId2"/>
+          <a:stretch>
+            <a:fillRect/>
+          </a:stretch>
+        </p:blipFill>
+        <p:spPr>
+          <a:xfrm>
+            <a:off x="1060542" y="2462677"/>
+            <a:ext cx="4047619" cy="3714286"/>
+          </a:xfrm>
+          <a:prstGeom prst="rect">
+            <a:avLst/>
+          </a:prstGeom>
+        </p:spPr>
+      </p:pic>
+    </p:spTree>
+    <p:extLst>
+      <p:ext uri="{BB962C8B-B14F-4D97-AF65-F5344CB8AC3E}">
+        <p14:creationId xmlns:p14="http://schemas.microsoft.com/office/powerpoint/2010/main" val="1510932131"/>
+      </p:ext>
+    </p:extLst>
+  </p:cSld>
+  <p:clrMapOvr>
+    <a:masterClrMapping/>
+  </p:clrMapOvr>
+  <mc:AlternateContent xmlns:mc="http://schemas.openxmlformats.org/markup-compatibility/2006">
+    <mc:Choice xmlns:p14="http://schemas.microsoft.com/office/powerpoint/2010/main" Requires="p14">
+      <p:transition spd="med" p14:dur="700">
+        <p:fade/>
+      </p:transition>
+    </mc:Choice>
+    <mc:Fallback>
+      <p:transition spd="med">
+        <p:fade/>
+      </p:transition>
+    </mc:Fallback>
+  </mc:AlternateContent>
+  <p:timing>
+    <p:tnLst>
+      <p:par>
+        <p:cTn id="1" dur="indefinite" restart="never" nodeType="tmRoot"/>
+      </p:par>
+    </p:tnLst>
+  </p:timing>
+</p:sld>
+</file>
+
+<file path=ppt/slides/slide30.xml><?xml version="1.0" encoding="utf-8"?>
+<p:sld xmlns:a="http://schemas.openxmlformats.org/drawingml/2006/main" xmlns:r="http://schemas.openxmlformats.org/officeDocument/2006/relationships" xmlns:p="http://schemas.openxmlformats.org/presentationml/2006/main">
+  <p:cSld>
+    <p:spTree>
+      <p:nvGrpSpPr>
+        <p:cNvPr id="1" name=""/>
+        <p:cNvGrpSpPr/>
+        <p:nvPr/>
+      </p:nvGrpSpPr>
+      <p:grpSpPr>
+        <a:xfrm>
+          <a:off x="0" y="0"/>
+          <a:ext cx="0" cy="0"/>
+          <a:chOff x="0" y="0"/>
+          <a:chExt cx="0" cy="0"/>
+        </a:xfrm>
+      </p:grpSpPr>
+      <p:sp>
+        <p:nvSpPr>
+          <p:cNvPr id="2" name="Title 1"/>
+          <p:cNvSpPr>
+            <a:spLocks noGrp="1"/>
+          </p:cNvSpPr>
+          <p:nvPr>
+            <p:ph type="title"/>
+          </p:nvPr>
+        </p:nvSpPr>
+        <p:spPr/>
+        <p:txBody>
+          <a:bodyPr/>
+          <a:lstStyle/>
+          <a:p>
+            <a:r>
+              <a:rPr lang="en-US" b="1" dirty="0"/>
               <a:t>Entity </a:t>
             </a:r>
             <a:r>
+              <a:rPr lang="en-US" b="1" dirty="0" smtClean="0"/>
+              <a:t>Framework</a:t>
+            </a:r>
+            <a:endParaRPr lang="en-US" dirty="0"/>
+          </a:p>
+        </p:txBody>
+      </p:sp>
+      <p:sp>
+        <p:nvSpPr>
+          <p:cNvPr id="3" name="Content Placeholder 2"/>
+          <p:cNvSpPr>
+            <a:spLocks noGrp="1"/>
+          </p:cNvSpPr>
+          <p:nvPr>
+            <p:ph idx="1"/>
+          </p:nvPr>
+        </p:nvSpPr>
+        <p:spPr/>
+        <p:txBody>
+          <a:bodyPr>
+            <a:normAutofit/>
+          </a:bodyPr>
+          <a:lstStyle/>
+          <a:p>
+            <a:pPr marL="0" indent="0">
+              <a:buNone/>
+            </a:pPr>
+            <a:r>
+              <a:rPr lang="en-US" sz="2000" dirty="0"/>
+              <a:t>Entity Framework is an object-relational mapper (O/RM) that enables .NET developers to work with a database using .NET objects. It eliminates the need for most of the data-access code that developers usually need to write</a:t>
+            </a:r>
+            <a:r>
+              <a:rPr lang="en-US" sz="2000" dirty="0" smtClean="0"/>
+              <a:t>.</a:t>
+            </a:r>
+          </a:p>
+          <a:p>
+            <a:pPr marL="0" indent="0">
+              <a:buNone/>
+            </a:pPr>
+            <a:endParaRPr lang="en-US" sz="2000" dirty="0"/>
+          </a:p>
+          <a:p>
+            <a:pPr marL="0" indent="0">
+              <a:buNone/>
+            </a:pPr>
+            <a:r>
+              <a:rPr lang="en-US" sz="2000" dirty="0">
+                <a:hlinkClick r:id="rId2"/>
+              </a:rPr>
+              <a:t>https://docs.microsoft.com/en-us/ef/#pivot=entityfmwk&amp;panel=entityfmwk1</a:t>
+            </a:r>
+            <a:endParaRPr lang="en-US" sz="2000" dirty="0" smtClean="0"/>
+          </a:p>
+          <a:p>
+            <a:pPr marL="0" indent="0">
+              <a:buNone/>
+            </a:pPr>
+            <a:endParaRPr lang="en-US" sz="2000" dirty="0"/>
+          </a:p>
+        </p:txBody>
+      </p:sp>
+    </p:spTree>
+    <p:extLst>
+      <p:ext uri="{BB962C8B-B14F-4D97-AF65-F5344CB8AC3E}">
+        <p14:creationId xmlns:p14="http://schemas.microsoft.com/office/powerpoint/2010/main" val="3444943664"/>
+      </p:ext>
+    </p:extLst>
+  </p:cSld>
+  <p:clrMapOvr>
+    <a:masterClrMapping/>
+  </p:clrMapOvr>
+  <mc:AlternateContent xmlns:mc="http://schemas.openxmlformats.org/markup-compatibility/2006">
+    <mc:Choice xmlns:p15="http://schemas.microsoft.com/office/powerpoint/2012/main" Requires="p15">
+      <p:transition xmlns:p14="http://schemas.microsoft.com/office/powerpoint/2010/main" spd="slow" p14:dur="6000">
+        <p15:prstTrans prst="curtains"/>
+      </p:transition>
+    </mc:Choice>
+    <mc:Fallback>
+      <p:transition spd="slow">
+        <p:fade/>
+      </p:transition>
+    </mc:Fallback>
+  </mc:AlternateContent>
+  <p:timing>
+    <p:tnLst>
+      <p:par>
+        <p:cTn id="1" dur="indefinite" restart="never" nodeType="tmRoot"/>
+      </p:par>
+    </p:tnLst>
+  </p:timing>
+</p:sld>
+</file>
+
+<file path=ppt/slides/slide31.xml><?xml version="1.0" encoding="utf-8"?>
+<p:sld xmlns:a="http://schemas.openxmlformats.org/drawingml/2006/main" xmlns:r="http://schemas.openxmlformats.org/officeDocument/2006/relationships" xmlns:p="http://schemas.openxmlformats.org/presentationml/2006/main">
+  <p:cSld>
+    <p:spTree>
+      <p:nvGrpSpPr>
+        <p:cNvPr id="1" name=""/>
+        <p:cNvGrpSpPr/>
+        <p:nvPr/>
+      </p:nvGrpSpPr>
+      <p:grpSpPr>
+        <a:xfrm>
+          <a:off x="0" y="0"/>
+          <a:ext cx="0" cy="0"/>
+          <a:chOff x="0" y="0"/>
+          <a:chExt cx="0" cy="0"/>
+        </a:xfrm>
+      </p:grpSpPr>
+      <p:sp>
+        <p:nvSpPr>
+          <p:cNvPr id="2" name="Title 1"/>
+          <p:cNvSpPr>
+            <a:spLocks noGrp="1"/>
+          </p:cNvSpPr>
+          <p:nvPr>
+            <p:ph type="title"/>
+          </p:nvPr>
+        </p:nvSpPr>
+        <p:spPr/>
+        <p:txBody>
+          <a:bodyPr/>
+          <a:lstStyle/>
+          <a:p>
+            <a:r>
               <a:rPr lang="en-US" dirty="0" smtClean="0"/>
-              <a:t>Framework </a:t>
-            </a:r>
-            <a:r>
-              <a:rPr lang="en-US" dirty="0" smtClean="0"/>
-              <a:t>Reading data (simple)</a:t>
+              <a:t>Entity Framework Reading data (simple)</a:t>
             </a:r>
             <a:endParaRPr lang="en-US" dirty="0"/>
           </a:p>
@@ -5789,10 +6571,29 @@
   <p:clrMapOvr>
     <a:masterClrMapping/>
   </p:clrMapOvr>
+  <mc:AlternateContent xmlns:mc="http://schemas.openxmlformats.org/markup-compatibility/2006">
+    <mc:Choice xmlns:p14="http://schemas.microsoft.com/office/powerpoint/2010/main" Requires="p14">
+      <p:transition spd="med" p14:dur="700">
+        <p:fade/>
+      </p:transition>
+    </mc:Choice>
+    <mc:Fallback>
+      <p:transition spd="med">
+        <p:fade/>
+      </p:transition>
+    </mc:Fallback>
+  </mc:AlternateContent>
+  <p:timing>
+    <p:tnLst>
+      <p:par>
+        <p:cTn id="1" dur="indefinite" restart="never" nodeType="tmRoot"/>
+      </p:par>
+    </p:tnLst>
+  </p:timing>
 </p:sld>
 </file>
 
-<file path=ppt/slides/slide29.xml><?xml version="1.0" encoding="utf-8"?>
+<file path=ppt/slides/slide32.xml><?xml version="1.0" encoding="utf-8"?>
 <p:sld xmlns:a="http://schemas.openxmlformats.org/drawingml/2006/main" xmlns:r="http://schemas.openxmlformats.org/officeDocument/2006/relationships" xmlns:p="http://schemas.openxmlformats.org/presentationml/2006/main">
   <p:cSld>
     <p:spTree>
@@ -5894,116 +6695,18 @@
   <p:clrMapOvr>
     <a:masterClrMapping/>
   </p:clrMapOvr>
-</p:sld>
-</file>
-
-<file path=ppt/slides/slide3.xml><?xml version="1.0" encoding="utf-8"?>
-<p:sld xmlns:a="http://schemas.openxmlformats.org/drawingml/2006/main" xmlns:r="http://schemas.openxmlformats.org/officeDocument/2006/relationships" xmlns:p="http://schemas.openxmlformats.org/presentationml/2006/main">
-  <p:cSld>
-    <p:spTree>
-      <p:nvGrpSpPr>
-        <p:cNvPr id="1" name=""/>
-        <p:cNvGrpSpPr/>
-        <p:nvPr/>
-      </p:nvGrpSpPr>
-      <p:grpSpPr>
-        <a:xfrm>
-          <a:off x="0" y="0"/>
-          <a:ext cx="0" cy="0"/>
-          <a:chOff x="0" y="0"/>
-          <a:chExt cx="0" cy="0"/>
-        </a:xfrm>
-      </p:grpSpPr>
-      <p:sp>
-        <p:nvSpPr>
-          <p:cNvPr id="2" name="Title 1"/>
-          <p:cNvSpPr>
-            <a:spLocks noGrp="1"/>
-          </p:cNvSpPr>
-          <p:nvPr>
-            <p:ph type="title"/>
-          </p:nvPr>
-        </p:nvSpPr>
-        <p:spPr/>
-        <p:txBody>
-          <a:bodyPr/>
-          <a:lstStyle/>
-          <a:p>
-            <a:r>
-              <a:rPr lang="en-US" dirty="0" smtClean="0"/>
-              <a:t>Outside the box</a:t>
-            </a:r>
-            <a:endParaRPr lang="en-US" dirty="0"/>
-          </a:p>
-        </p:txBody>
-      </p:sp>
-      <p:sp>
-        <p:nvSpPr>
-          <p:cNvPr id="3" name="Content Placeholder 2"/>
-          <p:cNvSpPr>
-            <a:spLocks noGrp="1"/>
-          </p:cNvSpPr>
-          <p:nvPr>
-            <p:ph idx="1"/>
-          </p:nvPr>
-        </p:nvSpPr>
-        <p:spPr/>
-        <p:txBody>
-          <a:bodyPr>
-            <a:normAutofit/>
-          </a:bodyPr>
-          <a:lstStyle/>
-          <a:p>
-            <a:pPr marL="0" indent="0">
-              <a:buNone/>
-            </a:pPr>
-            <a:r>
-              <a:rPr lang="en-US" sz="2000" dirty="0" smtClean="0"/>
-              <a:t>C# provides conventional methods to code along with enhanced functionality to write code more efficiently. Both conventional and enhanced versions of coding can be mixed.</a:t>
-            </a:r>
-          </a:p>
-          <a:p>
-            <a:pPr marL="0" indent="0">
-              <a:buNone/>
-            </a:pPr>
-            <a:endParaRPr lang="en-US" sz="2000" dirty="0"/>
-          </a:p>
-        </p:txBody>
-      </p:sp>
-      <p:pic>
-        <p:nvPicPr>
-          <p:cNvPr id="4" name="Picture 3"/>
-          <p:cNvPicPr>
-            <a:picLocks noChangeAspect="1"/>
-          </p:cNvPicPr>
-          <p:nvPr/>
-        </p:nvPicPr>
-        <p:blipFill>
-          <a:blip r:embed="rId2"/>
-          <a:stretch>
-            <a:fillRect/>
-          </a:stretch>
-        </p:blipFill>
-        <p:spPr>
-          <a:xfrm>
-            <a:off x="1060542" y="2462677"/>
-            <a:ext cx="4047619" cy="3714286"/>
-          </a:xfrm>
-          <a:prstGeom prst="rect">
-            <a:avLst/>
-          </a:prstGeom>
-        </p:spPr>
-      </p:pic>
-    </p:spTree>
-    <p:extLst>
-      <p:ext uri="{BB962C8B-B14F-4D97-AF65-F5344CB8AC3E}">
-        <p14:creationId xmlns:p14="http://schemas.microsoft.com/office/powerpoint/2010/main" val="1510932131"/>
-      </p:ext>
-    </p:extLst>
-  </p:cSld>
-  <p:clrMapOvr>
-    <a:masterClrMapping/>
-  </p:clrMapOvr>
+  <mc:AlternateContent xmlns:mc="http://schemas.openxmlformats.org/markup-compatibility/2006">
+    <mc:Choice xmlns:p14="http://schemas.microsoft.com/office/powerpoint/2010/main" Requires="p14">
+      <p:transition spd="med" p14:dur="700">
+        <p:fade/>
+      </p:transition>
+    </mc:Choice>
+    <mc:Fallback>
+      <p:transition spd="med">
+        <p:fade/>
+      </p:transition>
+    </mc:Fallback>
+  </mc:AlternateContent>
   <p:timing>
     <p:tnLst>
       <p:par>
@@ -6014,7 +6717,7 @@
 </p:sld>
 </file>
 
-<file path=ppt/slides/slide30.xml><?xml version="1.0" encoding="utf-8"?>
+<file path=ppt/slides/slide33.xml><?xml version="1.0" encoding="utf-8"?>
 <p:sld xmlns:a="http://schemas.openxmlformats.org/drawingml/2006/main" xmlns:r="http://schemas.openxmlformats.org/officeDocument/2006/relationships" xmlns:p="http://schemas.openxmlformats.org/presentationml/2006/main">
   <p:cSld>
     <p:spTree>
@@ -6090,10 +6793,29 @@
   <p:clrMapOvr>
     <a:masterClrMapping/>
   </p:clrMapOvr>
+  <mc:AlternateContent xmlns:mc="http://schemas.openxmlformats.org/markup-compatibility/2006">
+    <mc:Choice xmlns:p14="http://schemas.microsoft.com/office/powerpoint/2010/main" Requires="p14">
+      <p:transition spd="med" p14:dur="700">
+        <p:fade/>
+      </p:transition>
+    </mc:Choice>
+    <mc:Fallback>
+      <p:transition spd="med">
+        <p:fade/>
+      </p:transition>
+    </mc:Fallback>
+  </mc:AlternateContent>
+  <p:timing>
+    <p:tnLst>
+      <p:par>
+        <p:cTn id="1" dur="indefinite" restart="never" nodeType="tmRoot"/>
+      </p:par>
+    </p:tnLst>
+  </p:timing>
 </p:sld>
 </file>
 
-<file path=ppt/slides/slide31.xml><?xml version="1.0" encoding="utf-8"?>
+<file path=ppt/slides/slide34.xml><?xml version="1.0" encoding="utf-8"?>
 <p:sld xmlns:a="http://schemas.openxmlformats.org/drawingml/2006/main" xmlns:r="http://schemas.openxmlformats.org/officeDocument/2006/relationships" xmlns:p="http://schemas.openxmlformats.org/presentationml/2006/main">
   <p:cSld>
     <p:spTree>
@@ -6200,10 +6922,29 @@
   <p:clrMapOvr>
     <a:masterClrMapping/>
   </p:clrMapOvr>
+  <mc:AlternateContent xmlns:mc="http://schemas.openxmlformats.org/markup-compatibility/2006">
+    <mc:Choice xmlns:p14="http://schemas.microsoft.com/office/powerpoint/2010/main" Requires="p14">
+      <p:transition spd="med" p14:dur="700">
+        <p:fade/>
+      </p:transition>
+    </mc:Choice>
+    <mc:Fallback>
+      <p:transition spd="med">
+        <p:fade/>
+      </p:transition>
+    </mc:Fallback>
+  </mc:AlternateContent>
+  <p:timing>
+    <p:tnLst>
+      <p:par>
+        <p:cTn id="1" dur="indefinite" restart="never" nodeType="tmRoot"/>
+      </p:par>
+    </p:tnLst>
+  </p:timing>
 </p:sld>
 </file>
 
-<file path=ppt/slides/slide32.xml><?xml version="1.0" encoding="utf-8"?>
+<file path=ppt/slides/slide35.xml><?xml version="1.0" encoding="utf-8"?>
 <p:sld xmlns:a="http://schemas.openxmlformats.org/drawingml/2006/main" xmlns:r="http://schemas.openxmlformats.org/officeDocument/2006/relationships" xmlns:p="http://schemas.openxmlformats.org/presentationml/2006/main">
   <p:cSld>
     <p:spTree>
@@ -6311,10 +7052,29 @@
   <p:clrMapOvr>
     <a:masterClrMapping/>
   </p:clrMapOvr>
+  <mc:AlternateContent xmlns:mc="http://schemas.openxmlformats.org/markup-compatibility/2006">
+    <mc:Choice xmlns:p14="http://schemas.microsoft.com/office/powerpoint/2010/main" Requires="p14">
+      <p:transition spd="med" p14:dur="700">
+        <p:fade/>
+      </p:transition>
+    </mc:Choice>
+    <mc:Fallback>
+      <p:transition spd="med">
+        <p:fade/>
+      </p:transition>
+    </mc:Fallback>
+  </mc:AlternateContent>
+  <p:timing>
+    <p:tnLst>
+      <p:par>
+        <p:cTn id="1" dur="indefinite" restart="never" nodeType="tmRoot"/>
+      </p:par>
+    </p:tnLst>
+  </p:timing>
 </p:sld>
 </file>
 
-<file path=ppt/slides/slide33.xml><?xml version="1.0" encoding="utf-8"?>
+<file path=ppt/slides/slide36.xml><?xml version="1.0" encoding="utf-8"?>
 <p:sld xmlns:a="http://schemas.openxmlformats.org/drawingml/2006/main" xmlns:r="http://schemas.openxmlformats.org/officeDocument/2006/relationships" xmlns:p="http://schemas.openxmlformats.org/presentationml/2006/main">
   <p:cSld>
     <p:spTree>
@@ -6405,10 +7165,29 @@
   <p:clrMapOvr>
     <a:masterClrMapping/>
   </p:clrMapOvr>
+  <mc:AlternateContent xmlns:mc="http://schemas.openxmlformats.org/markup-compatibility/2006">
+    <mc:Choice xmlns:p14="http://schemas.microsoft.com/office/powerpoint/2010/main" Requires="p14">
+      <p:transition spd="med" p14:dur="700">
+        <p:fade/>
+      </p:transition>
+    </mc:Choice>
+    <mc:Fallback>
+      <p:transition spd="med">
+        <p:fade/>
+      </p:transition>
+    </mc:Fallback>
+  </mc:AlternateContent>
+  <p:timing>
+    <p:tnLst>
+      <p:par>
+        <p:cTn id="1" dur="indefinite" restart="never" nodeType="tmRoot"/>
+      </p:par>
+    </p:tnLst>
+  </p:timing>
 </p:sld>
 </file>
 
-<file path=ppt/slides/slide34.xml><?xml version="1.0" encoding="utf-8"?>
+<file path=ppt/slides/slide37.xml><?xml version="1.0" encoding="utf-8"?>
 <p:sld xmlns:a="http://schemas.openxmlformats.org/drawingml/2006/main" xmlns:r="http://schemas.openxmlformats.org/officeDocument/2006/relationships" xmlns:p="http://schemas.openxmlformats.org/presentationml/2006/main">
   <p:cSld>
     <p:spTree>
@@ -6693,6 +7472,25 @@
   <p:clrMapOvr>
     <a:masterClrMapping/>
   </p:clrMapOvr>
+  <mc:AlternateContent xmlns:mc="http://schemas.openxmlformats.org/markup-compatibility/2006">
+    <mc:Choice xmlns:p14="http://schemas.microsoft.com/office/powerpoint/2010/main" Requires="p14">
+      <p:transition spd="med" p14:dur="700">
+        <p:fade/>
+      </p:transition>
+    </mc:Choice>
+    <mc:Fallback>
+      <p:transition spd="med">
+        <p:fade/>
+      </p:transition>
+    </mc:Fallback>
+  </mc:AlternateContent>
+  <p:timing>
+    <p:tnLst>
+      <p:par>
+        <p:cTn id="1" dur="indefinite" restart="never" nodeType="tmRoot"/>
+      </p:par>
+    </p:tnLst>
+  </p:timing>
 </p:sld>
 </file>
 
@@ -7361,6 +8159,18 @@
   <p:clrMapOvr>
     <a:masterClrMapping/>
   </p:clrMapOvr>
+  <mc:AlternateContent xmlns:mc="http://schemas.openxmlformats.org/markup-compatibility/2006">
+    <mc:Choice xmlns:p14="http://schemas.microsoft.com/office/powerpoint/2010/main" Requires="p14">
+      <p:transition spd="med" p14:dur="700">
+        <p:fade/>
+      </p:transition>
+    </mc:Choice>
+    <mc:Fallback>
+      <p:transition spd="med">
+        <p:fade/>
+      </p:transition>
+    </mc:Fallback>
+  </mc:AlternateContent>
   <p:timing>
     <p:tnLst>
       <p:par>
@@ -7542,6 +8352,18 @@
   <p:clrMapOvr>
     <a:masterClrMapping/>
   </p:clrMapOvr>
+  <mc:AlternateContent xmlns:mc="http://schemas.openxmlformats.org/markup-compatibility/2006">
+    <mc:Choice xmlns:p14="http://schemas.microsoft.com/office/powerpoint/2010/main" Requires="p14">
+      <p:transition spd="med" p14:dur="700">
+        <p:fade/>
+      </p:transition>
+    </mc:Choice>
+    <mc:Fallback>
+      <p:transition spd="med">
+        <p:fade/>
+      </p:transition>
+    </mc:Fallback>
+  </mc:AlternateContent>
   <p:timing>
     <p:tnLst>
       <p:par>
@@ -7654,6 +8476,18 @@
   <p:clrMapOvr>
     <a:masterClrMapping/>
   </p:clrMapOvr>
+  <mc:AlternateContent xmlns:mc="http://schemas.openxmlformats.org/markup-compatibility/2006">
+    <mc:Choice xmlns:p14="http://schemas.microsoft.com/office/powerpoint/2010/main" Requires="p14">
+      <p:transition spd="med" p14:dur="700">
+        <p:fade/>
+      </p:transition>
+    </mc:Choice>
+    <mc:Fallback>
+      <p:transition spd="med">
+        <p:fade/>
+      </p:transition>
+    </mc:Fallback>
+  </mc:AlternateContent>
   <p:timing>
     <p:tnLst>
       <p:par>
@@ -7775,6 +8609,18 @@
   <p:clrMapOvr>
     <a:masterClrMapping/>
   </p:clrMapOvr>
+  <mc:AlternateContent xmlns:mc="http://schemas.openxmlformats.org/markup-compatibility/2006">
+    <mc:Choice xmlns:p14="http://schemas.microsoft.com/office/powerpoint/2010/main" Requires="p14">
+      <p:transition spd="med" p14:dur="700">
+        <p:fade/>
+      </p:transition>
+    </mc:Choice>
+    <mc:Fallback>
+      <p:transition spd="med">
+        <p:fade/>
+      </p:transition>
+    </mc:Fallback>
+  </mc:AlternateContent>
   <p:timing>
     <p:tnLst>
       <p:par>
@@ -8092,6 +8938,18 @@
   <p:clrMapOvr>
     <a:masterClrMapping/>
   </p:clrMapOvr>
+  <mc:AlternateContent xmlns:mc="http://schemas.openxmlformats.org/markup-compatibility/2006">
+    <mc:Choice xmlns:p14="http://schemas.microsoft.com/office/powerpoint/2010/main" Requires="p14">
+      <p:transition spd="med" p14:dur="700">
+        <p:fade/>
+      </p:transition>
+    </mc:Choice>
+    <mc:Fallback>
+      <p:transition spd="med">
+        <p:fade/>
+      </p:transition>
+    </mc:Fallback>
+  </mc:AlternateContent>
   <p:timing>
     <p:tnLst>
       <p:par>
@@ -8220,6 +9078,18 @@
   <p:clrMapOvr>
     <a:masterClrMapping/>
   </p:clrMapOvr>
+  <mc:AlternateContent xmlns:mc="http://schemas.openxmlformats.org/markup-compatibility/2006">
+    <mc:Choice xmlns:p14="http://schemas.microsoft.com/office/powerpoint/2010/main" Requires="p14">
+      <p:transition spd="med" p14:dur="700">
+        <p:fade/>
+      </p:transition>
+    </mc:Choice>
+    <mc:Fallback>
+      <p:transition spd="med">
+        <p:fade/>
+      </p:transition>
+    </mc:Fallback>
+  </mc:AlternateContent>
   <p:timing>
     <p:tnLst>
       <p:par>

</xml_diff>